<commit_message>
#13 Create signup component
</commit_message>
<xml_diff>
--- a/docs/COMPONENT-DIAGRAM.pptx
+++ b/docs/COMPONENT-DIAGRAM.pptx
@@ -6,7 +6,8 @@
   </p:sldMasterIdLst>
   <p:sldIdLst>
     <p:sldId id="256" r:id="rId2"/>
-    <p:sldId id="258" r:id="rId3"/>
+    <p:sldId id="259" r:id="rId3"/>
+    <p:sldId id="258" r:id="rId4"/>
   </p:sldIdLst>
   <p:sldSz cx="12192000" cy="6858000"/>
   <p:notesSz cx="6858000" cy="9144000"/>
@@ -105,6 +106,11 @@
       </a:defRPr>
     </a:lvl9pPr>
   </p:defaultTextStyle>
+  <p:extLst>
+    <p:ext uri="{EFAFB233-063F-42B5-8137-9DF3F51BA10A}">
+      <p15:sldGuideLst xmlns:p15="http://schemas.microsoft.com/office/powerpoint/2012/main"/>
+    </p:ext>
+  </p:extLst>
 </p:presentation>
 </file>
 
@@ -150,10 +156,9 @@
           </a:lstStyle>
           <a:p>
             <a:r>
-              <a:rPr lang="en-US" smtClean="0"/>
+              <a:rPr lang="en-US"/>
               <a:t>Click to edit Master title style</a:t>
             </a:r>
-            <a:endParaRPr lang="en-US"/>
           </a:p>
         </p:txBody>
       </p:sp>
@@ -215,10 +220,9 @@
           </a:lstStyle>
           <a:p>
             <a:r>
-              <a:rPr lang="en-US" smtClean="0"/>
+              <a:rPr lang="en-US"/>
               <a:t>Click to edit Master subtitle style</a:t>
             </a:r>
-            <a:endParaRPr lang="en-US"/>
           </a:p>
         </p:txBody>
       </p:sp>
@@ -239,7 +243,7 @@
           <a:p>
             <a:fld id="{28BE630F-C39C-4DB9-8258-0B48CA067079}" type="datetimeFigureOut">
               <a:rPr lang="en-US" smtClean="0"/>
-              <a:t>11/25/2021</a:t>
+              <a:t>11/28/2021</a:t>
             </a:fld>
             <a:endParaRPr lang="en-US"/>
           </a:p>
@@ -333,10 +337,9 @@
           <a:lstStyle/>
           <a:p>
             <a:r>
-              <a:rPr lang="en-US" smtClean="0"/>
+              <a:rPr lang="en-US"/>
               <a:t>Click to edit Master title style</a:t>
             </a:r>
-            <a:endParaRPr lang="en-US"/>
           </a:p>
         </p:txBody>
       </p:sp>
@@ -357,38 +360,37 @@
           <a:p>
             <a:pPr lvl="0"/>
             <a:r>
-              <a:rPr lang="en-US" smtClean="0"/>
+              <a:rPr lang="en-US"/>
               <a:t>Click to edit Master text styles</a:t>
             </a:r>
           </a:p>
           <a:p>
             <a:pPr lvl="1"/>
             <a:r>
-              <a:rPr lang="en-US" smtClean="0"/>
+              <a:rPr lang="en-US"/>
               <a:t>Second level</a:t>
             </a:r>
           </a:p>
           <a:p>
             <a:pPr lvl="2"/>
             <a:r>
-              <a:rPr lang="en-US" smtClean="0"/>
+              <a:rPr lang="en-US"/>
               <a:t>Third level</a:t>
             </a:r>
           </a:p>
           <a:p>
             <a:pPr lvl="3"/>
             <a:r>
-              <a:rPr lang="en-US" smtClean="0"/>
+              <a:rPr lang="en-US"/>
               <a:t>Fourth level</a:t>
             </a:r>
           </a:p>
           <a:p>
             <a:pPr lvl="4"/>
             <a:r>
-              <a:rPr lang="en-US" smtClean="0"/>
+              <a:rPr lang="en-US"/>
               <a:t>Fifth level</a:t>
             </a:r>
-            <a:endParaRPr lang="en-US"/>
           </a:p>
         </p:txBody>
       </p:sp>
@@ -409,7 +411,7 @@
           <a:p>
             <a:fld id="{28BE630F-C39C-4DB9-8258-0B48CA067079}" type="datetimeFigureOut">
               <a:rPr lang="en-US" smtClean="0"/>
-              <a:t>11/25/2021</a:t>
+              <a:t>11/28/2021</a:t>
             </a:fld>
             <a:endParaRPr lang="en-US"/>
           </a:p>
@@ -508,10 +510,9 @@
           <a:lstStyle/>
           <a:p>
             <a:r>
-              <a:rPr lang="en-US" smtClean="0"/>
+              <a:rPr lang="en-US"/>
               <a:t>Click to edit Master title style</a:t>
             </a:r>
-            <a:endParaRPr lang="en-US"/>
           </a:p>
         </p:txBody>
       </p:sp>
@@ -537,38 +538,37 @@
           <a:p>
             <a:pPr lvl="0"/>
             <a:r>
-              <a:rPr lang="en-US" smtClean="0"/>
+              <a:rPr lang="en-US"/>
               <a:t>Click to edit Master text styles</a:t>
             </a:r>
           </a:p>
           <a:p>
             <a:pPr lvl="1"/>
             <a:r>
-              <a:rPr lang="en-US" smtClean="0"/>
+              <a:rPr lang="en-US"/>
               <a:t>Second level</a:t>
             </a:r>
           </a:p>
           <a:p>
             <a:pPr lvl="2"/>
             <a:r>
-              <a:rPr lang="en-US" smtClean="0"/>
+              <a:rPr lang="en-US"/>
               <a:t>Third level</a:t>
             </a:r>
           </a:p>
           <a:p>
             <a:pPr lvl="3"/>
             <a:r>
-              <a:rPr lang="en-US" smtClean="0"/>
+              <a:rPr lang="en-US"/>
               <a:t>Fourth level</a:t>
             </a:r>
           </a:p>
           <a:p>
             <a:pPr lvl="4"/>
             <a:r>
-              <a:rPr lang="en-US" smtClean="0"/>
+              <a:rPr lang="en-US"/>
               <a:t>Fifth level</a:t>
             </a:r>
-            <a:endParaRPr lang="en-US"/>
           </a:p>
         </p:txBody>
       </p:sp>
@@ -589,7 +589,7 @@
           <a:p>
             <a:fld id="{28BE630F-C39C-4DB9-8258-0B48CA067079}" type="datetimeFigureOut">
               <a:rPr lang="en-US" smtClean="0"/>
-              <a:t>11/25/2021</a:t>
+              <a:t>11/28/2021</a:t>
             </a:fld>
             <a:endParaRPr lang="en-US"/>
           </a:p>
@@ -683,10 +683,9 @@
           <a:lstStyle/>
           <a:p>
             <a:r>
-              <a:rPr lang="en-US" smtClean="0"/>
+              <a:rPr lang="en-US"/>
               <a:t>Click to edit Master title style</a:t>
             </a:r>
-            <a:endParaRPr lang="en-US"/>
           </a:p>
         </p:txBody>
       </p:sp>
@@ -707,38 +706,37 @@
           <a:p>
             <a:pPr lvl="0"/>
             <a:r>
-              <a:rPr lang="en-US" smtClean="0"/>
+              <a:rPr lang="en-US"/>
               <a:t>Click to edit Master text styles</a:t>
             </a:r>
           </a:p>
           <a:p>
             <a:pPr lvl="1"/>
             <a:r>
-              <a:rPr lang="en-US" smtClean="0"/>
+              <a:rPr lang="en-US"/>
               <a:t>Second level</a:t>
             </a:r>
           </a:p>
           <a:p>
             <a:pPr lvl="2"/>
             <a:r>
-              <a:rPr lang="en-US" smtClean="0"/>
+              <a:rPr lang="en-US"/>
               <a:t>Third level</a:t>
             </a:r>
           </a:p>
           <a:p>
             <a:pPr lvl="3"/>
             <a:r>
-              <a:rPr lang="en-US" smtClean="0"/>
+              <a:rPr lang="en-US"/>
               <a:t>Fourth level</a:t>
             </a:r>
           </a:p>
           <a:p>
             <a:pPr lvl="4"/>
             <a:r>
-              <a:rPr lang="en-US" smtClean="0"/>
+              <a:rPr lang="en-US"/>
               <a:t>Fifth level</a:t>
             </a:r>
-            <a:endParaRPr lang="en-US"/>
           </a:p>
         </p:txBody>
       </p:sp>
@@ -759,7 +757,7 @@
           <a:p>
             <a:fld id="{28BE630F-C39C-4DB9-8258-0B48CA067079}" type="datetimeFigureOut">
               <a:rPr lang="en-US" smtClean="0"/>
-              <a:t>11/25/2021</a:t>
+              <a:t>11/28/2021</a:t>
             </a:fld>
             <a:endParaRPr lang="en-US"/>
           </a:p>
@@ -862,10 +860,9 @@
           </a:lstStyle>
           <a:p>
             <a:r>
-              <a:rPr lang="en-US" smtClean="0"/>
+              <a:rPr lang="en-US"/>
               <a:t>Click to edit Master title style</a:t>
             </a:r>
-            <a:endParaRPr lang="en-US"/>
           </a:p>
         </p:txBody>
       </p:sp>
@@ -982,7 +979,7 @@
           <a:p>
             <a:pPr lvl="0"/>
             <a:r>
-              <a:rPr lang="en-US" smtClean="0"/>
+              <a:rPr lang="en-US"/>
               <a:t>Click to edit Master text styles</a:t>
             </a:r>
           </a:p>
@@ -1005,7 +1002,7 @@
           <a:p>
             <a:fld id="{28BE630F-C39C-4DB9-8258-0B48CA067079}" type="datetimeFigureOut">
               <a:rPr lang="en-US" smtClean="0"/>
-              <a:t>11/25/2021</a:t>
+              <a:t>11/28/2021</a:t>
             </a:fld>
             <a:endParaRPr lang="en-US"/>
           </a:p>
@@ -1099,10 +1096,9 @@
           <a:lstStyle/>
           <a:p>
             <a:r>
-              <a:rPr lang="en-US" smtClean="0"/>
+              <a:rPr lang="en-US"/>
               <a:t>Click to edit Master title style</a:t>
             </a:r>
-            <a:endParaRPr lang="en-US"/>
           </a:p>
         </p:txBody>
       </p:sp>
@@ -1128,38 +1124,37 @@
           <a:p>
             <a:pPr lvl="0"/>
             <a:r>
-              <a:rPr lang="en-US" smtClean="0"/>
+              <a:rPr lang="en-US"/>
               <a:t>Click to edit Master text styles</a:t>
             </a:r>
           </a:p>
           <a:p>
             <a:pPr lvl="1"/>
             <a:r>
-              <a:rPr lang="en-US" smtClean="0"/>
+              <a:rPr lang="en-US"/>
               <a:t>Second level</a:t>
             </a:r>
           </a:p>
           <a:p>
             <a:pPr lvl="2"/>
             <a:r>
-              <a:rPr lang="en-US" smtClean="0"/>
+              <a:rPr lang="en-US"/>
               <a:t>Third level</a:t>
             </a:r>
           </a:p>
           <a:p>
             <a:pPr lvl="3"/>
             <a:r>
-              <a:rPr lang="en-US" smtClean="0"/>
+              <a:rPr lang="en-US"/>
               <a:t>Fourth level</a:t>
             </a:r>
           </a:p>
           <a:p>
             <a:pPr lvl="4"/>
             <a:r>
-              <a:rPr lang="en-US" smtClean="0"/>
+              <a:rPr lang="en-US"/>
               <a:t>Fifth level</a:t>
             </a:r>
-            <a:endParaRPr lang="en-US"/>
           </a:p>
         </p:txBody>
       </p:sp>
@@ -1185,38 +1180,37 @@
           <a:p>
             <a:pPr lvl="0"/>
             <a:r>
-              <a:rPr lang="en-US" smtClean="0"/>
+              <a:rPr lang="en-US"/>
               <a:t>Click to edit Master text styles</a:t>
             </a:r>
           </a:p>
           <a:p>
             <a:pPr lvl="1"/>
             <a:r>
-              <a:rPr lang="en-US" smtClean="0"/>
+              <a:rPr lang="en-US"/>
               <a:t>Second level</a:t>
             </a:r>
           </a:p>
           <a:p>
             <a:pPr lvl="2"/>
             <a:r>
-              <a:rPr lang="en-US" smtClean="0"/>
+              <a:rPr lang="en-US"/>
               <a:t>Third level</a:t>
             </a:r>
           </a:p>
           <a:p>
             <a:pPr lvl="3"/>
             <a:r>
-              <a:rPr lang="en-US" smtClean="0"/>
+              <a:rPr lang="en-US"/>
               <a:t>Fourth level</a:t>
             </a:r>
           </a:p>
           <a:p>
             <a:pPr lvl="4"/>
             <a:r>
-              <a:rPr lang="en-US" smtClean="0"/>
+              <a:rPr lang="en-US"/>
               <a:t>Fifth level</a:t>
             </a:r>
-            <a:endParaRPr lang="en-US"/>
           </a:p>
         </p:txBody>
       </p:sp>
@@ -1237,7 +1231,7 @@
           <a:p>
             <a:fld id="{28BE630F-C39C-4DB9-8258-0B48CA067079}" type="datetimeFigureOut">
               <a:rPr lang="en-US" smtClean="0"/>
-              <a:t>11/25/2021</a:t>
+              <a:t>11/28/2021</a:t>
             </a:fld>
             <a:endParaRPr lang="en-US"/>
           </a:p>
@@ -1336,10 +1330,9 @@
           <a:lstStyle/>
           <a:p>
             <a:r>
-              <a:rPr lang="en-US" smtClean="0"/>
+              <a:rPr lang="en-US"/>
               <a:t>Click to edit Master title style</a:t>
             </a:r>
-            <a:endParaRPr lang="en-US"/>
           </a:p>
         </p:txBody>
       </p:sp>
@@ -1402,7 +1395,7 @@
           <a:p>
             <a:pPr lvl="0"/>
             <a:r>
-              <a:rPr lang="en-US" smtClean="0"/>
+              <a:rPr lang="en-US"/>
               <a:t>Click to edit Master text styles</a:t>
             </a:r>
           </a:p>
@@ -1430,38 +1423,37 @@
           <a:p>
             <a:pPr lvl="0"/>
             <a:r>
-              <a:rPr lang="en-US" smtClean="0"/>
+              <a:rPr lang="en-US"/>
               <a:t>Click to edit Master text styles</a:t>
             </a:r>
           </a:p>
           <a:p>
             <a:pPr lvl="1"/>
             <a:r>
-              <a:rPr lang="en-US" smtClean="0"/>
+              <a:rPr lang="en-US"/>
               <a:t>Second level</a:t>
             </a:r>
           </a:p>
           <a:p>
             <a:pPr lvl="2"/>
             <a:r>
-              <a:rPr lang="en-US" smtClean="0"/>
+              <a:rPr lang="en-US"/>
               <a:t>Third level</a:t>
             </a:r>
           </a:p>
           <a:p>
             <a:pPr lvl="3"/>
             <a:r>
-              <a:rPr lang="en-US" smtClean="0"/>
+              <a:rPr lang="en-US"/>
               <a:t>Fourth level</a:t>
             </a:r>
           </a:p>
           <a:p>
             <a:pPr lvl="4"/>
             <a:r>
-              <a:rPr lang="en-US" smtClean="0"/>
+              <a:rPr lang="en-US"/>
               <a:t>Fifth level</a:t>
             </a:r>
-            <a:endParaRPr lang="en-US"/>
           </a:p>
         </p:txBody>
       </p:sp>
@@ -1524,7 +1516,7 @@
           <a:p>
             <a:pPr lvl="0"/>
             <a:r>
-              <a:rPr lang="en-US" smtClean="0"/>
+              <a:rPr lang="en-US"/>
               <a:t>Click to edit Master text styles</a:t>
             </a:r>
           </a:p>
@@ -1552,38 +1544,37 @@
           <a:p>
             <a:pPr lvl="0"/>
             <a:r>
-              <a:rPr lang="en-US" smtClean="0"/>
+              <a:rPr lang="en-US"/>
               <a:t>Click to edit Master text styles</a:t>
             </a:r>
           </a:p>
           <a:p>
             <a:pPr lvl="1"/>
             <a:r>
-              <a:rPr lang="en-US" smtClean="0"/>
+              <a:rPr lang="en-US"/>
               <a:t>Second level</a:t>
             </a:r>
           </a:p>
           <a:p>
             <a:pPr lvl="2"/>
             <a:r>
-              <a:rPr lang="en-US" smtClean="0"/>
+              <a:rPr lang="en-US"/>
               <a:t>Third level</a:t>
             </a:r>
           </a:p>
           <a:p>
             <a:pPr lvl="3"/>
             <a:r>
-              <a:rPr lang="en-US" smtClean="0"/>
+              <a:rPr lang="en-US"/>
               <a:t>Fourth level</a:t>
             </a:r>
           </a:p>
           <a:p>
             <a:pPr lvl="4"/>
             <a:r>
-              <a:rPr lang="en-US" smtClean="0"/>
+              <a:rPr lang="en-US"/>
               <a:t>Fifth level</a:t>
             </a:r>
-            <a:endParaRPr lang="en-US"/>
           </a:p>
         </p:txBody>
       </p:sp>
@@ -1604,7 +1595,7 @@
           <a:p>
             <a:fld id="{28BE630F-C39C-4DB9-8258-0B48CA067079}" type="datetimeFigureOut">
               <a:rPr lang="en-US" smtClean="0"/>
-              <a:t>11/25/2021</a:t>
+              <a:t>11/28/2021</a:t>
             </a:fld>
             <a:endParaRPr lang="en-US"/>
           </a:p>
@@ -1698,10 +1689,9 @@
           <a:lstStyle/>
           <a:p>
             <a:r>
-              <a:rPr lang="en-US" smtClean="0"/>
+              <a:rPr lang="en-US"/>
               <a:t>Click to edit Master title style</a:t>
             </a:r>
-            <a:endParaRPr lang="en-US"/>
           </a:p>
         </p:txBody>
       </p:sp>
@@ -1722,7 +1712,7 @@
           <a:p>
             <a:fld id="{28BE630F-C39C-4DB9-8258-0B48CA067079}" type="datetimeFigureOut">
               <a:rPr lang="en-US" smtClean="0"/>
-              <a:t>11/25/2021</a:t>
+              <a:t>11/28/2021</a:t>
             </a:fld>
             <a:endParaRPr lang="en-US"/>
           </a:p>
@@ -1817,7 +1807,7 @@
           <a:p>
             <a:fld id="{28BE630F-C39C-4DB9-8258-0B48CA067079}" type="datetimeFigureOut">
               <a:rPr lang="en-US" smtClean="0"/>
-              <a:t>11/25/2021</a:t>
+              <a:t>11/28/2021</a:t>
             </a:fld>
             <a:endParaRPr lang="en-US"/>
           </a:p>
@@ -1920,10 +1910,9 @@
           </a:lstStyle>
           <a:p>
             <a:r>
-              <a:rPr lang="en-US" smtClean="0"/>
+              <a:rPr lang="en-US"/>
               <a:t>Click to edit Master title style</a:t>
             </a:r>
-            <a:endParaRPr lang="en-US"/>
           </a:p>
         </p:txBody>
       </p:sp>
@@ -1977,38 +1966,37 @@
           <a:p>
             <a:pPr lvl="0"/>
             <a:r>
-              <a:rPr lang="en-US" smtClean="0"/>
+              <a:rPr lang="en-US"/>
               <a:t>Click to edit Master text styles</a:t>
             </a:r>
           </a:p>
           <a:p>
             <a:pPr lvl="1"/>
             <a:r>
-              <a:rPr lang="en-US" smtClean="0"/>
+              <a:rPr lang="en-US"/>
               <a:t>Second level</a:t>
             </a:r>
           </a:p>
           <a:p>
             <a:pPr lvl="2"/>
             <a:r>
-              <a:rPr lang="en-US" smtClean="0"/>
+              <a:rPr lang="en-US"/>
               <a:t>Third level</a:t>
             </a:r>
           </a:p>
           <a:p>
             <a:pPr lvl="3"/>
             <a:r>
-              <a:rPr lang="en-US" smtClean="0"/>
+              <a:rPr lang="en-US"/>
               <a:t>Fourth level</a:t>
             </a:r>
           </a:p>
           <a:p>
             <a:pPr lvl="4"/>
             <a:r>
-              <a:rPr lang="en-US" smtClean="0"/>
+              <a:rPr lang="en-US"/>
               <a:t>Fifth level</a:t>
             </a:r>
-            <a:endParaRPr lang="en-US"/>
           </a:p>
         </p:txBody>
       </p:sp>
@@ -2071,7 +2059,7 @@
           <a:p>
             <a:pPr lvl="0"/>
             <a:r>
-              <a:rPr lang="en-US" smtClean="0"/>
+              <a:rPr lang="en-US"/>
               <a:t>Click to edit Master text styles</a:t>
             </a:r>
           </a:p>
@@ -2094,7 +2082,7 @@
           <a:p>
             <a:fld id="{28BE630F-C39C-4DB9-8258-0B48CA067079}" type="datetimeFigureOut">
               <a:rPr lang="en-US" smtClean="0"/>
-              <a:t>11/25/2021</a:t>
+              <a:t>11/28/2021</a:t>
             </a:fld>
             <a:endParaRPr lang="en-US"/>
           </a:p>
@@ -2197,10 +2185,9 @@
           </a:lstStyle>
           <a:p>
             <a:r>
-              <a:rPr lang="en-US" smtClean="0"/>
+              <a:rPr lang="en-US"/>
               <a:t>Click to edit Master title style</a:t>
             </a:r>
-            <a:endParaRPr lang="en-US"/>
           </a:p>
         </p:txBody>
       </p:sp>
@@ -2324,7 +2311,7 @@
           <a:p>
             <a:pPr lvl="0"/>
             <a:r>
-              <a:rPr lang="en-US" smtClean="0"/>
+              <a:rPr lang="en-US"/>
               <a:t>Click to edit Master text styles</a:t>
             </a:r>
           </a:p>
@@ -2347,7 +2334,7 @@
           <a:p>
             <a:fld id="{28BE630F-C39C-4DB9-8258-0B48CA067079}" type="datetimeFigureOut">
               <a:rPr lang="en-US" smtClean="0"/>
-              <a:t>11/25/2021</a:t>
+              <a:t>11/28/2021</a:t>
             </a:fld>
             <a:endParaRPr lang="en-US"/>
           </a:p>
@@ -2456,10 +2443,9 @@
           <a:lstStyle/>
           <a:p>
             <a:r>
-              <a:rPr lang="en-US" smtClean="0"/>
+              <a:rPr lang="en-US"/>
               <a:t>Click to edit Master title style</a:t>
             </a:r>
-            <a:endParaRPr lang="en-US"/>
           </a:p>
         </p:txBody>
       </p:sp>
@@ -2490,38 +2476,37 @@
           <a:p>
             <a:pPr lvl="0"/>
             <a:r>
-              <a:rPr lang="en-US" smtClean="0"/>
+              <a:rPr lang="en-US"/>
               <a:t>Click to edit Master text styles</a:t>
             </a:r>
           </a:p>
           <a:p>
             <a:pPr lvl="1"/>
             <a:r>
-              <a:rPr lang="en-US" smtClean="0"/>
+              <a:rPr lang="en-US"/>
               <a:t>Second level</a:t>
             </a:r>
           </a:p>
           <a:p>
             <a:pPr lvl="2"/>
             <a:r>
-              <a:rPr lang="en-US" smtClean="0"/>
+              <a:rPr lang="en-US"/>
               <a:t>Third level</a:t>
             </a:r>
           </a:p>
           <a:p>
             <a:pPr lvl="3"/>
             <a:r>
-              <a:rPr lang="en-US" smtClean="0"/>
+              <a:rPr lang="en-US"/>
               <a:t>Fourth level</a:t>
             </a:r>
           </a:p>
           <a:p>
             <a:pPr lvl="4"/>
             <a:r>
-              <a:rPr lang="en-US" smtClean="0"/>
+              <a:rPr lang="en-US"/>
               <a:t>Fifth level</a:t>
             </a:r>
-            <a:endParaRPr lang="en-US"/>
           </a:p>
         </p:txBody>
       </p:sp>
@@ -2560,7 +2545,7 @@
           <a:p>
             <a:fld id="{28BE630F-C39C-4DB9-8258-0B48CA067079}" type="datetimeFigureOut">
               <a:rPr lang="en-US" smtClean="0"/>
-              <a:t>11/25/2021</a:t>
+              <a:t>11/28/2021</a:t>
             </a:fld>
             <a:endParaRPr lang="en-US"/>
           </a:p>
@@ -3222,47 +3207,20 @@
       </p:grpSpPr>
       <p:sp>
         <p:nvSpPr>
-          <p:cNvPr id="4" name="TextBox 3"/>
-          <p:cNvSpPr txBox="1"/>
-          <p:nvPr/>
-        </p:nvSpPr>
-        <p:spPr>
-          <a:xfrm>
-            <a:off x="1009380" y="479624"/>
-            <a:ext cx="639919" cy="303481"/>
-          </a:xfrm>
-          <a:prstGeom prst="rect">
-            <a:avLst/>
-          </a:prstGeom>
-          <a:noFill/>
-        </p:spPr>
-        <p:txBody>
-          <a:bodyPr wrap="none" rtlCol="0">
-            <a:spAutoFit/>
-          </a:bodyPr>
-          <a:lstStyle/>
-          <a:p>
-            <a:r>
-              <a:rPr lang="en-US" sz="1372" b="1" i="1" dirty="0">
-                <a:solidFill>
-                  <a:srgbClr val="FF0000"/>
-                </a:solidFill>
-              </a:rPr>
-              <a:t>&lt;app&gt;</a:t>
-            </a:r>
-          </a:p>
-        </p:txBody>
-      </p:sp>
-      <p:sp>
-        <p:nvSpPr>
-          <p:cNvPr id="5" name="Rounded Rectangle 4"/>
+          <p:cNvPr id="3" name="Rounded Rectangle 4">
+            <a:extLst>
+              <a:ext uri="{FF2B5EF4-FFF2-40B4-BE49-F238E27FC236}">
+                <a16:creationId xmlns:a16="http://schemas.microsoft.com/office/drawing/2014/main" id="{1C3F6827-73AD-40E5-A9AA-AF1EA15411B0}"/>
+              </a:ext>
+            </a:extLst>
+          </p:cNvPr>
           <p:cNvSpPr/>
           <p:nvPr/>
         </p:nvSpPr>
         <p:spPr>
           <a:xfrm>
-            <a:off x="523323" y="309043"/>
-            <a:ext cx="1650319" cy="1166483"/>
+            <a:off x="751925" y="1382193"/>
+            <a:ext cx="8703228" cy="567257"/>
           </a:xfrm>
           <a:prstGeom prst="roundRect">
             <a:avLst/>
@@ -3302,73 +3260,19 @@
       </p:sp>
       <p:sp>
         <p:nvSpPr>
-          <p:cNvPr id="6" name="TextBox 5"/>
+          <p:cNvPr id="4" name="TextBox 3">
+            <a:extLst>
+              <a:ext uri="{FF2B5EF4-FFF2-40B4-BE49-F238E27FC236}">
+                <a16:creationId xmlns:a16="http://schemas.microsoft.com/office/drawing/2014/main" id="{DBA6053D-382F-40BC-A6BB-EBFF64E52C2D}"/>
+              </a:ext>
+            </a:extLst>
+          </p:cNvPr>
           <p:cNvSpPr txBox="1"/>
           <p:nvPr/>
         </p:nvSpPr>
         <p:spPr>
           <a:xfrm>
-            <a:off x="885053" y="892284"/>
-            <a:ext cx="926857" cy="303481"/>
-          </a:xfrm>
-          <a:prstGeom prst="rect">
-            <a:avLst/>
-          </a:prstGeom>
-          <a:noFill/>
-        </p:spPr>
-        <p:txBody>
-          <a:bodyPr wrap="none" rtlCol="0">
-            <a:spAutoFit/>
-          </a:bodyPr>
-          <a:lstStyle/>
-          <a:p>
-            <a:r>
-              <a:rPr lang="en-US" sz="1372" dirty="0" smtClean="0"/>
-              <a:t>Students[]</a:t>
-            </a:r>
-            <a:endParaRPr lang="en-US" sz="1372" dirty="0"/>
-          </a:p>
-        </p:txBody>
-      </p:sp>
-      <p:sp>
-        <p:nvSpPr>
-          <p:cNvPr id="7" name="TextBox 6"/>
-          <p:cNvSpPr txBox="1"/>
-          <p:nvPr/>
-        </p:nvSpPr>
-        <p:spPr>
-          <a:xfrm>
-            <a:off x="119555" y="1627265"/>
-            <a:ext cx="3384709" cy="303481"/>
-          </a:xfrm>
-          <a:prstGeom prst="rect">
-            <a:avLst/>
-          </a:prstGeom>
-          <a:noFill/>
-        </p:spPr>
-        <p:txBody>
-          <a:bodyPr wrap="none" rtlCol="0">
-            <a:spAutoFit/>
-          </a:bodyPr>
-          <a:lstStyle/>
-          <a:p>
-            <a:r>
-              <a:rPr lang="en-US" sz="1372" dirty="0" smtClean="0"/>
-              <a:t>// A component with a list of student as data</a:t>
-            </a:r>
-            <a:endParaRPr lang="en-US" sz="1372" dirty="0"/>
-          </a:p>
-        </p:txBody>
-      </p:sp>
-      <p:sp>
-        <p:nvSpPr>
-          <p:cNvPr id="8" name="TextBox 7"/>
-          <p:cNvSpPr txBox="1"/>
-          <p:nvPr/>
-        </p:nvSpPr>
-        <p:spPr>
-          <a:xfrm>
-            <a:off x="1009380" y="2556074"/>
+            <a:off x="3168379" y="479624"/>
             <a:ext cx="639919" cy="303481"/>
           </a:xfrm>
           <a:prstGeom prst="rect">
@@ -3395,14 +3299,159 @@
       </p:sp>
       <p:sp>
         <p:nvSpPr>
-          <p:cNvPr id="9" name="Rounded Rectangle 8"/>
+          <p:cNvPr id="6" name="Right Arrow 21">
+            <a:extLst>
+              <a:ext uri="{FF2B5EF4-FFF2-40B4-BE49-F238E27FC236}">
+                <a16:creationId xmlns:a16="http://schemas.microsoft.com/office/drawing/2014/main" id="{121A9F91-57E1-44B3-ABC4-46259DB9D38E}"/>
+              </a:ext>
+            </a:extLst>
+          </p:cNvPr>
           <p:cNvSpPr/>
           <p:nvPr/>
         </p:nvSpPr>
         <p:spPr>
           <a:xfrm>
-            <a:off x="523323" y="2385493"/>
-            <a:ext cx="1650319" cy="1166483"/>
+            <a:off x="4415193" y="622873"/>
+            <a:ext cx="510152" cy="253427"/>
+          </a:xfrm>
+          <a:prstGeom prst="rightArrow">
+            <a:avLst/>
+          </a:prstGeom>
+        </p:spPr>
+        <p:style>
+          <a:lnRef idx="1">
+            <a:schemeClr val="accent1"/>
+          </a:lnRef>
+          <a:fillRef idx="3">
+            <a:schemeClr val="accent1"/>
+          </a:fillRef>
+          <a:effectRef idx="2">
+            <a:schemeClr val="accent1"/>
+          </a:effectRef>
+          <a:fontRef idx="minor">
+            <a:schemeClr val="lt1"/>
+          </a:fontRef>
+        </p:style>
+        <p:txBody>
+          <a:bodyPr rot="0" spcFirstLastPara="0" vertOverflow="overflow" horzOverflow="overflow" vert="horz" wrap="square" lIns="69681" tIns="34840" rIns="69681" bIns="34840" numCol="1" spcCol="0" rtlCol="0" fromWordArt="0" anchor="ctr" anchorCtr="0" forceAA="0" compatLnSpc="1">
+            <a:prstTxWarp prst="textNoShape">
+              <a:avLst/>
+            </a:prstTxWarp>
+            <a:noAutofit/>
+          </a:bodyPr>
+          <a:lstStyle/>
+          <a:p>
+            <a:pPr algn="ctr"/>
+            <a:endParaRPr lang="en-US" sz="1372">
+              <a:ln w="0"/>
+              <a:solidFill>
+                <a:schemeClr val="accent1"/>
+              </a:solidFill>
+              <a:effectLst>
+                <a:outerShdw blurRad="38100" dist="25400" dir="5400000" algn="ctr" rotWithShape="0">
+                  <a:srgbClr val="6E747A">
+                    <a:alpha val="43000"/>
+                  </a:srgbClr>
+                </a:outerShdw>
+              </a:effectLst>
+            </a:endParaRPr>
+          </a:p>
+        </p:txBody>
+      </p:sp>
+      <p:sp>
+        <p:nvSpPr>
+          <p:cNvPr id="7" name="TextBox 6">
+            <a:extLst>
+              <a:ext uri="{FF2B5EF4-FFF2-40B4-BE49-F238E27FC236}">
+                <a16:creationId xmlns:a16="http://schemas.microsoft.com/office/drawing/2014/main" id="{4ADC46AF-9F7F-45D0-BE17-61EBAE755FBB}"/>
+              </a:ext>
+            </a:extLst>
+          </p:cNvPr>
+          <p:cNvSpPr txBox="1"/>
+          <p:nvPr/>
+        </p:nvSpPr>
+        <p:spPr>
+          <a:xfrm>
+            <a:off x="4310489" y="384918"/>
+            <a:ext cx="838756" cy="303481"/>
+          </a:xfrm>
+          <a:prstGeom prst="rect">
+            <a:avLst/>
+          </a:prstGeom>
+          <a:noFill/>
+        </p:spPr>
+        <p:txBody>
+          <a:bodyPr wrap="none" rtlCol="0">
+            <a:spAutoFit/>
+          </a:bodyPr>
+          <a:lstStyle/>
+          <a:p>
+            <a:r>
+              <a:rPr lang="en-US" sz="1372" b="1" dirty="0">
+                <a:solidFill>
+                  <a:schemeClr val="accent1"/>
+                </a:solidFill>
+              </a:rPr>
+              <a:t>PROVIDE</a:t>
+            </a:r>
+          </a:p>
+        </p:txBody>
+      </p:sp>
+      <p:sp>
+        <p:nvSpPr>
+          <p:cNvPr id="8" name="TextBox 7">
+            <a:extLst>
+              <a:ext uri="{FF2B5EF4-FFF2-40B4-BE49-F238E27FC236}">
+                <a16:creationId xmlns:a16="http://schemas.microsoft.com/office/drawing/2014/main" id="{FF499AE0-39F9-4A7E-A432-0E348C62BE45}"/>
+              </a:ext>
+            </a:extLst>
+          </p:cNvPr>
+          <p:cNvSpPr txBox="1"/>
+          <p:nvPr/>
+        </p:nvSpPr>
+        <p:spPr>
+          <a:xfrm>
+            <a:off x="5848079" y="416124"/>
+            <a:ext cx="1149674" cy="303481"/>
+          </a:xfrm>
+          <a:prstGeom prst="rect">
+            <a:avLst/>
+          </a:prstGeom>
+          <a:noFill/>
+        </p:spPr>
+        <p:txBody>
+          <a:bodyPr wrap="none" rtlCol="0">
+            <a:spAutoFit/>
+          </a:bodyPr>
+          <a:lstStyle/>
+          <a:p>
+            <a:r>
+              <a:rPr lang="en-US" sz="1372" b="1" i="1" dirty="0">
+                <a:solidFill>
+                  <a:srgbClr val="FF0000"/>
+                </a:solidFill>
+              </a:rPr>
+              <a:t>&lt;navigation&gt;</a:t>
+            </a:r>
+          </a:p>
+        </p:txBody>
+      </p:sp>
+      <p:sp>
+        <p:nvSpPr>
+          <p:cNvPr id="9" name="Rounded Rectangle 4">
+            <a:extLst>
+              <a:ext uri="{FF2B5EF4-FFF2-40B4-BE49-F238E27FC236}">
+                <a16:creationId xmlns:a16="http://schemas.microsoft.com/office/drawing/2014/main" id="{E71D95A2-4801-411B-8E13-60570F6FDEB8}"/>
+              </a:ext>
+            </a:extLst>
+          </p:cNvPr>
+          <p:cNvSpPr/>
+          <p:nvPr/>
+        </p:nvSpPr>
+        <p:spPr>
+          <a:xfrm>
+            <a:off x="5622788" y="309043"/>
+            <a:ext cx="1650319" cy="567257"/>
           </a:xfrm>
           <a:prstGeom prst="roundRect">
             <a:avLst/>
@@ -3442,136 +3491,20 @@
       </p:sp>
       <p:sp>
         <p:nvSpPr>
-          <p:cNvPr id="10" name="TextBox 9"/>
-          <p:cNvSpPr txBox="1"/>
-          <p:nvPr/>
-        </p:nvSpPr>
-        <p:spPr>
-          <a:xfrm>
-            <a:off x="885053" y="2968734"/>
-            <a:ext cx="926857" cy="303481"/>
-          </a:xfrm>
-          <a:prstGeom prst="rect">
-            <a:avLst/>
-          </a:prstGeom>
-          <a:noFill/>
-        </p:spPr>
-        <p:txBody>
-          <a:bodyPr wrap="none" rtlCol="0">
-            <a:spAutoFit/>
-          </a:bodyPr>
-          <a:lstStyle/>
-          <a:p>
-            <a:r>
-              <a:rPr lang="en-US" sz="1372" dirty="0" smtClean="0"/>
-              <a:t>Students[]</a:t>
-            </a:r>
-            <a:endParaRPr lang="en-US" sz="1372" dirty="0"/>
-          </a:p>
-        </p:txBody>
-      </p:sp>
-      <p:sp>
-        <p:nvSpPr>
-          <p:cNvPr id="11" name="TextBox 10"/>
-          <p:cNvSpPr txBox="1"/>
-          <p:nvPr/>
-        </p:nvSpPr>
-        <p:spPr>
-          <a:xfrm>
-            <a:off x="464251" y="3703715"/>
-            <a:ext cx="2183996" cy="303481"/>
-          </a:xfrm>
-          <a:prstGeom prst="rect">
-            <a:avLst/>
-          </a:prstGeom>
-          <a:noFill/>
-        </p:spPr>
-        <p:txBody>
-          <a:bodyPr wrap="none" rtlCol="0">
-            <a:spAutoFit/>
-          </a:bodyPr>
-          <a:lstStyle/>
-          <a:p>
-            <a:r>
-              <a:rPr lang="en-US" sz="1372" dirty="0" smtClean="0"/>
-              <a:t>// </a:t>
-            </a:r>
-            <a:r>
-              <a:rPr lang="en-US" sz="1372" dirty="0" smtClean="0">
-                <a:solidFill>
-                  <a:srgbClr val="FF0000"/>
-                </a:solidFill>
-              </a:rPr>
-              <a:t>app</a:t>
-            </a:r>
-            <a:r>
-              <a:rPr lang="en-US" sz="1372" dirty="0" smtClean="0"/>
-              <a:t> send student to </a:t>
-            </a:r>
-            <a:r>
-              <a:rPr lang="en-US" sz="1372" dirty="0" smtClean="0">
-                <a:solidFill>
-                  <a:srgbClr val="FF0000"/>
-                </a:solidFill>
-              </a:rPr>
-              <a:t>card </a:t>
-            </a:r>
-            <a:endParaRPr lang="en-US" sz="1372" dirty="0">
-              <a:solidFill>
-                <a:srgbClr val="FF0000"/>
-              </a:solidFill>
-            </a:endParaRPr>
-          </a:p>
-        </p:txBody>
-      </p:sp>
-      <p:sp>
-        <p:nvSpPr>
-          <p:cNvPr id="12" name="TextBox 11"/>
-          <p:cNvSpPr txBox="1"/>
-          <p:nvPr/>
-        </p:nvSpPr>
-        <p:spPr>
-          <a:xfrm>
-            <a:off x="1009380" y="4803105"/>
-            <a:ext cx="848309" cy="303481"/>
-          </a:xfrm>
-          <a:prstGeom prst="rect">
-            <a:avLst/>
-          </a:prstGeom>
-          <a:noFill/>
-        </p:spPr>
-        <p:txBody>
-          <a:bodyPr wrap="none" rtlCol="0">
-            <a:spAutoFit/>
-          </a:bodyPr>
-          <a:lstStyle/>
-          <a:p>
-            <a:r>
-              <a:rPr lang="en-US" sz="1372" b="1" i="1" dirty="0" smtClean="0">
-                <a:solidFill>
-                  <a:srgbClr val="FF0000"/>
-                </a:solidFill>
-              </a:rPr>
-              <a:t>&lt;parent&gt;</a:t>
-            </a:r>
-            <a:endParaRPr lang="en-US" sz="1372" b="1" i="1" dirty="0">
-              <a:solidFill>
-                <a:srgbClr val="FF0000"/>
-              </a:solidFill>
-            </a:endParaRPr>
-          </a:p>
-        </p:txBody>
-      </p:sp>
-      <p:sp>
-        <p:nvSpPr>
-          <p:cNvPr id="13" name="Rounded Rectangle 12"/>
+          <p:cNvPr id="10" name="Rounded Rectangle 4">
+            <a:extLst>
+              <a:ext uri="{FF2B5EF4-FFF2-40B4-BE49-F238E27FC236}">
+                <a16:creationId xmlns:a16="http://schemas.microsoft.com/office/drawing/2014/main" id="{32ADA94A-27F9-4D5A-B400-CA07138373C9}"/>
+              </a:ext>
+            </a:extLst>
+          </p:cNvPr>
           <p:cNvSpPr/>
           <p:nvPr/>
         </p:nvSpPr>
         <p:spPr>
           <a:xfrm>
-            <a:off x="523323" y="4632524"/>
-            <a:ext cx="1650319" cy="1166483"/>
+            <a:off x="2725281" y="379961"/>
+            <a:ext cx="1650319" cy="567257"/>
           </a:xfrm>
           <a:prstGeom prst="roundRect">
             <a:avLst/>
@@ -3611,14 +3544,20 @@
       </p:sp>
       <p:sp>
         <p:nvSpPr>
-          <p:cNvPr id="14" name="TextBox 13"/>
+          <p:cNvPr id="11" name="TextBox 10">
+            <a:extLst>
+              <a:ext uri="{FF2B5EF4-FFF2-40B4-BE49-F238E27FC236}">
+                <a16:creationId xmlns:a16="http://schemas.microsoft.com/office/drawing/2014/main" id="{531B3B2F-6EFB-48C8-8CF5-B2320489B760}"/>
+              </a:ext>
+            </a:extLst>
+          </p:cNvPr>
           <p:cNvSpPr txBox="1"/>
           <p:nvPr/>
         </p:nvSpPr>
         <p:spPr>
           <a:xfrm>
-            <a:off x="885053" y="5215765"/>
-            <a:ext cx="926857" cy="303481"/>
+            <a:off x="4608402" y="1488853"/>
+            <a:ext cx="1215717" cy="303481"/>
           </a:xfrm>
           <a:prstGeom prst="rect">
             <a:avLst/>
@@ -3632,77 +3571,73 @@
           <a:lstStyle/>
           <a:p>
             <a:r>
-              <a:rPr lang="en-US" sz="1372" dirty="0" smtClean="0"/>
-              <a:t>Students[]</a:t>
-            </a:r>
-            <a:endParaRPr lang="en-US" sz="1372" dirty="0"/>
-          </a:p>
-        </p:txBody>
-      </p:sp>
-      <p:sp>
-        <p:nvSpPr>
-          <p:cNvPr id="15" name="TextBox 14"/>
-          <p:cNvSpPr txBox="1"/>
-          <p:nvPr/>
-        </p:nvSpPr>
-        <p:spPr>
-          <a:xfrm>
-            <a:off x="394083" y="6064417"/>
-            <a:ext cx="3216522" cy="303481"/>
-          </a:xfrm>
-          <a:prstGeom prst="rect">
-            <a:avLst/>
-          </a:prstGeom>
-          <a:noFill/>
-        </p:spPr>
-        <p:txBody>
-          <a:bodyPr wrap="none" rtlCol="0">
-            <a:spAutoFit/>
-          </a:bodyPr>
-          <a:lstStyle/>
-          <a:p>
-            <a:r>
-              <a:rPr lang="en-US" sz="1372" dirty="0" smtClean="0"/>
-              <a:t>// </a:t>
-            </a:r>
-            <a:r>
-              <a:rPr lang="en-US" sz="1372" dirty="0" smtClean="0">
+              <a:rPr lang="en-US" sz="1372" b="1" i="1" dirty="0">
                 <a:solidFill>
                   <a:srgbClr val="FF0000"/>
                 </a:solidFill>
               </a:rPr>
-              <a:t>from</a:t>
-            </a:r>
-            <a:r>
-              <a:rPr lang="en-US" sz="1372" dirty="0" smtClean="0"/>
-              <a:t> send the event validated to </a:t>
-            </a:r>
-            <a:r>
-              <a:rPr lang="en-US" sz="1372" dirty="0" smtClean="0">
-                <a:solidFill>
-                  <a:srgbClr val="FF0000"/>
-                </a:solidFill>
-              </a:rPr>
-              <a:t>parent</a:t>
-            </a:r>
-            <a:endParaRPr lang="en-US" sz="1372" dirty="0">
-              <a:solidFill>
-                <a:srgbClr val="FF0000"/>
-              </a:solidFill>
-            </a:endParaRPr>
-          </a:p>
-        </p:txBody>
-      </p:sp>
-      <p:sp>
-        <p:nvSpPr>
-          <p:cNvPr id="17" name="Rounded Rectangle 16"/>
+              <a:t>&lt;router-view&gt;</a:t>
+            </a:r>
+          </a:p>
+        </p:txBody>
+      </p:sp>
+      <p:cxnSp>
+        <p:nvCxnSpPr>
+          <p:cNvPr id="13" name="Straight Arrow Connector 12">
+            <a:extLst>
+              <a:ext uri="{FF2B5EF4-FFF2-40B4-BE49-F238E27FC236}">
+                <a16:creationId xmlns:a16="http://schemas.microsoft.com/office/drawing/2014/main" id="{A9F3CA7B-A1E3-44DE-BFAE-D21F2647A6BA}"/>
+              </a:ext>
+            </a:extLst>
+          </p:cNvPr>
+          <p:cNvCxnSpPr>
+            <a:stCxn id="9" idx="2"/>
+          </p:cNvCxnSpPr>
+          <p:nvPr/>
+        </p:nvCxnSpPr>
+        <p:spPr>
+          <a:xfrm flipH="1">
+            <a:off x="6447947" y="876300"/>
+            <a:ext cx="1" cy="505893"/>
+          </a:xfrm>
+          <a:prstGeom prst="straightConnector1">
+            <a:avLst/>
+          </a:prstGeom>
+          <a:ln>
+            <a:tailEnd type="triangle"/>
+          </a:ln>
+        </p:spPr>
+        <p:style>
+          <a:lnRef idx="3">
+            <a:schemeClr val="accent1"/>
+          </a:lnRef>
+          <a:fillRef idx="0">
+            <a:schemeClr val="accent1"/>
+          </a:fillRef>
+          <a:effectRef idx="2">
+            <a:schemeClr val="accent1"/>
+          </a:effectRef>
+          <a:fontRef idx="minor">
+            <a:schemeClr val="tx1"/>
+          </a:fontRef>
+        </p:style>
+      </p:cxnSp>
+      <p:sp>
+        <p:nvSpPr>
+          <p:cNvPr id="15" name="Rounded Rectangle 4">
+            <a:extLst>
+              <a:ext uri="{FF2B5EF4-FFF2-40B4-BE49-F238E27FC236}">
+                <a16:creationId xmlns:a16="http://schemas.microsoft.com/office/drawing/2014/main" id="{24F74C3E-E81A-4BF3-BB56-95631F485D72}"/>
+              </a:ext>
+            </a:extLst>
+          </p:cNvPr>
           <p:cNvSpPr/>
           <p:nvPr/>
         </p:nvSpPr>
         <p:spPr>
           <a:xfrm>
-            <a:off x="3056973" y="2408786"/>
-            <a:ext cx="1650319" cy="1166483"/>
+            <a:off x="750486" y="2515647"/>
+            <a:ext cx="1650319" cy="567257"/>
           </a:xfrm>
           <a:prstGeom prst="roundRect">
             <a:avLst/>
@@ -3742,82 +3677,20 @@
       </p:sp>
       <p:sp>
         <p:nvSpPr>
-          <p:cNvPr id="18" name="TextBox 17"/>
-          <p:cNvSpPr txBox="1"/>
-          <p:nvPr/>
-        </p:nvSpPr>
-        <p:spPr>
-          <a:xfrm>
-            <a:off x="3418703" y="2992027"/>
-            <a:ext cx="926857" cy="303481"/>
-          </a:xfrm>
-          <a:prstGeom prst="rect">
-            <a:avLst/>
-          </a:prstGeom>
-          <a:noFill/>
-        </p:spPr>
-        <p:txBody>
-          <a:bodyPr wrap="none" rtlCol="0">
-            <a:spAutoFit/>
-          </a:bodyPr>
-          <a:lstStyle/>
-          <a:p>
-            <a:r>
-              <a:rPr lang="en-US" sz="1372" dirty="0" smtClean="0"/>
-              <a:t>Students[]</a:t>
-            </a:r>
-            <a:endParaRPr lang="en-US" sz="1372" dirty="0"/>
-          </a:p>
-        </p:txBody>
-      </p:sp>
-      <p:sp>
-        <p:nvSpPr>
-          <p:cNvPr id="19" name="TextBox 18"/>
-          <p:cNvSpPr txBox="1"/>
-          <p:nvPr/>
-        </p:nvSpPr>
-        <p:spPr>
-          <a:xfrm>
-            <a:off x="3666083" y="4779442"/>
-            <a:ext cx="713657" cy="303481"/>
-          </a:xfrm>
-          <a:prstGeom prst="rect">
-            <a:avLst/>
-          </a:prstGeom>
-          <a:noFill/>
-        </p:spPr>
-        <p:txBody>
-          <a:bodyPr wrap="none" rtlCol="0">
-            <a:spAutoFit/>
-          </a:bodyPr>
-          <a:lstStyle/>
-          <a:p>
-            <a:r>
-              <a:rPr lang="en-US" sz="1372" b="1" i="1" dirty="0" smtClean="0">
-                <a:solidFill>
-                  <a:srgbClr val="FF0000"/>
-                </a:solidFill>
-              </a:rPr>
-              <a:t>&lt;from&gt;</a:t>
-            </a:r>
-            <a:endParaRPr lang="en-US" sz="1372" b="1" i="1" dirty="0">
-              <a:solidFill>
-                <a:srgbClr val="FF0000"/>
-              </a:solidFill>
-            </a:endParaRPr>
-          </a:p>
-        </p:txBody>
-      </p:sp>
-      <p:sp>
-        <p:nvSpPr>
-          <p:cNvPr id="20" name="Rounded Rectangle 19"/>
+          <p:cNvPr id="16" name="Rounded Rectangle 4">
+            <a:extLst>
+              <a:ext uri="{FF2B5EF4-FFF2-40B4-BE49-F238E27FC236}">
+                <a16:creationId xmlns:a16="http://schemas.microsoft.com/office/drawing/2014/main" id="{92551659-18A6-4CEA-BAEC-32546F63453A}"/>
+              </a:ext>
+            </a:extLst>
+          </p:cNvPr>
           <p:cNvSpPr/>
           <p:nvPr/>
         </p:nvSpPr>
         <p:spPr>
           <a:xfrm>
-            <a:off x="3180026" y="4608861"/>
-            <a:ext cx="1650319" cy="1166483"/>
+            <a:off x="3141884" y="2515646"/>
+            <a:ext cx="1650319" cy="567257"/>
           </a:xfrm>
           <a:prstGeom prst="roundRect">
             <a:avLst/>
@@ -3857,51 +3730,31 @@
       </p:sp>
       <p:sp>
         <p:nvSpPr>
-          <p:cNvPr id="21" name="TextBox 20"/>
-          <p:cNvSpPr txBox="1"/>
-          <p:nvPr/>
-        </p:nvSpPr>
-        <p:spPr>
-          <a:xfrm>
-            <a:off x="3541756" y="5192102"/>
-            <a:ext cx="926857" cy="303481"/>
-          </a:xfrm>
-          <a:prstGeom prst="rect">
+          <p:cNvPr id="17" name="Rounded Rectangle 4">
+            <a:extLst>
+              <a:ext uri="{FF2B5EF4-FFF2-40B4-BE49-F238E27FC236}">
+                <a16:creationId xmlns:a16="http://schemas.microsoft.com/office/drawing/2014/main" id="{C388B1B6-B3C4-45E4-B133-66DD735B3F88}"/>
+              </a:ext>
+            </a:extLst>
+          </p:cNvPr>
+          <p:cNvSpPr/>
+          <p:nvPr/>
+        </p:nvSpPr>
+        <p:spPr>
+          <a:xfrm>
+            <a:off x="5514194" y="2515661"/>
+            <a:ext cx="1650319" cy="567257"/>
+          </a:xfrm>
+          <a:prstGeom prst="roundRect">
             <a:avLst/>
           </a:prstGeom>
           <a:noFill/>
-        </p:spPr>
-        <p:txBody>
-          <a:bodyPr wrap="none" rtlCol="0">
-            <a:spAutoFit/>
-          </a:bodyPr>
-          <a:lstStyle/>
-          <a:p>
-            <a:r>
-              <a:rPr lang="en-US" sz="1372" dirty="0" smtClean="0"/>
-              <a:t>Students[]</a:t>
-            </a:r>
-            <a:endParaRPr lang="en-US" sz="1372" dirty="0"/>
-          </a:p>
-        </p:txBody>
-      </p:sp>
-      <p:sp>
-        <p:nvSpPr>
-          <p:cNvPr id="22" name="Right Arrow 21"/>
-          <p:cNvSpPr/>
-          <p:nvPr/>
-        </p:nvSpPr>
-        <p:spPr>
-          <a:xfrm>
-            <a:off x="2197551" y="2768367"/>
-            <a:ext cx="696809" cy="333683"/>
-          </a:xfrm>
-          <a:prstGeom prst="rightArrow">
-            <a:avLst/>
-          </a:prstGeom>
-          <a:solidFill>
-            <a:schemeClr val="accent6"/>
-          </a:solidFill>
+          <a:ln>
+            <a:solidFill>
+              <a:srgbClr val="FF0000"/>
+            </a:solidFill>
+            <a:prstDash val="lgDash"/>
+          </a:ln>
         </p:spPr>
         <p:style>
           <a:lnRef idx="2">
@@ -3920,12 +3773,7 @@
           </a:fontRef>
         </p:style>
         <p:txBody>
-          <a:bodyPr rot="0" spcFirstLastPara="0" vertOverflow="overflow" horzOverflow="overflow" vert="horz" wrap="square" lIns="69681" tIns="34840" rIns="69681" bIns="34840" numCol="1" spcCol="0" rtlCol="0" fromWordArt="0" anchor="ctr" anchorCtr="0" forceAA="0" compatLnSpc="1">
-            <a:prstTxWarp prst="textNoShape">
-              <a:avLst/>
-            </a:prstTxWarp>
-            <a:noAutofit/>
-          </a:bodyPr>
+          <a:bodyPr rtlCol="0" anchor="ctr"/>
           <a:lstStyle/>
           <a:p>
             <a:pPr algn="ctr"/>
@@ -3935,127 +3783,31 @@
       </p:sp>
       <p:sp>
         <p:nvSpPr>
-          <p:cNvPr id="23" name="TextBox 22"/>
-          <p:cNvSpPr txBox="1"/>
-          <p:nvPr/>
-        </p:nvSpPr>
-        <p:spPr>
-          <a:xfrm>
-            <a:off x="2156606" y="3120474"/>
-            <a:ext cx="735714" cy="303481"/>
-          </a:xfrm>
-          <a:prstGeom prst="rect">
+          <p:cNvPr id="18" name="Rounded Rectangle 4">
+            <a:extLst>
+              <a:ext uri="{FF2B5EF4-FFF2-40B4-BE49-F238E27FC236}">
+                <a16:creationId xmlns:a16="http://schemas.microsoft.com/office/drawing/2014/main" id="{0C2D0C7D-E6B3-4F86-AC17-70EEC176BB95}"/>
+              </a:ext>
+            </a:extLst>
+          </p:cNvPr>
+          <p:cNvSpPr/>
+          <p:nvPr/>
+        </p:nvSpPr>
+        <p:spPr>
+          <a:xfrm>
+            <a:off x="7803395" y="2515646"/>
+            <a:ext cx="1650319" cy="567257"/>
+          </a:xfrm>
+          <a:prstGeom prst="roundRect">
             <a:avLst/>
           </a:prstGeom>
           <a:noFill/>
-        </p:spPr>
-        <p:txBody>
-          <a:bodyPr wrap="none" rtlCol="0">
-            <a:spAutoFit/>
-          </a:bodyPr>
-          <a:lstStyle/>
-          <a:p>
-            <a:r>
-              <a:rPr lang="en-US" sz="1372" dirty="0" smtClean="0"/>
-              <a:t>student</a:t>
-            </a:r>
-            <a:endParaRPr lang="en-US" sz="1372" dirty="0"/>
-          </a:p>
-        </p:txBody>
-      </p:sp>
-      <p:sp>
-        <p:nvSpPr>
-          <p:cNvPr id="24" name="TextBox 23"/>
-          <p:cNvSpPr txBox="1"/>
-          <p:nvPr/>
-        </p:nvSpPr>
-        <p:spPr>
-          <a:xfrm>
-            <a:off x="2188492" y="2550268"/>
-            <a:ext cx="670248" cy="303481"/>
-          </a:xfrm>
-          <a:prstGeom prst="rect">
-            <a:avLst/>
-          </a:prstGeom>
-          <a:noFill/>
-        </p:spPr>
-        <p:txBody>
-          <a:bodyPr wrap="none" rtlCol="0">
-            <a:spAutoFit/>
-          </a:bodyPr>
-          <a:lstStyle/>
-          <a:p>
-            <a:r>
-              <a:rPr lang="en-US" sz="1372" b="1" dirty="0" smtClean="0">
-                <a:solidFill>
-                  <a:schemeClr val="accent6"/>
-                </a:solidFill>
-              </a:rPr>
-              <a:t>PROPS</a:t>
-            </a:r>
-            <a:endParaRPr lang="en-US" sz="1372" b="1" dirty="0">
-              <a:solidFill>
-                <a:schemeClr val="accent6"/>
-              </a:solidFill>
-            </a:endParaRPr>
-          </a:p>
-        </p:txBody>
-      </p:sp>
-      <p:sp>
-        <p:nvSpPr>
-          <p:cNvPr id="25" name="TextBox 24"/>
-          <p:cNvSpPr txBox="1"/>
-          <p:nvPr/>
-        </p:nvSpPr>
-        <p:spPr>
-          <a:xfrm>
-            <a:off x="3562171" y="2587817"/>
-            <a:ext cx="680251" cy="303481"/>
-          </a:xfrm>
-          <a:prstGeom prst="rect">
-            <a:avLst/>
-          </a:prstGeom>
-          <a:noFill/>
-        </p:spPr>
-        <p:txBody>
-          <a:bodyPr wrap="none" rtlCol="0">
-            <a:spAutoFit/>
-          </a:bodyPr>
-          <a:lstStyle/>
-          <a:p>
-            <a:r>
-              <a:rPr lang="en-US" sz="1372" b="1" i="1" dirty="0" smtClean="0">
-                <a:solidFill>
-                  <a:srgbClr val="FF0000"/>
-                </a:solidFill>
-              </a:rPr>
-              <a:t>&lt;card&gt;</a:t>
-            </a:r>
-            <a:endParaRPr lang="en-US" sz="1372" b="1" i="1" dirty="0">
-              <a:solidFill>
-                <a:srgbClr val="FF0000"/>
-              </a:solidFill>
-            </a:endParaRPr>
-          </a:p>
-        </p:txBody>
-      </p:sp>
-      <p:sp>
-        <p:nvSpPr>
-          <p:cNvPr id="26" name="Right Arrow 25"/>
-          <p:cNvSpPr/>
-          <p:nvPr/>
-        </p:nvSpPr>
-        <p:spPr>
-          <a:xfrm flipH="1">
-            <a:off x="2387600" y="5000637"/>
-            <a:ext cx="792424" cy="400041"/>
-          </a:xfrm>
-          <a:prstGeom prst="rightArrow">
-            <a:avLst/>
-          </a:prstGeom>
-          <a:solidFill>
-            <a:srgbClr val="FF0000"/>
-          </a:solidFill>
+          <a:ln>
+            <a:solidFill>
+              <a:srgbClr val="FF0000"/>
+            </a:solidFill>
+            <a:prstDash val="lgDash"/>
+          </a:ln>
         </p:spPr>
         <p:style>
           <a:lnRef idx="2">
@@ -4074,12 +3826,7 @@
           </a:fontRef>
         </p:style>
         <p:txBody>
-          <a:bodyPr rot="0" spcFirstLastPara="0" vertOverflow="overflow" horzOverflow="overflow" vert="horz" wrap="square" lIns="69681" tIns="34840" rIns="69681" bIns="34840" numCol="1" spcCol="0" rtlCol="0" fromWordArt="0" anchor="ctr" anchorCtr="0" forceAA="0" compatLnSpc="1">
-            <a:prstTxWarp prst="textNoShape">
-              <a:avLst/>
-            </a:prstTxWarp>
-            <a:noAutofit/>
-          </a:bodyPr>
+          <a:bodyPr rtlCol="0" anchor="ctr"/>
           <a:lstStyle/>
           <a:p>
             <a:pPr algn="ctr"/>
@@ -4087,97 +3834,41 @@
           </a:p>
         </p:txBody>
       </p:sp>
-      <p:sp>
-        <p:nvSpPr>
-          <p:cNvPr id="27" name="TextBox 26"/>
-          <p:cNvSpPr txBox="1"/>
-          <p:nvPr/>
-        </p:nvSpPr>
-        <p:spPr>
-          <a:xfrm>
-            <a:off x="2523616" y="5336639"/>
-            <a:ext cx="701474" cy="303481"/>
-          </a:xfrm>
-          <a:prstGeom prst="rect">
-            <a:avLst/>
-          </a:prstGeom>
-          <a:noFill/>
-        </p:spPr>
-        <p:txBody>
-          <a:bodyPr wrap="none" rtlCol="0">
-            <a:spAutoFit/>
-          </a:bodyPr>
-          <a:lstStyle/>
-          <a:p>
-            <a:r>
-              <a:rPr lang="en-US" sz="1372" dirty="0" err="1" smtClean="0"/>
-              <a:t>valided</a:t>
-            </a:r>
-            <a:endParaRPr lang="en-US" sz="1372" dirty="0"/>
-          </a:p>
-        </p:txBody>
-      </p:sp>
-      <p:sp>
-        <p:nvSpPr>
-          <p:cNvPr id="28" name="TextBox 27"/>
-          <p:cNvSpPr txBox="1"/>
-          <p:nvPr/>
-        </p:nvSpPr>
-        <p:spPr>
-          <a:xfrm>
-            <a:off x="2574806" y="4621286"/>
-            <a:ext cx="558166" cy="303481"/>
-          </a:xfrm>
-          <a:prstGeom prst="rect">
-            <a:avLst/>
-          </a:prstGeom>
-          <a:noFill/>
-        </p:spPr>
-        <p:txBody>
-          <a:bodyPr wrap="none" rtlCol="0">
-            <a:spAutoFit/>
-          </a:bodyPr>
-          <a:lstStyle/>
-          <a:p>
-            <a:r>
-              <a:rPr lang="en-US" sz="1372" b="1" dirty="0" smtClean="0">
-                <a:solidFill>
-                  <a:srgbClr val="FF0000"/>
-                </a:solidFill>
-              </a:rPr>
-              <a:t>EMIT</a:t>
-            </a:r>
-            <a:endParaRPr lang="en-US" sz="1372" b="1" dirty="0">
-              <a:solidFill>
-                <a:srgbClr val="FF0000"/>
-              </a:solidFill>
-            </a:endParaRPr>
-          </a:p>
-        </p:txBody>
-      </p:sp>
       <p:cxnSp>
         <p:nvCxnSpPr>
-          <p:cNvPr id="30" name="Straight Connector 29"/>
-          <p:cNvCxnSpPr/>
+          <p:cNvPr id="19" name="Straight Arrow Connector 18">
+            <a:extLst>
+              <a:ext uri="{FF2B5EF4-FFF2-40B4-BE49-F238E27FC236}">
+                <a16:creationId xmlns:a16="http://schemas.microsoft.com/office/drawing/2014/main" id="{17BF3FC2-2886-4EDE-A3E2-BCC76291DAE6}"/>
+              </a:ext>
+            </a:extLst>
+          </p:cNvPr>
+          <p:cNvCxnSpPr>
+            <a:cxnSpLocks/>
+            <a:endCxn id="18" idx="0"/>
+          </p:cNvCxnSpPr>
           <p:nvPr/>
         </p:nvCxnSpPr>
         <p:spPr>
           <a:xfrm>
-            <a:off x="5733143" y="0"/>
-            <a:ext cx="29028" cy="6858000"/>
-          </a:xfrm>
-          <a:prstGeom prst="line">
-            <a:avLst/>
-          </a:prstGeom>
+            <a:off x="8628553" y="1949450"/>
+            <a:ext cx="2" cy="566196"/>
+          </a:xfrm>
+          <a:prstGeom prst="straightConnector1">
+            <a:avLst/>
+          </a:prstGeom>
+          <a:ln>
+            <a:tailEnd type="triangle"/>
+          </a:ln>
         </p:spPr>
         <p:style>
-          <a:lnRef idx="1">
+          <a:lnRef idx="3">
             <a:schemeClr val="accent1"/>
           </a:lnRef>
           <a:fillRef idx="0">
             <a:schemeClr val="accent1"/>
           </a:fillRef>
-          <a:effectRef idx="0">
+          <a:effectRef idx="2">
             <a:schemeClr val="accent1"/>
           </a:effectRef>
           <a:fontRef idx="minor">
@@ -4185,16 +3876,304 @@
           </a:fontRef>
         </p:style>
       </p:cxnSp>
-      <p:sp>
-        <p:nvSpPr>
-          <p:cNvPr id="31" name="TextBox 30"/>
+      <p:cxnSp>
+        <p:nvCxnSpPr>
+          <p:cNvPr id="20" name="Straight Arrow Connector 19">
+            <a:extLst>
+              <a:ext uri="{FF2B5EF4-FFF2-40B4-BE49-F238E27FC236}">
+                <a16:creationId xmlns:a16="http://schemas.microsoft.com/office/drawing/2014/main" id="{54443EAC-AC99-4A8C-BE0D-9EF2E75C496D}"/>
+              </a:ext>
+            </a:extLst>
+          </p:cNvPr>
+          <p:cNvCxnSpPr>
+            <a:cxnSpLocks/>
+            <a:endCxn id="17" idx="0"/>
+          </p:cNvCxnSpPr>
+          <p:nvPr/>
+        </p:nvCxnSpPr>
+        <p:spPr>
+          <a:xfrm>
+            <a:off x="6339354" y="1949450"/>
+            <a:ext cx="0" cy="566211"/>
+          </a:xfrm>
+          <a:prstGeom prst="straightConnector1">
+            <a:avLst/>
+          </a:prstGeom>
+          <a:ln>
+            <a:tailEnd type="triangle"/>
+          </a:ln>
+        </p:spPr>
+        <p:style>
+          <a:lnRef idx="3">
+            <a:schemeClr val="accent1"/>
+          </a:lnRef>
+          <a:fillRef idx="0">
+            <a:schemeClr val="accent1"/>
+          </a:fillRef>
+          <a:effectRef idx="2">
+            <a:schemeClr val="accent1"/>
+          </a:effectRef>
+          <a:fontRef idx="minor">
+            <a:schemeClr val="tx1"/>
+          </a:fontRef>
+        </p:style>
+      </p:cxnSp>
+      <p:cxnSp>
+        <p:nvCxnSpPr>
+          <p:cNvPr id="21" name="Straight Arrow Connector 20">
+            <a:extLst>
+              <a:ext uri="{FF2B5EF4-FFF2-40B4-BE49-F238E27FC236}">
+                <a16:creationId xmlns:a16="http://schemas.microsoft.com/office/drawing/2014/main" id="{0776B727-2BD6-49DE-8499-0539D693556B}"/>
+              </a:ext>
+            </a:extLst>
+          </p:cNvPr>
+          <p:cNvCxnSpPr>
+            <a:cxnSpLocks/>
+            <a:endCxn id="16" idx="0"/>
+          </p:cNvCxnSpPr>
+          <p:nvPr/>
+        </p:nvCxnSpPr>
+        <p:spPr>
+          <a:xfrm>
+            <a:off x="3967044" y="1949450"/>
+            <a:ext cx="0" cy="566196"/>
+          </a:xfrm>
+          <a:prstGeom prst="straightConnector1">
+            <a:avLst/>
+          </a:prstGeom>
+          <a:ln>
+            <a:tailEnd type="triangle"/>
+          </a:ln>
+        </p:spPr>
+        <p:style>
+          <a:lnRef idx="3">
+            <a:schemeClr val="accent1"/>
+          </a:lnRef>
+          <a:fillRef idx="0">
+            <a:schemeClr val="accent1"/>
+          </a:fillRef>
+          <a:effectRef idx="2">
+            <a:schemeClr val="accent1"/>
+          </a:effectRef>
+          <a:fontRef idx="minor">
+            <a:schemeClr val="tx1"/>
+          </a:fontRef>
+        </p:style>
+      </p:cxnSp>
+      <p:cxnSp>
+        <p:nvCxnSpPr>
+          <p:cNvPr id="22" name="Straight Arrow Connector 21">
+            <a:extLst>
+              <a:ext uri="{FF2B5EF4-FFF2-40B4-BE49-F238E27FC236}">
+                <a16:creationId xmlns:a16="http://schemas.microsoft.com/office/drawing/2014/main" id="{7E2AA6A5-B313-47B1-9D08-9ACD91D7D977}"/>
+              </a:ext>
+            </a:extLst>
+          </p:cNvPr>
+          <p:cNvCxnSpPr>
+            <a:cxnSpLocks/>
+            <a:endCxn id="15" idx="0"/>
+          </p:cNvCxnSpPr>
+          <p:nvPr/>
+        </p:nvCxnSpPr>
+        <p:spPr>
+          <a:xfrm>
+            <a:off x="1575646" y="1949450"/>
+            <a:ext cx="0" cy="566197"/>
+          </a:xfrm>
+          <a:prstGeom prst="straightConnector1">
+            <a:avLst/>
+          </a:prstGeom>
+          <a:ln>
+            <a:tailEnd type="triangle"/>
+          </a:ln>
+        </p:spPr>
+        <p:style>
+          <a:lnRef idx="3">
+            <a:schemeClr val="accent1"/>
+          </a:lnRef>
+          <a:fillRef idx="0">
+            <a:schemeClr val="accent1"/>
+          </a:fillRef>
+          <a:effectRef idx="2">
+            <a:schemeClr val="accent1"/>
+          </a:effectRef>
+          <a:fontRef idx="minor">
+            <a:schemeClr val="tx1"/>
+          </a:fontRef>
+        </p:style>
+      </p:cxnSp>
+      <p:sp>
+        <p:nvSpPr>
+          <p:cNvPr id="39" name="TextBox 38">
+            <a:extLst>
+              <a:ext uri="{FF2B5EF4-FFF2-40B4-BE49-F238E27FC236}">
+                <a16:creationId xmlns:a16="http://schemas.microsoft.com/office/drawing/2014/main" id="{E5048BB6-E8DC-407B-9D6C-BEB8032C986B}"/>
+              </a:ext>
+            </a:extLst>
+          </p:cNvPr>
           <p:cNvSpPr txBox="1"/>
           <p:nvPr/>
         </p:nvSpPr>
         <p:spPr>
           <a:xfrm>
-            <a:off x="6720447" y="481416"/>
-            <a:ext cx="639919" cy="303481"/>
+            <a:off x="1555608" y="2105087"/>
+            <a:ext cx="675185" cy="303481"/>
+          </a:xfrm>
+          <a:prstGeom prst="rect">
+            <a:avLst/>
+          </a:prstGeom>
+          <a:noFill/>
+        </p:spPr>
+        <p:txBody>
+          <a:bodyPr wrap="none" rtlCol="0">
+            <a:spAutoFit/>
+          </a:bodyPr>
+          <a:lstStyle/>
+          <a:p>
+            <a:r>
+              <a:rPr lang="en-US" sz="1372" b="1" i="1" dirty="0">
+                <a:solidFill>
+                  <a:schemeClr val="accent1"/>
+                </a:solidFill>
+              </a:rPr>
+              <a:t>/home</a:t>
+            </a:r>
+          </a:p>
+        </p:txBody>
+      </p:sp>
+      <p:sp>
+        <p:nvSpPr>
+          <p:cNvPr id="40" name="TextBox 39">
+            <a:extLst>
+              <a:ext uri="{FF2B5EF4-FFF2-40B4-BE49-F238E27FC236}">
+                <a16:creationId xmlns:a16="http://schemas.microsoft.com/office/drawing/2014/main" id="{5E74C44A-27F5-4028-B52B-EAA7DA1B474A}"/>
+              </a:ext>
+            </a:extLst>
+          </p:cNvPr>
+          <p:cNvSpPr txBox="1"/>
+          <p:nvPr/>
+        </p:nvSpPr>
+        <p:spPr>
+          <a:xfrm>
+            <a:off x="3923993" y="2080807"/>
+            <a:ext cx="945067" cy="303481"/>
+          </a:xfrm>
+          <a:prstGeom prst="rect">
+            <a:avLst/>
+          </a:prstGeom>
+          <a:noFill/>
+        </p:spPr>
+        <p:txBody>
+          <a:bodyPr wrap="none" rtlCol="0">
+            <a:spAutoFit/>
+          </a:bodyPr>
+          <a:lstStyle/>
+          <a:p>
+            <a:r>
+              <a:rPr lang="en-US" sz="1372" b="1" i="1" dirty="0">
+                <a:solidFill>
+                  <a:schemeClr val="accent1"/>
+                </a:solidFill>
+              </a:rPr>
+              <a:t>/my-event</a:t>
+            </a:r>
+          </a:p>
+        </p:txBody>
+      </p:sp>
+      <p:sp>
+        <p:nvSpPr>
+          <p:cNvPr id="41" name="TextBox 40">
+            <a:extLst>
+              <a:ext uri="{FF2B5EF4-FFF2-40B4-BE49-F238E27FC236}">
+                <a16:creationId xmlns:a16="http://schemas.microsoft.com/office/drawing/2014/main" id="{3E8C73EC-EE09-4455-A690-B2F0CD452C1A}"/>
+              </a:ext>
+            </a:extLst>
+          </p:cNvPr>
+          <p:cNvSpPr txBox="1"/>
+          <p:nvPr/>
+        </p:nvSpPr>
+        <p:spPr>
+          <a:xfrm>
+            <a:off x="6283078" y="2109904"/>
+            <a:ext cx="715260" cy="303481"/>
+          </a:xfrm>
+          <a:prstGeom prst="rect">
+            <a:avLst/>
+          </a:prstGeom>
+          <a:noFill/>
+        </p:spPr>
+        <p:txBody>
+          <a:bodyPr wrap="none" rtlCol="0">
+            <a:spAutoFit/>
+          </a:bodyPr>
+          <a:lstStyle/>
+          <a:p>
+            <a:r>
+              <a:rPr lang="en-US" sz="1372" b="1" i="1" dirty="0">
+                <a:solidFill>
+                  <a:schemeClr val="accent1"/>
+                </a:solidFill>
+              </a:rPr>
+              <a:t>/joined</a:t>
+            </a:r>
+          </a:p>
+        </p:txBody>
+      </p:sp>
+      <p:sp>
+        <p:nvSpPr>
+          <p:cNvPr id="42" name="TextBox 41">
+            <a:extLst>
+              <a:ext uri="{FF2B5EF4-FFF2-40B4-BE49-F238E27FC236}">
+                <a16:creationId xmlns:a16="http://schemas.microsoft.com/office/drawing/2014/main" id="{EF6B2926-AB1F-4CC1-B4FA-E23691624064}"/>
+              </a:ext>
+            </a:extLst>
+          </p:cNvPr>
+          <p:cNvSpPr txBox="1"/>
+          <p:nvPr/>
+        </p:nvSpPr>
+        <p:spPr>
+          <a:xfrm>
+            <a:off x="8587656" y="2080277"/>
+            <a:ext cx="899926" cy="303481"/>
+          </a:xfrm>
+          <a:prstGeom prst="rect">
+            <a:avLst/>
+          </a:prstGeom>
+          <a:noFill/>
+        </p:spPr>
+        <p:txBody>
+          <a:bodyPr wrap="none" rtlCol="0">
+            <a:spAutoFit/>
+          </a:bodyPr>
+          <a:lstStyle/>
+          <a:p>
+            <a:r>
+              <a:rPr lang="en-US" sz="1372" b="1" i="1" dirty="0">
+                <a:solidFill>
+                  <a:schemeClr val="accent1"/>
+                </a:solidFill>
+              </a:rPr>
+              <a:t>/category</a:t>
+            </a:r>
+          </a:p>
+        </p:txBody>
+      </p:sp>
+      <p:sp>
+        <p:nvSpPr>
+          <p:cNvPr id="43" name="TextBox 42">
+            <a:extLst>
+              <a:ext uri="{FF2B5EF4-FFF2-40B4-BE49-F238E27FC236}">
+                <a16:creationId xmlns:a16="http://schemas.microsoft.com/office/drawing/2014/main" id="{2EB0045F-7BFB-4DDC-9F7E-1CCDE44CA8F6}"/>
+              </a:ext>
+            </a:extLst>
+          </p:cNvPr>
+          <p:cNvSpPr txBox="1"/>
+          <p:nvPr/>
+        </p:nvSpPr>
+        <p:spPr>
+          <a:xfrm>
+            <a:off x="995930" y="2643243"/>
+            <a:ext cx="1172372" cy="303481"/>
           </a:xfrm>
           <a:prstGeom prst="rect">
             <a:avLst/>
@@ -4213,21 +4192,144 @@
                   <a:srgbClr val="FF0000"/>
                 </a:solidFill>
               </a:rPr>
-              <a:t>&lt;app&gt;</a:t>
-            </a:r>
-          </a:p>
-        </p:txBody>
-      </p:sp>
-      <p:sp>
-        <p:nvSpPr>
-          <p:cNvPr id="32" name="Rounded Rectangle 31"/>
+              <a:t>&lt;home-view&gt;</a:t>
+            </a:r>
+          </a:p>
+        </p:txBody>
+      </p:sp>
+      <p:sp>
+        <p:nvSpPr>
+          <p:cNvPr id="44" name="TextBox 43">
+            <a:extLst>
+              <a:ext uri="{FF2B5EF4-FFF2-40B4-BE49-F238E27FC236}">
+                <a16:creationId xmlns:a16="http://schemas.microsoft.com/office/drawing/2014/main" id="{A7572E00-979E-4139-825C-B8D55B15DEB6}"/>
+              </a:ext>
+            </a:extLst>
+          </p:cNvPr>
+          <p:cNvSpPr txBox="1"/>
+          <p:nvPr/>
+        </p:nvSpPr>
+        <p:spPr>
+          <a:xfrm>
+            <a:off x="3298669" y="2643244"/>
+            <a:ext cx="1442254" cy="303481"/>
+          </a:xfrm>
+          <a:prstGeom prst="rect">
+            <a:avLst/>
+          </a:prstGeom>
+          <a:noFill/>
+        </p:spPr>
+        <p:txBody>
+          <a:bodyPr wrap="none" rtlCol="0">
+            <a:spAutoFit/>
+          </a:bodyPr>
+          <a:lstStyle/>
+          <a:p>
+            <a:r>
+              <a:rPr lang="en-US" sz="1372" b="1" i="1" dirty="0">
+                <a:solidFill>
+                  <a:srgbClr val="FF0000"/>
+                </a:solidFill>
+              </a:rPr>
+              <a:t>&lt;my-event-view&gt;</a:t>
+            </a:r>
+          </a:p>
+        </p:txBody>
+      </p:sp>
+      <p:sp>
+        <p:nvSpPr>
+          <p:cNvPr id="45" name="TextBox 44">
+            <a:extLst>
+              <a:ext uri="{FF2B5EF4-FFF2-40B4-BE49-F238E27FC236}">
+                <a16:creationId xmlns:a16="http://schemas.microsoft.com/office/drawing/2014/main" id="{EE2B83B0-0F95-4CA2-BD00-F34ABD209B3D}"/>
+              </a:ext>
+            </a:extLst>
+          </p:cNvPr>
+          <p:cNvSpPr txBox="1"/>
+          <p:nvPr/>
+        </p:nvSpPr>
+        <p:spPr>
+          <a:xfrm>
+            <a:off x="5725396" y="2617937"/>
+            <a:ext cx="1212448" cy="303481"/>
+          </a:xfrm>
+          <a:prstGeom prst="rect">
+            <a:avLst/>
+          </a:prstGeom>
+          <a:noFill/>
+        </p:spPr>
+        <p:txBody>
+          <a:bodyPr wrap="none" rtlCol="0">
+            <a:spAutoFit/>
+          </a:bodyPr>
+          <a:lstStyle/>
+          <a:p>
+            <a:r>
+              <a:rPr lang="en-US" sz="1372" b="1" i="1" dirty="0">
+                <a:solidFill>
+                  <a:srgbClr val="FF0000"/>
+                </a:solidFill>
+              </a:rPr>
+              <a:t>&lt;joined-view&gt;</a:t>
+            </a:r>
+          </a:p>
+        </p:txBody>
+      </p:sp>
+      <p:sp>
+        <p:nvSpPr>
+          <p:cNvPr id="46" name="TextBox 45">
+            <a:extLst>
+              <a:ext uri="{FF2B5EF4-FFF2-40B4-BE49-F238E27FC236}">
+                <a16:creationId xmlns:a16="http://schemas.microsoft.com/office/drawing/2014/main" id="{48BEA699-E283-4BE4-8BF2-A929BBCA8650}"/>
+              </a:ext>
+            </a:extLst>
+          </p:cNvPr>
+          <p:cNvSpPr txBox="1"/>
+          <p:nvPr/>
+        </p:nvSpPr>
+        <p:spPr>
+          <a:xfrm>
+            <a:off x="7978867" y="2617936"/>
+            <a:ext cx="1401409" cy="303481"/>
+          </a:xfrm>
+          <a:prstGeom prst="rect">
+            <a:avLst/>
+          </a:prstGeom>
+          <a:noFill/>
+        </p:spPr>
+        <p:txBody>
+          <a:bodyPr wrap="none" rtlCol="0">
+            <a:spAutoFit/>
+          </a:bodyPr>
+          <a:lstStyle/>
+          <a:p>
+            <a:r>
+              <a:rPr lang="en-US" sz="1372" b="1" i="1" dirty="0">
+                <a:solidFill>
+                  <a:srgbClr val="FF0000"/>
+                </a:solidFill>
+              </a:rPr>
+              <a:t>&lt;category-view&gt;</a:t>
+            </a:r>
+          </a:p>
+        </p:txBody>
+      </p:sp>
+      <p:sp>
+        <p:nvSpPr>
+          <p:cNvPr id="47" name="Rounded Rectangle 4">
+            <a:extLst>
+              <a:ext uri="{FF2B5EF4-FFF2-40B4-BE49-F238E27FC236}">
+                <a16:creationId xmlns:a16="http://schemas.microsoft.com/office/drawing/2014/main" id="{EBFFA4EA-0E62-44A3-9ABF-4B3D4389B183}"/>
+              </a:ext>
+            </a:extLst>
+          </p:cNvPr>
           <p:cNvSpPr/>
           <p:nvPr/>
         </p:nvSpPr>
         <p:spPr>
           <a:xfrm>
-            <a:off x="6234390" y="310835"/>
-            <a:ext cx="1650319" cy="1166483"/>
+            <a:off x="750486" y="3766133"/>
+            <a:ext cx="1650319" cy="567257"/>
           </a:xfrm>
           <a:prstGeom prst="roundRect">
             <a:avLst/>
@@ -4267,90 +4369,20 @@
       </p:sp>
       <p:sp>
         <p:nvSpPr>
-          <p:cNvPr id="33" name="TextBox 32"/>
-          <p:cNvSpPr txBox="1"/>
-          <p:nvPr/>
-        </p:nvSpPr>
-        <p:spPr>
-          <a:xfrm>
-            <a:off x="6596120" y="894076"/>
-            <a:ext cx="926857" cy="303481"/>
-          </a:xfrm>
-          <a:prstGeom prst="rect">
-            <a:avLst/>
-          </a:prstGeom>
-          <a:noFill/>
-        </p:spPr>
-        <p:txBody>
-          <a:bodyPr wrap="none" rtlCol="0">
-            <a:spAutoFit/>
-          </a:bodyPr>
-          <a:lstStyle/>
-          <a:p>
-            <a:r>
-              <a:rPr lang="en-US" sz="1372" dirty="0" smtClean="0"/>
-              <a:t>Students[]</a:t>
-            </a:r>
-            <a:endParaRPr lang="en-US" sz="1372" dirty="0"/>
-          </a:p>
-        </p:txBody>
-      </p:sp>
-      <p:sp>
-        <p:nvSpPr>
-          <p:cNvPr id="34" name="TextBox 33"/>
-          <p:cNvSpPr txBox="1"/>
-          <p:nvPr/>
-        </p:nvSpPr>
-        <p:spPr>
-          <a:xfrm>
-            <a:off x="6234390" y="1613780"/>
-            <a:ext cx="2858411" cy="303481"/>
-          </a:xfrm>
-          <a:prstGeom prst="rect">
-            <a:avLst/>
-          </a:prstGeom>
-          <a:noFill/>
-        </p:spPr>
-        <p:txBody>
-          <a:bodyPr wrap="none" rtlCol="0">
-            <a:spAutoFit/>
-          </a:bodyPr>
-          <a:lstStyle/>
-          <a:p>
-            <a:r>
-              <a:rPr lang="en-US" sz="1372" dirty="0" smtClean="0"/>
-              <a:t>// </a:t>
-            </a:r>
-            <a:r>
-              <a:rPr lang="en-US" sz="1372" dirty="0" smtClean="0">
-                <a:solidFill>
-                  <a:srgbClr val="FF0000"/>
-                </a:solidFill>
-              </a:rPr>
-              <a:t>app</a:t>
-            </a:r>
-            <a:r>
-              <a:rPr lang="en-US" sz="1372" dirty="0" smtClean="0"/>
-              <a:t>  provides students to anymore</a:t>
-            </a:r>
-            <a:endParaRPr lang="en-US" sz="1372" dirty="0">
-              <a:solidFill>
-                <a:srgbClr val="FF0000"/>
-              </a:solidFill>
-            </a:endParaRPr>
-          </a:p>
-        </p:txBody>
-      </p:sp>
-      <p:sp>
-        <p:nvSpPr>
-          <p:cNvPr id="35" name="Rounded Rectangle 34"/>
+          <p:cNvPr id="48" name="Rounded Rectangle 4">
+            <a:extLst>
+              <a:ext uri="{FF2B5EF4-FFF2-40B4-BE49-F238E27FC236}">
+                <a16:creationId xmlns:a16="http://schemas.microsoft.com/office/drawing/2014/main" id="{9718C553-4775-488F-9C9D-B549D1E707A0}"/>
+              </a:ext>
+            </a:extLst>
+          </p:cNvPr>
           <p:cNvSpPr/>
           <p:nvPr/>
         </p:nvSpPr>
         <p:spPr>
           <a:xfrm>
-            <a:off x="9792269" y="2129025"/>
-            <a:ext cx="1650319" cy="1166483"/>
+            <a:off x="3141884" y="3766132"/>
+            <a:ext cx="1650319" cy="567257"/>
           </a:xfrm>
           <a:prstGeom prst="roundRect">
             <a:avLst/>
@@ -4390,89 +4422,31 @@
       </p:sp>
       <p:sp>
         <p:nvSpPr>
-          <p:cNvPr id="36" name="TextBox 35"/>
-          <p:cNvSpPr txBox="1"/>
-          <p:nvPr/>
-        </p:nvSpPr>
-        <p:spPr>
-          <a:xfrm>
-            <a:off x="10153999" y="2712266"/>
-            <a:ext cx="926857" cy="303481"/>
-          </a:xfrm>
-          <a:prstGeom prst="rect">
+          <p:cNvPr id="49" name="Rounded Rectangle 4">
+            <a:extLst>
+              <a:ext uri="{FF2B5EF4-FFF2-40B4-BE49-F238E27FC236}">
+                <a16:creationId xmlns:a16="http://schemas.microsoft.com/office/drawing/2014/main" id="{CCD69186-7866-440F-ABF4-6494BCFBB47D}"/>
+              </a:ext>
+            </a:extLst>
+          </p:cNvPr>
+          <p:cNvSpPr/>
+          <p:nvPr/>
+        </p:nvSpPr>
+        <p:spPr>
+          <a:xfrm>
+            <a:off x="5514194" y="3766147"/>
+            <a:ext cx="1650319" cy="567257"/>
+          </a:xfrm>
+          <a:prstGeom prst="roundRect">
             <a:avLst/>
           </a:prstGeom>
           <a:noFill/>
-        </p:spPr>
-        <p:txBody>
-          <a:bodyPr wrap="none" rtlCol="0">
-            <a:spAutoFit/>
-          </a:bodyPr>
-          <a:lstStyle/>
-          <a:p>
-            <a:r>
-              <a:rPr lang="en-US" sz="1372" dirty="0" smtClean="0"/>
-              <a:t>Students[]</a:t>
-            </a:r>
-            <a:endParaRPr lang="en-US" sz="1372" dirty="0"/>
-          </a:p>
-        </p:txBody>
-      </p:sp>
-      <p:sp>
-        <p:nvSpPr>
-          <p:cNvPr id="40" name="TextBox 39"/>
-          <p:cNvSpPr txBox="1"/>
-          <p:nvPr/>
-        </p:nvSpPr>
-        <p:spPr>
-          <a:xfrm>
-            <a:off x="10297467" y="2308056"/>
-            <a:ext cx="819455" cy="303481"/>
-          </a:xfrm>
-          <a:prstGeom prst="rect">
-            <a:avLst/>
-          </a:prstGeom>
-          <a:noFill/>
-        </p:spPr>
-        <p:txBody>
-          <a:bodyPr wrap="none" rtlCol="0">
-            <a:spAutoFit/>
-          </a:bodyPr>
-          <a:lstStyle/>
-          <a:p>
-            <a:r>
-              <a:rPr lang="en-US" sz="1372" b="1" i="1" dirty="0" smtClean="0">
-                <a:solidFill>
-                  <a:srgbClr val="FF0000"/>
-                </a:solidFill>
-              </a:rPr>
-              <a:t>&lt;dialog&gt;</a:t>
-            </a:r>
-            <a:endParaRPr lang="en-US" sz="1372" b="1" i="1" dirty="0">
-              <a:solidFill>
-                <a:srgbClr val="FF0000"/>
-              </a:solidFill>
-            </a:endParaRPr>
-          </a:p>
-        </p:txBody>
-      </p:sp>
-      <p:sp>
-        <p:nvSpPr>
-          <p:cNvPr id="41" name="Right Arrow 40"/>
-          <p:cNvSpPr/>
-          <p:nvPr/>
-        </p:nvSpPr>
-        <p:spPr>
-          <a:xfrm>
-            <a:off x="7846423" y="727951"/>
-            <a:ext cx="696809" cy="333683"/>
-          </a:xfrm>
-          <a:prstGeom prst="rightArrow">
-            <a:avLst/>
-          </a:prstGeom>
-          <a:solidFill>
-            <a:srgbClr val="FFFF00"/>
-          </a:solidFill>
+          <a:ln>
+            <a:solidFill>
+              <a:srgbClr val="FF0000"/>
+            </a:solidFill>
+            <a:prstDash val="lgDash"/>
+          </a:ln>
         </p:spPr>
         <p:style>
           <a:lnRef idx="2">
@@ -4491,12 +4465,7 @@
           </a:fontRef>
         </p:style>
         <p:txBody>
-          <a:bodyPr rot="0" spcFirstLastPara="0" vertOverflow="overflow" horzOverflow="overflow" vert="horz" wrap="square" lIns="69681" tIns="34840" rIns="69681" bIns="34840" numCol="1" spcCol="0" rtlCol="0" fromWordArt="0" anchor="ctr" anchorCtr="0" forceAA="0" compatLnSpc="1">
-            <a:prstTxWarp prst="textNoShape">
-              <a:avLst/>
-            </a:prstTxWarp>
-            <a:noAutofit/>
-          </a:bodyPr>
+          <a:bodyPr rtlCol="0" anchor="ctr"/>
           <a:lstStyle/>
           <a:p>
             <a:pPr algn="ctr"/>
@@ -4506,84 +4475,31 @@
       </p:sp>
       <p:sp>
         <p:nvSpPr>
-          <p:cNvPr id="42" name="TextBox 41"/>
-          <p:cNvSpPr txBox="1"/>
-          <p:nvPr/>
-        </p:nvSpPr>
-        <p:spPr>
-          <a:xfrm>
-            <a:off x="7837364" y="509852"/>
-            <a:ext cx="838756" cy="303481"/>
-          </a:xfrm>
-          <a:prstGeom prst="rect">
+          <p:cNvPr id="50" name="Rounded Rectangle 4">
+            <a:extLst>
+              <a:ext uri="{FF2B5EF4-FFF2-40B4-BE49-F238E27FC236}">
+                <a16:creationId xmlns:a16="http://schemas.microsoft.com/office/drawing/2014/main" id="{2031453D-96DD-420B-A8F4-E02BD2E97FA4}"/>
+              </a:ext>
+            </a:extLst>
+          </p:cNvPr>
+          <p:cNvSpPr/>
+          <p:nvPr/>
+        </p:nvSpPr>
+        <p:spPr>
+          <a:xfrm>
+            <a:off x="7803395" y="3766132"/>
+            <a:ext cx="1650319" cy="567257"/>
+          </a:xfrm>
+          <a:prstGeom prst="roundRect">
             <a:avLst/>
           </a:prstGeom>
           <a:noFill/>
-        </p:spPr>
-        <p:txBody>
-          <a:bodyPr wrap="none" rtlCol="0">
-            <a:spAutoFit/>
-          </a:bodyPr>
-          <a:lstStyle/>
-          <a:p>
-            <a:r>
-              <a:rPr lang="en-US" sz="1372" b="1" dirty="0">
-                <a:solidFill>
-                  <a:schemeClr val="accent4"/>
-                </a:solidFill>
-              </a:rPr>
-              <a:t>PROVIDE</a:t>
-            </a:r>
-          </a:p>
-        </p:txBody>
-      </p:sp>
-      <p:sp>
-        <p:nvSpPr>
-          <p:cNvPr id="43" name="TextBox 42"/>
-          <p:cNvSpPr txBox="1"/>
-          <p:nvPr/>
-        </p:nvSpPr>
-        <p:spPr>
-          <a:xfrm>
-            <a:off x="7991050" y="1073307"/>
-            <a:ext cx="926857" cy="303481"/>
-          </a:xfrm>
-          <a:prstGeom prst="rect">
-            <a:avLst/>
-          </a:prstGeom>
-          <a:noFill/>
-        </p:spPr>
-        <p:txBody>
-          <a:bodyPr wrap="none" rtlCol="0">
-            <a:spAutoFit/>
-          </a:bodyPr>
-          <a:lstStyle/>
-          <a:p>
-            <a:r>
-              <a:rPr lang="en-US" sz="1372" dirty="0" smtClean="0"/>
-              <a:t>Students[]</a:t>
-            </a:r>
-            <a:endParaRPr lang="en-US" sz="1372" dirty="0"/>
-          </a:p>
-        </p:txBody>
-      </p:sp>
-      <p:sp>
-        <p:nvSpPr>
-          <p:cNvPr id="44" name="Right Arrow 43"/>
-          <p:cNvSpPr/>
-          <p:nvPr/>
-        </p:nvSpPr>
-        <p:spPr>
-          <a:xfrm>
-            <a:off x="9135788" y="2542676"/>
-            <a:ext cx="696809" cy="333683"/>
-          </a:xfrm>
-          <a:prstGeom prst="rightArrow">
-            <a:avLst/>
-          </a:prstGeom>
-          <a:solidFill>
-            <a:srgbClr val="FFFF00"/>
-          </a:solidFill>
+          <a:ln>
+            <a:solidFill>
+              <a:srgbClr val="FF0000"/>
+            </a:solidFill>
+            <a:prstDash val="lgDash"/>
+          </a:ln>
         </p:spPr>
         <p:style>
           <a:lnRef idx="2">
@@ -4602,6 +4518,1125 @@
           </a:fontRef>
         </p:style>
         <p:txBody>
+          <a:bodyPr rtlCol="0" anchor="ctr"/>
+          <a:lstStyle/>
+          <a:p>
+            <a:pPr algn="ctr"/>
+            <a:endParaRPr lang="en-US" sz="1372"/>
+          </a:p>
+        </p:txBody>
+      </p:sp>
+      <p:sp>
+        <p:nvSpPr>
+          <p:cNvPr id="51" name="TextBox 50">
+            <a:extLst>
+              <a:ext uri="{FF2B5EF4-FFF2-40B4-BE49-F238E27FC236}">
+                <a16:creationId xmlns:a16="http://schemas.microsoft.com/office/drawing/2014/main" id="{9B90995F-F96F-444F-A642-EA6F3AA194A4}"/>
+              </a:ext>
+            </a:extLst>
+          </p:cNvPr>
+          <p:cNvSpPr txBox="1"/>
+          <p:nvPr/>
+        </p:nvSpPr>
+        <p:spPr>
+          <a:xfrm>
+            <a:off x="1027680" y="3893729"/>
+            <a:ext cx="1142044" cy="303481"/>
+          </a:xfrm>
+          <a:prstGeom prst="rect">
+            <a:avLst/>
+          </a:prstGeom>
+          <a:noFill/>
+        </p:spPr>
+        <p:txBody>
+          <a:bodyPr wrap="none" rtlCol="0">
+            <a:spAutoFit/>
+          </a:bodyPr>
+          <a:lstStyle/>
+          <a:p>
+            <a:r>
+              <a:rPr lang="en-US" sz="1372" b="1" i="1" dirty="0">
+                <a:solidFill>
+                  <a:srgbClr val="FF0000"/>
+                </a:solidFill>
+              </a:rPr>
+              <a:t>&lt;event-card&gt;</a:t>
+            </a:r>
+          </a:p>
+        </p:txBody>
+      </p:sp>
+      <p:sp>
+        <p:nvSpPr>
+          <p:cNvPr id="55" name="TextBox 54">
+            <a:extLst>
+              <a:ext uri="{FF2B5EF4-FFF2-40B4-BE49-F238E27FC236}">
+                <a16:creationId xmlns:a16="http://schemas.microsoft.com/office/drawing/2014/main" id="{92A31547-0B6B-4DFF-A100-CEC82D7A6D64}"/>
+              </a:ext>
+            </a:extLst>
+          </p:cNvPr>
+          <p:cNvSpPr txBox="1"/>
+          <p:nvPr/>
+        </p:nvSpPr>
+        <p:spPr>
+          <a:xfrm>
+            <a:off x="8042367" y="3893729"/>
+            <a:ext cx="1142044" cy="303481"/>
+          </a:xfrm>
+          <a:prstGeom prst="rect">
+            <a:avLst/>
+          </a:prstGeom>
+          <a:noFill/>
+        </p:spPr>
+        <p:txBody>
+          <a:bodyPr wrap="none" rtlCol="0">
+            <a:spAutoFit/>
+          </a:bodyPr>
+          <a:lstStyle/>
+          <a:p>
+            <a:r>
+              <a:rPr lang="en-US" sz="1372" b="1" i="1" dirty="0">
+                <a:solidFill>
+                  <a:srgbClr val="FF0000"/>
+                </a:solidFill>
+              </a:rPr>
+              <a:t>&lt;event-card&gt;</a:t>
+            </a:r>
+          </a:p>
+        </p:txBody>
+      </p:sp>
+      <p:sp>
+        <p:nvSpPr>
+          <p:cNvPr id="56" name="TextBox 55">
+            <a:extLst>
+              <a:ext uri="{FF2B5EF4-FFF2-40B4-BE49-F238E27FC236}">
+                <a16:creationId xmlns:a16="http://schemas.microsoft.com/office/drawing/2014/main" id="{FFF1C9C7-4857-4D1D-9E57-6EB238B85D04}"/>
+              </a:ext>
+            </a:extLst>
+          </p:cNvPr>
+          <p:cNvSpPr txBox="1"/>
+          <p:nvPr/>
+        </p:nvSpPr>
+        <p:spPr>
+          <a:xfrm>
+            <a:off x="5760598" y="3893729"/>
+            <a:ext cx="1142044" cy="303481"/>
+          </a:xfrm>
+          <a:prstGeom prst="rect">
+            <a:avLst/>
+          </a:prstGeom>
+          <a:noFill/>
+        </p:spPr>
+        <p:txBody>
+          <a:bodyPr wrap="none" rtlCol="0">
+            <a:spAutoFit/>
+          </a:bodyPr>
+          <a:lstStyle/>
+          <a:p>
+            <a:r>
+              <a:rPr lang="en-US" sz="1372" b="1" i="1" dirty="0">
+                <a:solidFill>
+                  <a:srgbClr val="FF0000"/>
+                </a:solidFill>
+              </a:rPr>
+              <a:t>&lt;event-card&gt;</a:t>
+            </a:r>
+          </a:p>
+        </p:txBody>
+      </p:sp>
+      <p:sp>
+        <p:nvSpPr>
+          <p:cNvPr id="57" name="TextBox 56">
+            <a:extLst>
+              <a:ext uri="{FF2B5EF4-FFF2-40B4-BE49-F238E27FC236}">
+                <a16:creationId xmlns:a16="http://schemas.microsoft.com/office/drawing/2014/main" id="{75C0880C-26CE-4E61-AD01-ECCC790F2860}"/>
+              </a:ext>
+            </a:extLst>
+          </p:cNvPr>
+          <p:cNvSpPr txBox="1"/>
+          <p:nvPr/>
+        </p:nvSpPr>
+        <p:spPr>
+          <a:xfrm>
+            <a:off x="3390155" y="3893729"/>
+            <a:ext cx="1142044" cy="303481"/>
+          </a:xfrm>
+          <a:prstGeom prst="rect">
+            <a:avLst/>
+          </a:prstGeom>
+          <a:noFill/>
+        </p:spPr>
+        <p:txBody>
+          <a:bodyPr wrap="none" rtlCol="0">
+            <a:spAutoFit/>
+          </a:bodyPr>
+          <a:lstStyle/>
+          <a:p>
+            <a:r>
+              <a:rPr lang="en-US" sz="1372" b="1" i="1" dirty="0">
+                <a:solidFill>
+                  <a:srgbClr val="FF0000"/>
+                </a:solidFill>
+              </a:rPr>
+              <a:t>&lt;event-card&gt;</a:t>
+            </a:r>
+          </a:p>
+        </p:txBody>
+      </p:sp>
+      <p:cxnSp>
+        <p:nvCxnSpPr>
+          <p:cNvPr id="58" name="Straight Arrow Connector 57">
+            <a:extLst>
+              <a:ext uri="{FF2B5EF4-FFF2-40B4-BE49-F238E27FC236}">
+                <a16:creationId xmlns:a16="http://schemas.microsoft.com/office/drawing/2014/main" id="{A721FDBE-BE3C-4944-9798-C45538D439BD}"/>
+              </a:ext>
+            </a:extLst>
+          </p:cNvPr>
+          <p:cNvCxnSpPr>
+            <a:cxnSpLocks/>
+            <a:endCxn id="47" idx="0"/>
+          </p:cNvCxnSpPr>
+          <p:nvPr/>
+        </p:nvCxnSpPr>
+        <p:spPr>
+          <a:xfrm flipH="1">
+            <a:off x="1575646" y="3082903"/>
+            <a:ext cx="6470" cy="683230"/>
+          </a:xfrm>
+          <a:prstGeom prst="straightConnector1">
+            <a:avLst/>
+          </a:prstGeom>
+          <a:ln>
+            <a:tailEnd type="triangle"/>
+          </a:ln>
+        </p:spPr>
+        <p:style>
+          <a:lnRef idx="3">
+            <a:schemeClr val="accent1"/>
+          </a:lnRef>
+          <a:fillRef idx="0">
+            <a:schemeClr val="accent1"/>
+          </a:fillRef>
+          <a:effectRef idx="2">
+            <a:schemeClr val="accent1"/>
+          </a:effectRef>
+          <a:fontRef idx="minor">
+            <a:schemeClr val="tx1"/>
+          </a:fontRef>
+        </p:style>
+      </p:cxnSp>
+      <p:cxnSp>
+        <p:nvCxnSpPr>
+          <p:cNvPr id="60" name="Straight Arrow Connector 59">
+            <a:extLst>
+              <a:ext uri="{FF2B5EF4-FFF2-40B4-BE49-F238E27FC236}">
+                <a16:creationId xmlns:a16="http://schemas.microsoft.com/office/drawing/2014/main" id="{41BFA7DF-310B-43CB-8E5E-AEF50761B7C4}"/>
+              </a:ext>
+            </a:extLst>
+          </p:cNvPr>
+          <p:cNvCxnSpPr>
+            <a:cxnSpLocks/>
+          </p:cNvCxnSpPr>
+          <p:nvPr/>
+        </p:nvCxnSpPr>
+        <p:spPr>
+          <a:xfrm flipH="1">
+            <a:off x="8629519" y="3076188"/>
+            <a:ext cx="6470" cy="683230"/>
+          </a:xfrm>
+          <a:prstGeom prst="straightConnector1">
+            <a:avLst/>
+          </a:prstGeom>
+          <a:ln>
+            <a:tailEnd type="triangle"/>
+          </a:ln>
+        </p:spPr>
+        <p:style>
+          <a:lnRef idx="3">
+            <a:schemeClr val="accent1"/>
+          </a:lnRef>
+          <a:fillRef idx="0">
+            <a:schemeClr val="accent1"/>
+          </a:fillRef>
+          <a:effectRef idx="2">
+            <a:schemeClr val="accent1"/>
+          </a:effectRef>
+          <a:fontRef idx="minor">
+            <a:schemeClr val="tx1"/>
+          </a:fontRef>
+        </p:style>
+      </p:cxnSp>
+      <p:cxnSp>
+        <p:nvCxnSpPr>
+          <p:cNvPr id="61" name="Straight Arrow Connector 60">
+            <a:extLst>
+              <a:ext uri="{FF2B5EF4-FFF2-40B4-BE49-F238E27FC236}">
+                <a16:creationId xmlns:a16="http://schemas.microsoft.com/office/drawing/2014/main" id="{07DC3A99-7517-4DEB-8DF2-40AF9C12BCB8}"/>
+              </a:ext>
+            </a:extLst>
+          </p:cNvPr>
+          <p:cNvCxnSpPr>
+            <a:cxnSpLocks/>
+          </p:cNvCxnSpPr>
+          <p:nvPr/>
+        </p:nvCxnSpPr>
+        <p:spPr>
+          <a:xfrm flipH="1">
+            <a:off x="6339353" y="3076188"/>
+            <a:ext cx="6470" cy="683230"/>
+          </a:xfrm>
+          <a:prstGeom prst="straightConnector1">
+            <a:avLst/>
+          </a:prstGeom>
+          <a:ln>
+            <a:tailEnd type="triangle"/>
+          </a:ln>
+        </p:spPr>
+        <p:style>
+          <a:lnRef idx="3">
+            <a:schemeClr val="accent1"/>
+          </a:lnRef>
+          <a:fillRef idx="0">
+            <a:schemeClr val="accent1"/>
+          </a:fillRef>
+          <a:effectRef idx="2">
+            <a:schemeClr val="accent1"/>
+          </a:effectRef>
+          <a:fontRef idx="minor">
+            <a:schemeClr val="tx1"/>
+          </a:fontRef>
+        </p:style>
+      </p:cxnSp>
+      <p:cxnSp>
+        <p:nvCxnSpPr>
+          <p:cNvPr id="62" name="Straight Arrow Connector 61">
+            <a:extLst>
+              <a:ext uri="{FF2B5EF4-FFF2-40B4-BE49-F238E27FC236}">
+                <a16:creationId xmlns:a16="http://schemas.microsoft.com/office/drawing/2014/main" id="{05882833-3A74-4668-B3BC-2CC0B6024919}"/>
+              </a:ext>
+            </a:extLst>
+          </p:cNvPr>
+          <p:cNvCxnSpPr>
+            <a:cxnSpLocks/>
+          </p:cNvCxnSpPr>
+          <p:nvPr/>
+        </p:nvCxnSpPr>
+        <p:spPr>
+          <a:xfrm flipH="1">
+            <a:off x="3967042" y="3067517"/>
+            <a:ext cx="6470" cy="683230"/>
+          </a:xfrm>
+          <a:prstGeom prst="straightConnector1">
+            <a:avLst/>
+          </a:prstGeom>
+          <a:ln>
+            <a:tailEnd type="triangle"/>
+          </a:ln>
+        </p:spPr>
+        <p:style>
+          <a:lnRef idx="3">
+            <a:schemeClr val="accent1"/>
+          </a:lnRef>
+          <a:fillRef idx="0">
+            <a:schemeClr val="accent1"/>
+          </a:fillRef>
+          <a:effectRef idx="2">
+            <a:schemeClr val="accent1"/>
+          </a:effectRef>
+          <a:fontRef idx="minor">
+            <a:schemeClr val="tx1"/>
+          </a:fontRef>
+        </p:style>
+      </p:cxnSp>
+      <p:sp>
+        <p:nvSpPr>
+          <p:cNvPr id="63" name="Left Brace 62">
+            <a:extLst>
+              <a:ext uri="{FF2B5EF4-FFF2-40B4-BE49-F238E27FC236}">
+                <a16:creationId xmlns:a16="http://schemas.microsoft.com/office/drawing/2014/main" id="{5BBE628C-51BE-4150-B5FE-8E1D9875822A}"/>
+              </a:ext>
+            </a:extLst>
+          </p:cNvPr>
+          <p:cNvSpPr/>
+          <p:nvPr/>
+        </p:nvSpPr>
+        <p:spPr>
+          <a:xfrm rot="16200000">
+            <a:off x="4950359" y="113094"/>
+            <a:ext cx="303482" cy="8703229"/>
+          </a:xfrm>
+          <a:prstGeom prst="leftBrace">
+            <a:avLst>
+              <a:gd name="adj1" fmla="val 8333"/>
+              <a:gd name="adj2" fmla="val 49854"/>
+            </a:avLst>
+          </a:prstGeom>
+        </p:spPr>
+        <p:style>
+          <a:lnRef idx="3">
+            <a:schemeClr val="accent1"/>
+          </a:lnRef>
+          <a:fillRef idx="0">
+            <a:schemeClr val="accent1"/>
+          </a:fillRef>
+          <a:effectRef idx="2">
+            <a:schemeClr val="accent1"/>
+          </a:effectRef>
+          <a:fontRef idx="minor">
+            <a:schemeClr val="tx1"/>
+          </a:fontRef>
+        </p:style>
+        <p:txBody>
+          <a:bodyPr rtlCol="0" anchor="ctr"/>
+          <a:lstStyle/>
+          <a:p>
+            <a:pPr algn="ctr"/>
+            <a:endParaRPr lang="en-US"/>
+          </a:p>
+        </p:txBody>
+      </p:sp>
+      <p:sp>
+        <p:nvSpPr>
+          <p:cNvPr id="64" name="TextBox 63">
+            <a:extLst>
+              <a:ext uri="{FF2B5EF4-FFF2-40B4-BE49-F238E27FC236}">
+                <a16:creationId xmlns:a16="http://schemas.microsoft.com/office/drawing/2014/main" id="{AAFD8EA3-112F-492B-BF12-A485FB0632C2}"/>
+              </a:ext>
+            </a:extLst>
+          </p:cNvPr>
+          <p:cNvSpPr txBox="1"/>
+          <p:nvPr/>
+        </p:nvSpPr>
+        <p:spPr>
+          <a:xfrm>
+            <a:off x="4764507" y="4630196"/>
+            <a:ext cx="588623" cy="303481"/>
+          </a:xfrm>
+          <a:prstGeom prst="rect">
+            <a:avLst/>
+          </a:prstGeom>
+          <a:noFill/>
+        </p:spPr>
+        <p:txBody>
+          <a:bodyPr wrap="none" rtlCol="0">
+            <a:spAutoFit/>
+          </a:bodyPr>
+          <a:lstStyle/>
+          <a:p>
+            <a:r>
+              <a:rPr lang="en-US" sz="1372" b="1" i="1" dirty="0">
+                <a:solidFill>
+                  <a:schemeClr val="accent1"/>
+                </a:solidFill>
+              </a:rPr>
+              <a:t>Inject</a:t>
+            </a:r>
+          </a:p>
+        </p:txBody>
+      </p:sp>
+    </p:spTree>
+    <p:extLst>
+      <p:ext uri="{BB962C8B-B14F-4D97-AF65-F5344CB8AC3E}">
+        <p14:creationId xmlns:p14="http://schemas.microsoft.com/office/powerpoint/2010/main" val="2923802873"/>
+      </p:ext>
+    </p:extLst>
+  </p:cSld>
+  <p:clrMapOvr>
+    <a:masterClrMapping/>
+  </p:clrMapOvr>
+</p:sld>
+</file>
+
+<file path=ppt/slides/slide3.xml><?xml version="1.0" encoding="utf-8"?>
+<p:sld xmlns:a="http://schemas.openxmlformats.org/drawingml/2006/main" xmlns:r="http://schemas.openxmlformats.org/officeDocument/2006/relationships" xmlns:p="http://schemas.openxmlformats.org/presentationml/2006/main">
+  <p:cSld>
+    <p:spTree>
+      <p:nvGrpSpPr>
+        <p:cNvPr id="1" name=""/>
+        <p:cNvGrpSpPr/>
+        <p:nvPr/>
+      </p:nvGrpSpPr>
+      <p:grpSpPr>
+        <a:xfrm>
+          <a:off x="0" y="0"/>
+          <a:ext cx="0" cy="0"/>
+          <a:chOff x="0" y="0"/>
+          <a:chExt cx="0" cy="0"/>
+        </a:xfrm>
+      </p:grpSpPr>
+      <p:sp>
+        <p:nvSpPr>
+          <p:cNvPr id="4" name="TextBox 3"/>
+          <p:cNvSpPr txBox="1"/>
+          <p:nvPr/>
+        </p:nvSpPr>
+        <p:spPr>
+          <a:xfrm>
+            <a:off x="1009380" y="479624"/>
+            <a:ext cx="639919" cy="303481"/>
+          </a:xfrm>
+          <a:prstGeom prst="rect">
+            <a:avLst/>
+          </a:prstGeom>
+          <a:noFill/>
+        </p:spPr>
+        <p:txBody>
+          <a:bodyPr wrap="none" rtlCol="0">
+            <a:spAutoFit/>
+          </a:bodyPr>
+          <a:lstStyle/>
+          <a:p>
+            <a:r>
+              <a:rPr lang="en-US" sz="1372" b="1" i="1" dirty="0">
+                <a:solidFill>
+                  <a:srgbClr val="FF0000"/>
+                </a:solidFill>
+              </a:rPr>
+              <a:t>&lt;app&gt;</a:t>
+            </a:r>
+          </a:p>
+        </p:txBody>
+      </p:sp>
+      <p:sp>
+        <p:nvSpPr>
+          <p:cNvPr id="5" name="Rounded Rectangle 4"/>
+          <p:cNvSpPr/>
+          <p:nvPr/>
+        </p:nvSpPr>
+        <p:spPr>
+          <a:xfrm>
+            <a:off x="523323" y="309043"/>
+            <a:ext cx="1650319" cy="1166483"/>
+          </a:xfrm>
+          <a:prstGeom prst="roundRect">
+            <a:avLst/>
+          </a:prstGeom>
+          <a:noFill/>
+          <a:ln>
+            <a:solidFill>
+              <a:srgbClr val="FF0000"/>
+            </a:solidFill>
+            <a:prstDash val="lgDash"/>
+          </a:ln>
+        </p:spPr>
+        <p:style>
+          <a:lnRef idx="2">
+            <a:schemeClr val="accent1">
+              <a:shade val="50000"/>
+            </a:schemeClr>
+          </a:lnRef>
+          <a:fillRef idx="1">
+            <a:schemeClr val="accent1"/>
+          </a:fillRef>
+          <a:effectRef idx="0">
+            <a:schemeClr val="accent1"/>
+          </a:effectRef>
+          <a:fontRef idx="minor">
+            <a:schemeClr val="lt1"/>
+          </a:fontRef>
+        </p:style>
+        <p:txBody>
+          <a:bodyPr rtlCol="0" anchor="ctr"/>
+          <a:lstStyle/>
+          <a:p>
+            <a:pPr algn="ctr"/>
+            <a:endParaRPr lang="en-US" sz="1372"/>
+          </a:p>
+        </p:txBody>
+      </p:sp>
+      <p:sp>
+        <p:nvSpPr>
+          <p:cNvPr id="6" name="TextBox 5"/>
+          <p:cNvSpPr txBox="1"/>
+          <p:nvPr/>
+        </p:nvSpPr>
+        <p:spPr>
+          <a:xfrm>
+            <a:off x="885053" y="892284"/>
+            <a:ext cx="926857" cy="303481"/>
+          </a:xfrm>
+          <a:prstGeom prst="rect">
+            <a:avLst/>
+          </a:prstGeom>
+          <a:noFill/>
+        </p:spPr>
+        <p:txBody>
+          <a:bodyPr wrap="none" rtlCol="0">
+            <a:spAutoFit/>
+          </a:bodyPr>
+          <a:lstStyle/>
+          <a:p>
+            <a:r>
+              <a:rPr lang="en-US" sz="1372" dirty="0"/>
+              <a:t>Students[]</a:t>
+            </a:r>
+          </a:p>
+        </p:txBody>
+      </p:sp>
+      <p:sp>
+        <p:nvSpPr>
+          <p:cNvPr id="7" name="TextBox 6"/>
+          <p:cNvSpPr txBox="1"/>
+          <p:nvPr/>
+        </p:nvSpPr>
+        <p:spPr>
+          <a:xfrm>
+            <a:off x="119555" y="1627265"/>
+            <a:ext cx="3384709" cy="303481"/>
+          </a:xfrm>
+          <a:prstGeom prst="rect">
+            <a:avLst/>
+          </a:prstGeom>
+          <a:noFill/>
+        </p:spPr>
+        <p:txBody>
+          <a:bodyPr wrap="none" rtlCol="0">
+            <a:spAutoFit/>
+          </a:bodyPr>
+          <a:lstStyle/>
+          <a:p>
+            <a:r>
+              <a:rPr lang="en-US" sz="1372" dirty="0"/>
+              <a:t>// A component with a list of student as data</a:t>
+            </a:r>
+          </a:p>
+        </p:txBody>
+      </p:sp>
+      <p:sp>
+        <p:nvSpPr>
+          <p:cNvPr id="8" name="TextBox 7"/>
+          <p:cNvSpPr txBox="1"/>
+          <p:nvPr/>
+        </p:nvSpPr>
+        <p:spPr>
+          <a:xfrm>
+            <a:off x="1009380" y="2556074"/>
+            <a:ext cx="639919" cy="303481"/>
+          </a:xfrm>
+          <a:prstGeom prst="rect">
+            <a:avLst/>
+          </a:prstGeom>
+          <a:noFill/>
+        </p:spPr>
+        <p:txBody>
+          <a:bodyPr wrap="none" rtlCol="0">
+            <a:spAutoFit/>
+          </a:bodyPr>
+          <a:lstStyle/>
+          <a:p>
+            <a:r>
+              <a:rPr lang="en-US" sz="1372" b="1" i="1" dirty="0">
+                <a:solidFill>
+                  <a:srgbClr val="FF0000"/>
+                </a:solidFill>
+              </a:rPr>
+              <a:t>&lt;app&gt;</a:t>
+            </a:r>
+          </a:p>
+        </p:txBody>
+      </p:sp>
+      <p:sp>
+        <p:nvSpPr>
+          <p:cNvPr id="9" name="Rounded Rectangle 8"/>
+          <p:cNvSpPr/>
+          <p:nvPr/>
+        </p:nvSpPr>
+        <p:spPr>
+          <a:xfrm>
+            <a:off x="523323" y="2385493"/>
+            <a:ext cx="1650319" cy="1166483"/>
+          </a:xfrm>
+          <a:prstGeom prst="roundRect">
+            <a:avLst/>
+          </a:prstGeom>
+          <a:noFill/>
+          <a:ln>
+            <a:solidFill>
+              <a:srgbClr val="FF0000"/>
+            </a:solidFill>
+            <a:prstDash val="lgDash"/>
+          </a:ln>
+        </p:spPr>
+        <p:style>
+          <a:lnRef idx="2">
+            <a:schemeClr val="accent1">
+              <a:shade val="50000"/>
+            </a:schemeClr>
+          </a:lnRef>
+          <a:fillRef idx="1">
+            <a:schemeClr val="accent1"/>
+          </a:fillRef>
+          <a:effectRef idx="0">
+            <a:schemeClr val="accent1"/>
+          </a:effectRef>
+          <a:fontRef idx="minor">
+            <a:schemeClr val="lt1"/>
+          </a:fontRef>
+        </p:style>
+        <p:txBody>
+          <a:bodyPr rtlCol="0" anchor="ctr"/>
+          <a:lstStyle/>
+          <a:p>
+            <a:pPr algn="ctr"/>
+            <a:endParaRPr lang="en-US" sz="1372"/>
+          </a:p>
+        </p:txBody>
+      </p:sp>
+      <p:sp>
+        <p:nvSpPr>
+          <p:cNvPr id="10" name="TextBox 9"/>
+          <p:cNvSpPr txBox="1"/>
+          <p:nvPr/>
+        </p:nvSpPr>
+        <p:spPr>
+          <a:xfrm>
+            <a:off x="885053" y="2968734"/>
+            <a:ext cx="926857" cy="303481"/>
+          </a:xfrm>
+          <a:prstGeom prst="rect">
+            <a:avLst/>
+          </a:prstGeom>
+          <a:noFill/>
+        </p:spPr>
+        <p:txBody>
+          <a:bodyPr wrap="none" rtlCol="0">
+            <a:spAutoFit/>
+          </a:bodyPr>
+          <a:lstStyle/>
+          <a:p>
+            <a:r>
+              <a:rPr lang="en-US" sz="1372" dirty="0"/>
+              <a:t>Students[]</a:t>
+            </a:r>
+          </a:p>
+        </p:txBody>
+      </p:sp>
+      <p:sp>
+        <p:nvSpPr>
+          <p:cNvPr id="11" name="TextBox 10"/>
+          <p:cNvSpPr txBox="1"/>
+          <p:nvPr/>
+        </p:nvSpPr>
+        <p:spPr>
+          <a:xfrm>
+            <a:off x="464251" y="3703715"/>
+            <a:ext cx="2183996" cy="303481"/>
+          </a:xfrm>
+          <a:prstGeom prst="rect">
+            <a:avLst/>
+          </a:prstGeom>
+          <a:noFill/>
+        </p:spPr>
+        <p:txBody>
+          <a:bodyPr wrap="none" rtlCol="0">
+            <a:spAutoFit/>
+          </a:bodyPr>
+          <a:lstStyle/>
+          <a:p>
+            <a:r>
+              <a:rPr lang="en-US" sz="1372" dirty="0"/>
+              <a:t>// </a:t>
+            </a:r>
+            <a:r>
+              <a:rPr lang="en-US" sz="1372" dirty="0">
+                <a:solidFill>
+                  <a:srgbClr val="FF0000"/>
+                </a:solidFill>
+              </a:rPr>
+              <a:t>app</a:t>
+            </a:r>
+            <a:r>
+              <a:rPr lang="en-US" sz="1372" dirty="0"/>
+              <a:t> send student to </a:t>
+            </a:r>
+            <a:r>
+              <a:rPr lang="en-US" sz="1372" dirty="0">
+                <a:solidFill>
+                  <a:srgbClr val="FF0000"/>
+                </a:solidFill>
+              </a:rPr>
+              <a:t>card </a:t>
+            </a:r>
+          </a:p>
+        </p:txBody>
+      </p:sp>
+      <p:sp>
+        <p:nvSpPr>
+          <p:cNvPr id="12" name="TextBox 11"/>
+          <p:cNvSpPr txBox="1"/>
+          <p:nvPr/>
+        </p:nvSpPr>
+        <p:spPr>
+          <a:xfrm>
+            <a:off x="1009380" y="4803105"/>
+            <a:ext cx="848309" cy="303481"/>
+          </a:xfrm>
+          <a:prstGeom prst="rect">
+            <a:avLst/>
+          </a:prstGeom>
+          <a:noFill/>
+        </p:spPr>
+        <p:txBody>
+          <a:bodyPr wrap="none" rtlCol="0">
+            <a:spAutoFit/>
+          </a:bodyPr>
+          <a:lstStyle/>
+          <a:p>
+            <a:r>
+              <a:rPr lang="en-US" sz="1372" b="1" i="1" dirty="0">
+                <a:solidFill>
+                  <a:srgbClr val="FF0000"/>
+                </a:solidFill>
+              </a:rPr>
+              <a:t>&lt;parent&gt;</a:t>
+            </a:r>
+          </a:p>
+        </p:txBody>
+      </p:sp>
+      <p:sp>
+        <p:nvSpPr>
+          <p:cNvPr id="13" name="Rounded Rectangle 12"/>
+          <p:cNvSpPr/>
+          <p:nvPr/>
+        </p:nvSpPr>
+        <p:spPr>
+          <a:xfrm>
+            <a:off x="523323" y="4632524"/>
+            <a:ext cx="1650319" cy="1166483"/>
+          </a:xfrm>
+          <a:prstGeom prst="roundRect">
+            <a:avLst/>
+          </a:prstGeom>
+          <a:noFill/>
+          <a:ln>
+            <a:solidFill>
+              <a:srgbClr val="FF0000"/>
+            </a:solidFill>
+            <a:prstDash val="lgDash"/>
+          </a:ln>
+        </p:spPr>
+        <p:style>
+          <a:lnRef idx="2">
+            <a:schemeClr val="accent1">
+              <a:shade val="50000"/>
+            </a:schemeClr>
+          </a:lnRef>
+          <a:fillRef idx="1">
+            <a:schemeClr val="accent1"/>
+          </a:fillRef>
+          <a:effectRef idx="0">
+            <a:schemeClr val="accent1"/>
+          </a:effectRef>
+          <a:fontRef idx="minor">
+            <a:schemeClr val="lt1"/>
+          </a:fontRef>
+        </p:style>
+        <p:txBody>
+          <a:bodyPr rtlCol="0" anchor="ctr"/>
+          <a:lstStyle/>
+          <a:p>
+            <a:pPr algn="ctr"/>
+            <a:endParaRPr lang="en-US" sz="1372"/>
+          </a:p>
+        </p:txBody>
+      </p:sp>
+      <p:sp>
+        <p:nvSpPr>
+          <p:cNvPr id="14" name="TextBox 13"/>
+          <p:cNvSpPr txBox="1"/>
+          <p:nvPr/>
+        </p:nvSpPr>
+        <p:spPr>
+          <a:xfrm>
+            <a:off x="885053" y="5215765"/>
+            <a:ext cx="926857" cy="303481"/>
+          </a:xfrm>
+          <a:prstGeom prst="rect">
+            <a:avLst/>
+          </a:prstGeom>
+          <a:noFill/>
+        </p:spPr>
+        <p:txBody>
+          <a:bodyPr wrap="none" rtlCol="0">
+            <a:spAutoFit/>
+          </a:bodyPr>
+          <a:lstStyle/>
+          <a:p>
+            <a:r>
+              <a:rPr lang="en-US" sz="1372" dirty="0"/>
+              <a:t>Students[]</a:t>
+            </a:r>
+          </a:p>
+        </p:txBody>
+      </p:sp>
+      <p:sp>
+        <p:nvSpPr>
+          <p:cNvPr id="15" name="TextBox 14"/>
+          <p:cNvSpPr txBox="1"/>
+          <p:nvPr/>
+        </p:nvSpPr>
+        <p:spPr>
+          <a:xfrm>
+            <a:off x="394083" y="6064417"/>
+            <a:ext cx="3216522" cy="303481"/>
+          </a:xfrm>
+          <a:prstGeom prst="rect">
+            <a:avLst/>
+          </a:prstGeom>
+          <a:noFill/>
+        </p:spPr>
+        <p:txBody>
+          <a:bodyPr wrap="none" rtlCol="0">
+            <a:spAutoFit/>
+          </a:bodyPr>
+          <a:lstStyle/>
+          <a:p>
+            <a:r>
+              <a:rPr lang="en-US" sz="1372" dirty="0"/>
+              <a:t>// </a:t>
+            </a:r>
+            <a:r>
+              <a:rPr lang="en-US" sz="1372" dirty="0">
+                <a:solidFill>
+                  <a:srgbClr val="FF0000"/>
+                </a:solidFill>
+              </a:rPr>
+              <a:t>from</a:t>
+            </a:r>
+            <a:r>
+              <a:rPr lang="en-US" sz="1372" dirty="0"/>
+              <a:t> send the event validated to </a:t>
+            </a:r>
+            <a:r>
+              <a:rPr lang="en-US" sz="1372" dirty="0">
+                <a:solidFill>
+                  <a:srgbClr val="FF0000"/>
+                </a:solidFill>
+              </a:rPr>
+              <a:t>parent</a:t>
+            </a:r>
+          </a:p>
+        </p:txBody>
+      </p:sp>
+      <p:sp>
+        <p:nvSpPr>
+          <p:cNvPr id="17" name="Rounded Rectangle 16"/>
+          <p:cNvSpPr/>
+          <p:nvPr/>
+        </p:nvSpPr>
+        <p:spPr>
+          <a:xfrm>
+            <a:off x="3056973" y="2408786"/>
+            <a:ext cx="1650319" cy="1166483"/>
+          </a:xfrm>
+          <a:prstGeom prst="roundRect">
+            <a:avLst/>
+          </a:prstGeom>
+          <a:noFill/>
+          <a:ln>
+            <a:solidFill>
+              <a:srgbClr val="FF0000"/>
+            </a:solidFill>
+            <a:prstDash val="lgDash"/>
+          </a:ln>
+        </p:spPr>
+        <p:style>
+          <a:lnRef idx="2">
+            <a:schemeClr val="accent1">
+              <a:shade val="50000"/>
+            </a:schemeClr>
+          </a:lnRef>
+          <a:fillRef idx="1">
+            <a:schemeClr val="accent1"/>
+          </a:fillRef>
+          <a:effectRef idx="0">
+            <a:schemeClr val="accent1"/>
+          </a:effectRef>
+          <a:fontRef idx="minor">
+            <a:schemeClr val="lt1"/>
+          </a:fontRef>
+        </p:style>
+        <p:txBody>
+          <a:bodyPr rtlCol="0" anchor="ctr"/>
+          <a:lstStyle/>
+          <a:p>
+            <a:pPr algn="ctr"/>
+            <a:endParaRPr lang="en-US" sz="1372"/>
+          </a:p>
+        </p:txBody>
+      </p:sp>
+      <p:sp>
+        <p:nvSpPr>
+          <p:cNvPr id="18" name="TextBox 17"/>
+          <p:cNvSpPr txBox="1"/>
+          <p:nvPr/>
+        </p:nvSpPr>
+        <p:spPr>
+          <a:xfrm>
+            <a:off x="3418703" y="2992027"/>
+            <a:ext cx="926857" cy="303481"/>
+          </a:xfrm>
+          <a:prstGeom prst="rect">
+            <a:avLst/>
+          </a:prstGeom>
+          <a:noFill/>
+        </p:spPr>
+        <p:txBody>
+          <a:bodyPr wrap="none" rtlCol="0">
+            <a:spAutoFit/>
+          </a:bodyPr>
+          <a:lstStyle/>
+          <a:p>
+            <a:r>
+              <a:rPr lang="en-US" sz="1372" dirty="0"/>
+              <a:t>Students[]</a:t>
+            </a:r>
+          </a:p>
+        </p:txBody>
+      </p:sp>
+      <p:sp>
+        <p:nvSpPr>
+          <p:cNvPr id="19" name="TextBox 18"/>
+          <p:cNvSpPr txBox="1"/>
+          <p:nvPr/>
+        </p:nvSpPr>
+        <p:spPr>
+          <a:xfrm>
+            <a:off x="3666083" y="4779442"/>
+            <a:ext cx="713657" cy="303481"/>
+          </a:xfrm>
+          <a:prstGeom prst="rect">
+            <a:avLst/>
+          </a:prstGeom>
+          <a:noFill/>
+        </p:spPr>
+        <p:txBody>
+          <a:bodyPr wrap="none" rtlCol="0">
+            <a:spAutoFit/>
+          </a:bodyPr>
+          <a:lstStyle/>
+          <a:p>
+            <a:r>
+              <a:rPr lang="en-US" sz="1372" b="1" i="1" dirty="0">
+                <a:solidFill>
+                  <a:srgbClr val="FF0000"/>
+                </a:solidFill>
+              </a:rPr>
+              <a:t>&lt;from&gt;</a:t>
+            </a:r>
+          </a:p>
+        </p:txBody>
+      </p:sp>
+      <p:sp>
+        <p:nvSpPr>
+          <p:cNvPr id="20" name="Rounded Rectangle 19"/>
+          <p:cNvSpPr/>
+          <p:nvPr/>
+        </p:nvSpPr>
+        <p:spPr>
+          <a:xfrm>
+            <a:off x="3180026" y="4608861"/>
+            <a:ext cx="1650319" cy="1166483"/>
+          </a:xfrm>
+          <a:prstGeom prst="roundRect">
+            <a:avLst/>
+          </a:prstGeom>
+          <a:noFill/>
+          <a:ln>
+            <a:solidFill>
+              <a:srgbClr val="FF0000"/>
+            </a:solidFill>
+            <a:prstDash val="lgDash"/>
+          </a:ln>
+        </p:spPr>
+        <p:style>
+          <a:lnRef idx="2">
+            <a:schemeClr val="accent1">
+              <a:shade val="50000"/>
+            </a:schemeClr>
+          </a:lnRef>
+          <a:fillRef idx="1">
+            <a:schemeClr val="accent1"/>
+          </a:fillRef>
+          <a:effectRef idx="0">
+            <a:schemeClr val="accent1"/>
+          </a:effectRef>
+          <a:fontRef idx="minor">
+            <a:schemeClr val="lt1"/>
+          </a:fontRef>
+        </p:style>
+        <p:txBody>
+          <a:bodyPr rtlCol="0" anchor="ctr"/>
+          <a:lstStyle/>
+          <a:p>
+            <a:pPr algn="ctr"/>
+            <a:endParaRPr lang="en-US" sz="1372"/>
+          </a:p>
+        </p:txBody>
+      </p:sp>
+      <p:sp>
+        <p:nvSpPr>
+          <p:cNvPr id="21" name="TextBox 20"/>
+          <p:cNvSpPr txBox="1"/>
+          <p:nvPr/>
+        </p:nvSpPr>
+        <p:spPr>
+          <a:xfrm>
+            <a:off x="3541756" y="5192102"/>
+            <a:ext cx="926857" cy="303481"/>
+          </a:xfrm>
+          <a:prstGeom prst="rect">
+            <a:avLst/>
+          </a:prstGeom>
+          <a:noFill/>
+        </p:spPr>
+        <p:txBody>
+          <a:bodyPr wrap="none" rtlCol="0">
+            <a:spAutoFit/>
+          </a:bodyPr>
+          <a:lstStyle/>
+          <a:p>
+            <a:r>
+              <a:rPr lang="en-US" sz="1372" dirty="0"/>
+              <a:t>Students[]</a:t>
+            </a:r>
+          </a:p>
+        </p:txBody>
+      </p:sp>
+      <p:sp>
+        <p:nvSpPr>
+          <p:cNvPr id="22" name="Right Arrow 21"/>
+          <p:cNvSpPr/>
+          <p:nvPr/>
+        </p:nvSpPr>
+        <p:spPr>
+          <a:xfrm>
+            <a:off x="2197551" y="2768367"/>
+            <a:ext cx="696809" cy="333683"/>
+          </a:xfrm>
+          <a:prstGeom prst="rightArrow">
+            <a:avLst/>
+          </a:prstGeom>
+          <a:solidFill>
+            <a:schemeClr val="accent6"/>
+          </a:solidFill>
+        </p:spPr>
+        <p:style>
+          <a:lnRef idx="2">
+            <a:schemeClr val="accent1">
+              <a:shade val="50000"/>
+            </a:schemeClr>
+          </a:lnRef>
+          <a:fillRef idx="1">
+            <a:schemeClr val="accent1"/>
+          </a:fillRef>
+          <a:effectRef idx="0">
+            <a:schemeClr val="accent1"/>
+          </a:effectRef>
+          <a:fontRef idx="minor">
+            <a:schemeClr val="lt1"/>
+          </a:fontRef>
+        </p:style>
+        <p:txBody>
           <a:bodyPr rot="0" spcFirstLastPara="0" vertOverflow="overflow" horzOverflow="overflow" vert="horz" wrap="square" lIns="69681" tIns="34840" rIns="69681" bIns="34840" numCol="1" spcCol="0" rtlCol="0" fromWordArt="0" anchor="ctr" anchorCtr="0" forceAA="0" compatLnSpc="1">
             <a:prstTxWarp prst="textNoShape">
               <a:avLst/>
@@ -4617,14 +5652,14 @@
       </p:sp>
       <p:sp>
         <p:nvSpPr>
-          <p:cNvPr id="45" name="TextBox 44"/>
+          <p:cNvPr id="23" name="TextBox 22"/>
           <p:cNvSpPr txBox="1"/>
           <p:nvPr/>
         </p:nvSpPr>
         <p:spPr>
           <a:xfrm>
-            <a:off x="9126729" y="2324577"/>
-            <a:ext cx="668645" cy="303481"/>
+            <a:off x="2156606" y="3120474"/>
+            <a:ext cx="735714" cy="303481"/>
           </a:xfrm>
           <a:prstGeom prst="rect">
             <a:avLst/>
@@ -4638,18 +5673,671 @@
           <a:lstStyle/>
           <a:p>
             <a:r>
-              <a:rPr lang="en-US" sz="1372" b="1" dirty="0" smtClean="0">
+              <a:rPr lang="en-US" sz="1372" dirty="0"/>
+              <a:t>student</a:t>
+            </a:r>
+          </a:p>
+        </p:txBody>
+      </p:sp>
+      <p:sp>
+        <p:nvSpPr>
+          <p:cNvPr id="24" name="TextBox 23"/>
+          <p:cNvSpPr txBox="1"/>
+          <p:nvPr/>
+        </p:nvSpPr>
+        <p:spPr>
+          <a:xfrm>
+            <a:off x="2188492" y="2550268"/>
+            <a:ext cx="670248" cy="303481"/>
+          </a:xfrm>
+          <a:prstGeom prst="rect">
+            <a:avLst/>
+          </a:prstGeom>
+          <a:noFill/>
+        </p:spPr>
+        <p:txBody>
+          <a:bodyPr wrap="none" rtlCol="0">
+            <a:spAutoFit/>
+          </a:bodyPr>
+          <a:lstStyle/>
+          <a:p>
+            <a:r>
+              <a:rPr lang="en-US" sz="1372" b="1" dirty="0">
+                <a:solidFill>
+                  <a:schemeClr val="accent6"/>
+                </a:solidFill>
+              </a:rPr>
+              <a:t>PROPS</a:t>
+            </a:r>
+          </a:p>
+        </p:txBody>
+      </p:sp>
+      <p:sp>
+        <p:nvSpPr>
+          <p:cNvPr id="25" name="TextBox 24"/>
+          <p:cNvSpPr txBox="1"/>
+          <p:nvPr/>
+        </p:nvSpPr>
+        <p:spPr>
+          <a:xfrm>
+            <a:off x="3562171" y="2587817"/>
+            <a:ext cx="680251" cy="303481"/>
+          </a:xfrm>
+          <a:prstGeom prst="rect">
+            <a:avLst/>
+          </a:prstGeom>
+          <a:noFill/>
+        </p:spPr>
+        <p:txBody>
+          <a:bodyPr wrap="none" rtlCol="0">
+            <a:spAutoFit/>
+          </a:bodyPr>
+          <a:lstStyle/>
+          <a:p>
+            <a:r>
+              <a:rPr lang="en-US" sz="1372" b="1" i="1" dirty="0">
+                <a:solidFill>
+                  <a:srgbClr val="FF0000"/>
+                </a:solidFill>
+              </a:rPr>
+              <a:t>&lt;card&gt;</a:t>
+            </a:r>
+          </a:p>
+        </p:txBody>
+      </p:sp>
+      <p:sp>
+        <p:nvSpPr>
+          <p:cNvPr id="26" name="Right Arrow 25"/>
+          <p:cNvSpPr/>
+          <p:nvPr/>
+        </p:nvSpPr>
+        <p:spPr>
+          <a:xfrm flipH="1">
+            <a:off x="2387600" y="5000637"/>
+            <a:ext cx="792424" cy="400041"/>
+          </a:xfrm>
+          <a:prstGeom prst="rightArrow">
+            <a:avLst/>
+          </a:prstGeom>
+          <a:solidFill>
+            <a:srgbClr val="FF0000"/>
+          </a:solidFill>
+        </p:spPr>
+        <p:style>
+          <a:lnRef idx="2">
+            <a:schemeClr val="accent1">
+              <a:shade val="50000"/>
+            </a:schemeClr>
+          </a:lnRef>
+          <a:fillRef idx="1">
+            <a:schemeClr val="accent1"/>
+          </a:fillRef>
+          <a:effectRef idx="0">
+            <a:schemeClr val="accent1"/>
+          </a:effectRef>
+          <a:fontRef idx="minor">
+            <a:schemeClr val="lt1"/>
+          </a:fontRef>
+        </p:style>
+        <p:txBody>
+          <a:bodyPr rot="0" spcFirstLastPara="0" vertOverflow="overflow" horzOverflow="overflow" vert="horz" wrap="square" lIns="69681" tIns="34840" rIns="69681" bIns="34840" numCol="1" spcCol="0" rtlCol="0" fromWordArt="0" anchor="ctr" anchorCtr="0" forceAA="0" compatLnSpc="1">
+            <a:prstTxWarp prst="textNoShape">
+              <a:avLst/>
+            </a:prstTxWarp>
+            <a:noAutofit/>
+          </a:bodyPr>
+          <a:lstStyle/>
+          <a:p>
+            <a:pPr algn="ctr"/>
+            <a:endParaRPr lang="en-US" sz="1372"/>
+          </a:p>
+        </p:txBody>
+      </p:sp>
+      <p:sp>
+        <p:nvSpPr>
+          <p:cNvPr id="27" name="TextBox 26"/>
+          <p:cNvSpPr txBox="1"/>
+          <p:nvPr/>
+        </p:nvSpPr>
+        <p:spPr>
+          <a:xfrm>
+            <a:off x="2523616" y="5336639"/>
+            <a:ext cx="701474" cy="303481"/>
+          </a:xfrm>
+          <a:prstGeom prst="rect">
+            <a:avLst/>
+          </a:prstGeom>
+          <a:noFill/>
+        </p:spPr>
+        <p:txBody>
+          <a:bodyPr wrap="none" rtlCol="0">
+            <a:spAutoFit/>
+          </a:bodyPr>
+          <a:lstStyle/>
+          <a:p>
+            <a:r>
+              <a:rPr lang="en-US" sz="1372" dirty="0" err="1"/>
+              <a:t>valided</a:t>
+            </a:r>
+            <a:endParaRPr lang="en-US" sz="1372" dirty="0"/>
+          </a:p>
+        </p:txBody>
+      </p:sp>
+      <p:sp>
+        <p:nvSpPr>
+          <p:cNvPr id="28" name="TextBox 27"/>
+          <p:cNvSpPr txBox="1"/>
+          <p:nvPr/>
+        </p:nvSpPr>
+        <p:spPr>
+          <a:xfrm>
+            <a:off x="2574806" y="4621286"/>
+            <a:ext cx="558166" cy="303481"/>
+          </a:xfrm>
+          <a:prstGeom prst="rect">
+            <a:avLst/>
+          </a:prstGeom>
+          <a:noFill/>
+        </p:spPr>
+        <p:txBody>
+          <a:bodyPr wrap="none" rtlCol="0">
+            <a:spAutoFit/>
+          </a:bodyPr>
+          <a:lstStyle/>
+          <a:p>
+            <a:r>
+              <a:rPr lang="en-US" sz="1372" b="1" dirty="0">
+                <a:solidFill>
+                  <a:srgbClr val="FF0000"/>
+                </a:solidFill>
+              </a:rPr>
+              <a:t>EMIT</a:t>
+            </a:r>
+          </a:p>
+        </p:txBody>
+      </p:sp>
+      <p:cxnSp>
+        <p:nvCxnSpPr>
+          <p:cNvPr id="30" name="Straight Connector 29"/>
+          <p:cNvCxnSpPr/>
+          <p:nvPr/>
+        </p:nvCxnSpPr>
+        <p:spPr>
+          <a:xfrm>
+            <a:off x="5733143" y="0"/>
+            <a:ext cx="29028" cy="6858000"/>
+          </a:xfrm>
+          <a:prstGeom prst="line">
+            <a:avLst/>
+          </a:prstGeom>
+        </p:spPr>
+        <p:style>
+          <a:lnRef idx="1">
+            <a:schemeClr val="accent1"/>
+          </a:lnRef>
+          <a:fillRef idx="0">
+            <a:schemeClr val="accent1"/>
+          </a:fillRef>
+          <a:effectRef idx="0">
+            <a:schemeClr val="accent1"/>
+          </a:effectRef>
+          <a:fontRef idx="minor">
+            <a:schemeClr val="tx1"/>
+          </a:fontRef>
+        </p:style>
+      </p:cxnSp>
+      <p:sp>
+        <p:nvSpPr>
+          <p:cNvPr id="31" name="TextBox 30"/>
+          <p:cNvSpPr txBox="1"/>
+          <p:nvPr/>
+        </p:nvSpPr>
+        <p:spPr>
+          <a:xfrm>
+            <a:off x="6720447" y="481416"/>
+            <a:ext cx="639919" cy="303481"/>
+          </a:xfrm>
+          <a:prstGeom prst="rect">
+            <a:avLst/>
+          </a:prstGeom>
+          <a:noFill/>
+        </p:spPr>
+        <p:txBody>
+          <a:bodyPr wrap="none" rtlCol="0">
+            <a:spAutoFit/>
+          </a:bodyPr>
+          <a:lstStyle/>
+          <a:p>
+            <a:r>
+              <a:rPr lang="en-US" sz="1372" b="1" i="1" dirty="0">
+                <a:solidFill>
+                  <a:srgbClr val="FF0000"/>
+                </a:solidFill>
+              </a:rPr>
+              <a:t>&lt;app&gt;</a:t>
+            </a:r>
+          </a:p>
+        </p:txBody>
+      </p:sp>
+      <p:sp>
+        <p:nvSpPr>
+          <p:cNvPr id="32" name="Rounded Rectangle 31"/>
+          <p:cNvSpPr/>
+          <p:nvPr/>
+        </p:nvSpPr>
+        <p:spPr>
+          <a:xfrm>
+            <a:off x="6234390" y="310835"/>
+            <a:ext cx="1650319" cy="1166483"/>
+          </a:xfrm>
+          <a:prstGeom prst="roundRect">
+            <a:avLst/>
+          </a:prstGeom>
+          <a:noFill/>
+          <a:ln>
+            <a:solidFill>
+              <a:srgbClr val="FF0000"/>
+            </a:solidFill>
+            <a:prstDash val="lgDash"/>
+          </a:ln>
+        </p:spPr>
+        <p:style>
+          <a:lnRef idx="2">
+            <a:schemeClr val="accent1">
+              <a:shade val="50000"/>
+            </a:schemeClr>
+          </a:lnRef>
+          <a:fillRef idx="1">
+            <a:schemeClr val="accent1"/>
+          </a:fillRef>
+          <a:effectRef idx="0">
+            <a:schemeClr val="accent1"/>
+          </a:effectRef>
+          <a:fontRef idx="minor">
+            <a:schemeClr val="lt1"/>
+          </a:fontRef>
+        </p:style>
+        <p:txBody>
+          <a:bodyPr rtlCol="0" anchor="ctr"/>
+          <a:lstStyle/>
+          <a:p>
+            <a:pPr algn="ctr"/>
+            <a:endParaRPr lang="en-US" sz="1372"/>
+          </a:p>
+        </p:txBody>
+      </p:sp>
+      <p:sp>
+        <p:nvSpPr>
+          <p:cNvPr id="33" name="TextBox 32"/>
+          <p:cNvSpPr txBox="1"/>
+          <p:nvPr/>
+        </p:nvSpPr>
+        <p:spPr>
+          <a:xfrm>
+            <a:off x="6596120" y="894076"/>
+            <a:ext cx="926857" cy="303481"/>
+          </a:xfrm>
+          <a:prstGeom prst="rect">
+            <a:avLst/>
+          </a:prstGeom>
+          <a:noFill/>
+        </p:spPr>
+        <p:txBody>
+          <a:bodyPr wrap="none" rtlCol="0">
+            <a:spAutoFit/>
+          </a:bodyPr>
+          <a:lstStyle/>
+          <a:p>
+            <a:r>
+              <a:rPr lang="en-US" sz="1372" dirty="0"/>
+              <a:t>Students[]</a:t>
+            </a:r>
+          </a:p>
+        </p:txBody>
+      </p:sp>
+      <p:sp>
+        <p:nvSpPr>
+          <p:cNvPr id="34" name="TextBox 33"/>
+          <p:cNvSpPr txBox="1"/>
+          <p:nvPr/>
+        </p:nvSpPr>
+        <p:spPr>
+          <a:xfrm>
+            <a:off x="6234390" y="1613780"/>
+            <a:ext cx="2858411" cy="303481"/>
+          </a:xfrm>
+          <a:prstGeom prst="rect">
+            <a:avLst/>
+          </a:prstGeom>
+          <a:noFill/>
+        </p:spPr>
+        <p:txBody>
+          <a:bodyPr wrap="none" rtlCol="0">
+            <a:spAutoFit/>
+          </a:bodyPr>
+          <a:lstStyle/>
+          <a:p>
+            <a:r>
+              <a:rPr lang="en-US" sz="1372" dirty="0"/>
+              <a:t>// </a:t>
+            </a:r>
+            <a:r>
+              <a:rPr lang="en-US" sz="1372" dirty="0">
+                <a:solidFill>
+                  <a:srgbClr val="FF0000"/>
+                </a:solidFill>
+              </a:rPr>
+              <a:t>app</a:t>
+            </a:r>
+            <a:r>
+              <a:rPr lang="en-US" sz="1372" dirty="0"/>
+              <a:t>  provides students to anymore</a:t>
+            </a:r>
+            <a:endParaRPr lang="en-US" sz="1372" dirty="0">
+              <a:solidFill>
+                <a:srgbClr val="FF0000"/>
+              </a:solidFill>
+            </a:endParaRPr>
+          </a:p>
+        </p:txBody>
+      </p:sp>
+      <p:sp>
+        <p:nvSpPr>
+          <p:cNvPr id="35" name="Rounded Rectangle 34"/>
+          <p:cNvSpPr/>
+          <p:nvPr/>
+        </p:nvSpPr>
+        <p:spPr>
+          <a:xfrm>
+            <a:off x="9792269" y="2129025"/>
+            <a:ext cx="1650319" cy="1166483"/>
+          </a:xfrm>
+          <a:prstGeom prst="roundRect">
+            <a:avLst/>
+          </a:prstGeom>
+          <a:noFill/>
+          <a:ln>
+            <a:solidFill>
+              <a:srgbClr val="FF0000"/>
+            </a:solidFill>
+            <a:prstDash val="lgDash"/>
+          </a:ln>
+        </p:spPr>
+        <p:style>
+          <a:lnRef idx="2">
+            <a:schemeClr val="accent1">
+              <a:shade val="50000"/>
+            </a:schemeClr>
+          </a:lnRef>
+          <a:fillRef idx="1">
+            <a:schemeClr val="accent1"/>
+          </a:fillRef>
+          <a:effectRef idx="0">
+            <a:schemeClr val="accent1"/>
+          </a:effectRef>
+          <a:fontRef idx="minor">
+            <a:schemeClr val="lt1"/>
+          </a:fontRef>
+        </p:style>
+        <p:txBody>
+          <a:bodyPr rtlCol="0" anchor="ctr"/>
+          <a:lstStyle/>
+          <a:p>
+            <a:pPr algn="ctr"/>
+            <a:endParaRPr lang="en-US" sz="1372"/>
+          </a:p>
+        </p:txBody>
+      </p:sp>
+      <p:sp>
+        <p:nvSpPr>
+          <p:cNvPr id="36" name="TextBox 35"/>
+          <p:cNvSpPr txBox="1"/>
+          <p:nvPr/>
+        </p:nvSpPr>
+        <p:spPr>
+          <a:xfrm>
+            <a:off x="10153999" y="2712266"/>
+            <a:ext cx="926857" cy="303481"/>
+          </a:xfrm>
+          <a:prstGeom prst="rect">
+            <a:avLst/>
+          </a:prstGeom>
+          <a:noFill/>
+        </p:spPr>
+        <p:txBody>
+          <a:bodyPr wrap="none" rtlCol="0">
+            <a:spAutoFit/>
+          </a:bodyPr>
+          <a:lstStyle/>
+          <a:p>
+            <a:r>
+              <a:rPr lang="en-US" sz="1372" dirty="0"/>
+              <a:t>Students[]</a:t>
+            </a:r>
+          </a:p>
+        </p:txBody>
+      </p:sp>
+      <p:sp>
+        <p:nvSpPr>
+          <p:cNvPr id="40" name="TextBox 39"/>
+          <p:cNvSpPr txBox="1"/>
+          <p:nvPr/>
+        </p:nvSpPr>
+        <p:spPr>
+          <a:xfrm>
+            <a:off x="10297467" y="2308056"/>
+            <a:ext cx="819455" cy="303481"/>
+          </a:xfrm>
+          <a:prstGeom prst="rect">
+            <a:avLst/>
+          </a:prstGeom>
+          <a:noFill/>
+        </p:spPr>
+        <p:txBody>
+          <a:bodyPr wrap="none" rtlCol="0">
+            <a:spAutoFit/>
+          </a:bodyPr>
+          <a:lstStyle/>
+          <a:p>
+            <a:r>
+              <a:rPr lang="en-US" sz="1372" b="1" i="1" dirty="0">
+                <a:solidFill>
+                  <a:srgbClr val="FF0000"/>
+                </a:solidFill>
+              </a:rPr>
+              <a:t>&lt;dialog&gt;</a:t>
+            </a:r>
+          </a:p>
+        </p:txBody>
+      </p:sp>
+      <p:sp>
+        <p:nvSpPr>
+          <p:cNvPr id="41" name="Right Arrow 40"/>
+          <p:cNvSpPr/>
+          <p:nvPr/>
+        </p:nvSpPr>
+        <p:spPr>
+          <a:xfrm>
+            <a:off x="7846423" y="727951"/>
+            <a:ext cx="696809" cy="333683"/>
+          </a:xfrm>
+          <a:prstGeom prst="rightArrow">
+            <a:avLst/>
+          </a:prstGeom>
+          <a:solidFill>
+            <a:srgbClr val="FFFF00"/>
+          </a:solidFill>
+        </p:spPr>
+        <p:style>
+          <a:lnRef idx="2">
+            <a:schemeClr val="accent1">
+              <a:shade val="50000"/>
+            </a:schemeClr>
+          </a:lnRef>
+          <a:fillRef idx="1">
+            <a:schemeClr val="accent1"/>
+          </a:fillRef>
+          <a:effectRef idx="0">
+            <a:schemeClr val="accent1"/>
+          </a:effectRef>
+          <a:fontRef idx="minor">
+            <a:schemeClr val="lt1"/>
+          </a:fontRef>
+        </p:style>
+        <p:txBody>
+          <a:bodyPr rot="0" spcFirstLastPara="0" vertOverflow="overflow" horzOverflow="overflow" vert="horz" wrap="square" lIns="69681" tIns="34840" rIns="69681" bIns="34840" numCol="1" spcCol="0" rtlCol="0" fromWordArt="0" anchor="ctr" anchorCtr="0" forceAA="0" compatLnSpc="1">
+            <a:prstTxWarp prst="textNoShape">
+              <a:avLst/>
+            </a:prstTxWarp>
+            <a:noAutofit/>
+          </a:bodyPr>
+          <a:lstStyle/>
+          <a:p>
+            <a:pPr algn="ctr"/>
+            <a:endParaRPr lang="en-US" sz="1372"/>
+          </a:p>
+        </p:txBody>
+      </p:sp>
+      <p:sp>
+        <p:nvSpPr>
+          <p:cNvPr id="42" name="TextBox 41"/>
+          <p:cNvSpPr txBox="1"/>
+          <p:nvPr/>
+        </p:nvSpPr>
+        <p:spPr>
+          <a:xfrm>
+            <a:off x="7837364" y="509852"/>
+            <a:ext cx="838756" cy="303481"/>
+          </a:xfrm>
+          <a:prstGeom prst="rect">
+            <a:avLst/>
+          </a:prstGeom>
+          <a:noFill/>
+        </p:spPr>
+        <p:txBody>
+          <a:bodyPr wrap="none" rtlCol="0">
+            <a:spAutoFit/>
+          </a:bodyPr>
+          <a:lstStyle/>
+          <a:p>
+            <a:r>
+              <a:rPr lang="en-US" sz="1372" b="1" dirty="0">
+                <a:solidFill>
+                  <a:schemeClr val="accent4"/>
+                </a:solidFill>
+              </a:rPr>
+              <a:t>PROVIDE</a:t>
+            </a:r>
+          </a:p>
+        </p:txBody>
+      </p:sp>
+      <p:sp>
+        <p:nvSpPr>
+          <p:cNvPr id="43" name="TextBox 42"/>
+          <p:cNvSpPr txBox="1"/>
+          <p:nvPr/>
+        </p:nvSpPr>
+        <p:spPr>
+          <a:xfrm>
+            <a:off x="7991050" y="1073307"/>
+            <a:ext cx="926857" cy="303481"/>
+          </a:xfrm>
+          <a:prstGeom prst="rect">
+            <a:avLst/>
+          </a:prstGeom>
+          <a:noFill/>
+        </p:spPr>
+        <p:txBody>
+          <a:bodyPr wrap="none" rtlCol="0">
+            <a:spAutoFit/>
+          </a:bodyPr>
+          <a:lstStyle/>
+          <a:p>
+            <a:r>
+              <a:rPr lang="en-US" sz="1372" dirty="0"/>
+              <a:t>Students[]</a:t>
+            </a:r>
+          </a:p>
+        </p:txBody>
+      </p:sp>
+      <p:sp>
+        <p:nvSpPr>
+          <p:cNvPr id="44" name="Right Arrow 43"/>
+          <p:cNvSpPr/>
+          <p:nvPr/>
+        </p:nvSpPr>
+        <p:spPr>
+          <a:xfrm>
+            <a:off x="9135788" y="2542676"/>
+            <a:ext cx="696809" cy="333683"/>
+          </a:xfrm>
+          <a:prstGeom prst="rightArrow">
+            <a:avLst/>
+          </a:prstGeom>
+          <a:solidFill>
+            <a:srgbClr val="FFFF00"/>
+          </a:solidFill>
+        </p:spPr>
+        <p:style>
+          <a:lnRef idx="2">
+            <a:schemeClr val="accent1">
+              <a:shade val="50000"/>
+            </a:schemeClr>
+          </a:lnRef>
+          <a:fillRef idx="1">
+            <a:schemeClr val="accent1"/>
+          </a:fillRef>
+          <a:effectRef idx="0">
+            <a:schemeClr val="accent1"/>
+          </a:effectRef>
+          <a:fontRef idx="minor">
+            <a:schemeClr val="lt1"/>
+          </a:fontRef>
+        </p:style>
+        <p:txBody>
+          <a:bodyPr rot="0" spcFirstLastPara="0" vertOverflow="overflow" horzOverflow="overflow" vert="horz" wrap="square" lIns="69681" tIns="34840" rIns="69681" bIns="34840" numCol="1" spcCol="0" rtlCol="0" fromWordArt="0" anchor="ctr" anchorCtr="0" forceAA="0" compatLnSpc="1">
+            <a:prstTxWarp prst="textNoShape">
+              <a:avLst/>
+            </a:prstTxWarp>
+            <a:noAutofit/>
+          </a:bodyPr>
+          <a:lstStyle/>
+          <a:p>
+            <a:pPr algn="ctr"/>
+            <a:endParaRPr lang="en-US" sz="1372"/>
+          </a:p>
+        </p:txBody>
+      </p:sp>
+      <p:sp>
+        <p:nvSpPr>
+          <p:cNvPr id="45" name="TextBox 44"/>
+          <p:cNvSpPr txBox="1"/>
+          <p:nvPr/>
+        </p:nvSpPr>
+        <p:spPr>
+          <a:xfrm>
+            <a:off x="9126729" y="2324577"/>
+            <a:ext cx="668645" cy="303481"/>
+          </a:xfrm>
+          <a:prstGeom prst="rect">
+            <a:avLst/>
+          </a:prstGeom>
+          <a:noFill/>
+        </p:spPr>
+        <p:txBody>
+          <a:bodyPr wrap="none" rtlCol="0">
+            <a:spAutoFit/>
+          </a:bodyPr>
+          <a:lstStyle/>
+          <a:p>
+            <a:r>
+              <a:rPr lang="en-US" sz="1372" b="1" dirty="0">
                 <a:solidFill>
                   <a:schemeClr val="accent4"/>
                 </a:solidFill>
               </a:rPr>
               <a:t>INJECT</a:t>
             </a:r>
-            <a:endParaRPr lang="en-US" sz="1372" b="1" dirty="0">
-              <a:solidFill>
-                <a:schemeClr val="accent4"/>
-              </a:solidFill>
-            </a:endParaRPr>
           </a:p>
         </p:txBody>
       </p:sp>
@@ -4676,10 +6364,9 @@
           <a:lstStyle/>
           <a:p>
             <a:r>
-              <a:rPr lang="en-US" sz="1372" dirty="0" smtClean="0"/>
+              <a:rPr lang="en-US" sz="1372" dirty="0"/>
               <a:t>Students[]</a:t>
             </a:r>
-            <a:endParaRPr lang="en-US" sz="1372" dirty="0"/>
           </a:p>
         </p:txBody>
       </p:sp>
@@ -4706,11 +6393,11 @@
           <a:lstStyle/>
           <a:p>
             <a:r>
-              <a:rPr lang="en-US" sz="1372" dirty="0" smtClean="0"/>
+              <a:rPr lang="en-US" sz="1372" dirty="0"/>
               <a:t>// </a:t>
             </a:r>
             <a:r>
-              <a:rPr lang="en-US" sz="1372" dirty="0" smtClean="0">
+              <a:rPr lang="en-US" sz="1372" dirty="0">
                 <a:solidFill>
                   <a:srgbClr val="FF0000"/>
                 </a:solidFill>
@@ -4718,7 +6405,7 @@
               <a:t>dialog </a:t>
             </a:r>
             <a:r>
-              <a:rPr lang="en-US" sz="1372" dirty="0" smtClean="0"/>
+              <a:rPr lang="en-US" sz="1372" dirty="0"/>
               <a:t> gets students from a provider</a:t>
             </a:r>
             <a:endParaRPr lang="en-US" sz="1372" dirty="0">
@@ -4832,15 +6519,15 @@
           <a:lstStyle/>
           <a:p>
             <a:r>
-              <a:rPr lang="en-US" sz="1372" dirty="0" smtClean="0"/>
+              <a:rPr lang="en-US" sz="1372" dirty="0"/>
               <a:t>// </a:t>
             </a:r>
             <a:r>
-              <a:rPr lang="en-US" sz="1372" dirty="0" err="1" smtClean="0"/>
+              <a:rPr lang="en-US" sz="1372" dirty="0" err="1"/>
               <a:t>Vue</a:t>
             </a:r>
             <a:r>
-              <a:rPr lang="en-US" sz="1372" dirty="0" smtClean="0"/>
+              <a:rPr lang="en-US" sz="1372" dirty="0"/>
               <a:t> JS built-in component</a:t>
             </a:r>
             <a:endParaRPr lang="en-US" sz="1372" dirty="0">

</xml_diff>

<commit_message>
#14 edit manage user for back end
</commit_message>
<xml_diff>
--- a/docs/COMPONENT-DIAGRAM.pptx
+++ b/docs/COMPONENT-DIAGRAM.pptx
@@ -7,7 +7,7 @@
   <p:sldIdLst>
     <p:sldId id="256" r:id="rId2"/>
     <p:sldId id="259" r:id="rId3"/>
-    <p:sldId id="258" r:id="rId4"/>
+    <p:sldId id="260" r:id="rId4"/>
   </p:sldIdLst>
   <p:sldSz cx="12192000" cy="6858000"/>
   <p:notesSz cx="6858000" cy="9144000"/>
@@ -243,7 +243,7 @@
           <a:p>
             <a:fld id="{28BE630F-C39C-4DB9-8258-0B48CA067079}" type="datetimeFigureOut">
               <a:rPr lang="en-US" smtClean="0"/>
-              <a:t>11/28/2021</a:t>
+              <a:t>11/29/2021</a:t>
             </a:fld>
             <a:endParaRPr lang="en-US"/>
           </a:p>
@@ -411,7 +411,7 @@
           <a:p>
             <a:fld id="{28BE630F-C39C-4DB9-8258-0B48CA067079}" type="datetimeFigureOut">
               <a:rPr lang="en-US" smtClean="0"/>
-              <a:t>11/28/2021</a:t>
+              <a:t>11/29/2021</a:t>
             </a:fld>
             <a:endParaRPr lang="en-US"/>
           </a:p>
@@ -589,7 +589,7 @@
           <a:p>
             <a:fld id="{28BE630F-C39C-4DB9-8258-0B48CA067079}" type="datetimeFigureOut">
               <a:rPr lang="en-US" smtClean="0"/>
-              <a:t>11/28/2021</a:t>
+              <a:t>11/29/2021</a:t>
             </a:fld>
             <a:endParaRPr lang="en-US"/>
           </a:p>
@@ -757,7 +757,7 @@
           <a:p>
             <a:fld id="{28BE630F-C39C-4DB9-8258-0B48CA067079}" type="datetimeFigureOut">
               <a:rPr lang="en-US" smtClean="0"/>
-              <a:t>11/28/2021</a:t>
+              <a:t>11/29/2021</a:t>
             </a:fld>
             <a:endParaRPr lang="en-US"/>
           </a:p>
@@ -1002,7 +1002,7 @@
           <a:p>
             <a:fld id="{28BE630F-C39C-4DB9-8258-0B48CA067079}" type="datetimeFigureOut">
               <a:rPr lang="en-US" smtClean="0"/>
-              <a:t>11/28/2021</a:t>
+              <a:t>11/29/2021</a:t>
             </a:fld>
             <a:endParaRPr lang="en-US"/>
           </a:p>
@@ -1231,7 +1231,7 @@
           <a:p>
             <a:fld id="{28BE630F-C39C-4DB9-8258-0B48CA067079}" type="datetimeFigureOut">
               <a:rPr lang="en-US" smtClean="0"/>
-              <a:t>11/28/2021</a:t>
+              <a:t>11/29/2021</a:t>
             </a:fld>
             <a:endParaRPr lang="en-US"/>
           </a:p>
@@ -1595,7 +1595,7 @@
           <a:p>
             <a:fld id="{28BE630F-C39C-4DB9-8258-0B48CA067079}" type="datetimeFigureOut">
               <a:rPr lang="en-US" smtClean="0"/>
-              <a:t>11/28/2021</a:t>
+              <a:t>11/29/2021</a:t>
             </a:fld>
             <a:endParaRPr lang="en-US"/>
           </a:p>
@@ -1712,7 +1712,7 @@
           <a:p>
             <a:fld id="{28BE630F-C39C-4DB9-8258-0B48CA067079}" type="datetimeFigureOut">
               <a:rPr lang="en-US" smtClean="0"/>
-              <a:t>11/28/2021</a:t>
+              <a:t>11/29/2021</a:t>
             </a:fld>
             <a:endParaRPr lang="en-US"/>
           </a:p>
@@ -1807,7 +1807,7 @@
           <a:p>
             <a:fld id="{28BE630F-C39C-4DB9-8258-0B48CA067079}" type="datetimeFigureOut">
               <a:rPr lang="en-US" smtClean="0"/>
-              <a:t>11/28/2021</a:t>
+              <a:t>11/29/2021</a:t>
             </a:fld>
             <a:endParaRPr lang="en-US"/>
           </a:p>
@@ -2082,7 +2082,7 @@
           <a:p>
             <a:fld id="{28BE630F-C39C-4DB9-8258-0B48CA067079}" type="datetimeFigureOut">
               <a:rPr lang="en-US" smtClean="0"/>
-              <a:t>11/28/2021</a:t>
+              <a:t>11/29/2021</a:t>
             </a:fld>
             <a:endParaRPr lang="en-US"/>
           </a:p>
@@ -2334,7 +2334,7 @@
           <a:p>
             <a:fld id="{28BE630F-C39C-4DB9-8258-0B48CA067079}" type="datetimeFigureOut">
               <a:rPr lang="en-US" smtClean="0"/>
-              <a:t>11/28/2021</a:t>
+              <a:t>11/29/2021</a:t>
             </a:fld>
             <a:endParaRPr lang="en-US"/>
           </a:p>
@@ -2545,7 +2545,7 @@
           <a:p>
             <a:fld id="{28BE630F-C39C-4DB9-8258-0B48CA067079}" type="datetimeFigureOut">
               <a:rPr lang="en-US" smtClean="0"/>
-              <a:t>11/28/2021</a:t>
+              <a:t>11/29/2021</a:t>
             </a:fld>
             <a:endParaRPr lang="en-US"/>
           </a:p>
@@ -3207,10 +3207,134 @@
       </p:grpSpPr>
       <p:sp>
         <p:nvSpPr>
-          <p:cNvPr id="3" name="Rounded Rectangle 4">
+          <p:cNvPr id="52" name="Title 1">
             <a:extLst>
               <a:ext uri="{FF2B5EF4-FFF2-40B4-BE49-F238E27FC236}">
-                <a16:creationId xmlns:a16="http://schemas.microsoft.com/office/drawing/2014/main" id="{1C3F6827-73AD-40E5-A9AA-AF1EA15411B0}"/>
+                <a16:creationId xmlns:a16="http://schemas.microsoft.com/office/drawing/2014/main" id="{3B46C00C-F54F-4504-BD29-FC86309D52E2}"/>
+              </a:ext>
+            </a:extLst>
+          </p:cNvPr>
+          <p:cNvSpPr txBox="1">
+            <a:spLocks/>
+          </p:cNvSpPr>
+          <p:nvPr/>
+        </p:nvSpPr>
+        <p:spPr>
+          <a:xfrm>
+            <a:off x="838200" y="365126"/>
+            <a:ext cx="4860235" cy="315912"/>
+          </a:xfrm>
+          <a:prstGeom prst="rect">
+            <a:avLst/>
+          </a:prstGeom>
+        </p:spPr>
+        <p:txBody>
+          <a:bodyPr>
+            <a:normAutofit fontScale="52500" lnSpcReduction="20000"/>
+          </a:bodyPr>
+          <a:lstStyle>
+            <a:lvl1pPr algn="l" defTabSz="914400" rtl="0" eaLnBrk="1" latinLnBrk="0" hangingPunct="1">
+              <a:lnSpc>
+                <a:spcPct val="90000"/>
+              </a:lnSpc>
+              <a:spcBef>
+                <a:spcPct val="0"/>
+              </a:spcBef>
+              <a:buNone/>
+              <a:defRPr sz="4400" kern="1200">
+                <a:solidFill>
+                  <a:schemeClr val="tx1"/>
+                </a:solidFill>
+                <a:latin typeface="+mj-lt"/>
+                <a:ea typeface="+mj-ea"/>
+                <a:cs typeface="+mj-cs"/>
+              </a:defRPr>
+            </a:lvl1pPr>
+          </a:lstStyle>
+          <a:p>
+            <a:r>
+              <a:rPr lang="en-US" sz="3600" b="1"/>
+              <a:t>Sign in Component Diagram</a:t>
+            </a:r>
+            <a:endParaRPr lang="en-US" sz="3600" b="1" dirty="0"/>
+          </a:p>
+        </p:txBody>
+      </p:sp>
+      <p:pic>
+        <p:nvPicPr>
+          <p:cNvPr id="53" name="Picture 52">
+            <a:extLst>
+              <a:ext uri="{FF2B5EF4-FFF2-40B4-BE49-F238E27FC236}">
+                <a16:creationId xmlns:a16="http://schemas.microsoft.com/office/drawing/2014/main" id="{A6D26DDE-01C3-4197-A5AC-5315967356B5}"/>
+              </a:ext>
+            </a:extLst>
+          </p:cNvPr>
+          <p:cNvPicPr>
+            <a:picLocks noChangeAspect="1"/>
+          </p:cNvPicPr>
+          <p:nvPr/>
+        </p:nvPicPr>
+        <p:blipFill>
+          <a:blip r:embed="rId2"/>
+          <a:stretch>
+            <a:fillRect/>
+          </a:stretch>
+        </p:blipFill>
+        <p:spPr>
+          <a:xfrm>
+            <a:off x="310727" y="1147082"/>
+            <a:ext cx="3181350" cy="3533775"/>
+          </a:xfrm>
+          <a:prstGeom prst="rect">
+            <a:avLst/>
+          </a:prstGeom>
+        </p:spPr>
+      </p:pic>
+      <p:sp>
+        <p:nvSpPr>
+          <p:cNvPr id="54" name="TextBox 53">
+            <a:extLst>
+              <a:ext uri="{FF2B5EF4-FFF2-40B4-BE49-F238E27FC236}">
+                <a16:creationId xmlns:a16="http://schemas.microsoft.com/office/drawing/2014/main" id="{993AFA19-7001-4231-B8E9-4668002514D1}"/>
+              </a:ext>
+            </a:extLst>
+          </p:cNvPr>
+          <p:cNvSpPr txBox="1"/>
+          <p:nvPr/>
+        </p:nvSpPr>
+        <p:spPr>
+          <a:xfrm>
+            <a:off x="4895877" y="1741731"/>
+            <a:ext cx="780983" cy="303481"/>
+          </a:xfrm>
+          <a:prstGeom prst="rect">
+            <a:avLst/>
+          </a:prstGeom>
+          <a:noFill/>
+        </p:spPr>
+        <p:txBody>
+          <a:bodyPr wrap="none" rtlCol="0">
+            <a:spAutoFit/>
+          </a:bodyPr>
+          <a:lstStyle/>
+          <a:p>
+            <a:r>
+              <a:rPr lang="en-US" sz="1372" b="1" i="1" dirty="0">
+                <a:solidFill>
+                  <a:srgbClr val="FF0000"/>
+                </a:solidFill>
+              </a:rPr>
+              <a:t>&lt;log-in&gt;</a:t>
+            </a:r>
+          </a:p>
+        </p:txBody>
+      </p:sp>
+      <p:sp>
+        <p:nvSpPr>
+          <p:cNvPr id="59" name="Rounded Rectangle 31">
+            <a:extLst>
+              <a:ext uri="{FF2B5EF4-FFF2-40B4-BE49-F238E27FC236}">
+                <a16:creationId xmlns:a16="http://schemas.microsoft.com/office/drawing/2014/main" id="{7A095B2C-F4DE-43CD-9F4E-A2409E37721A}"/>
               </a:ext>
             </a:extLst>
           </p:cNvPr>
@@ -3219,8 +3343,8 @@
         </p:nvSpPr>
         <p:spPr>
           <a:xfrm>
-            <a:off x="751925" y="1382193"/>
-            <a:ext cx="8703228" cy="567257"/>
+            <a:off x="4598504" y="1571151"/>
+            <a:ext cx="1650319" cy="630068"/>
           </a:xfrm>
           <a:prstGeom prst="roundRect">
             <a:avLst/>
@@ -3260,10 +3384,10 @@
       </p:sp>
       <p:sp>
         <p:nvSpPr>
-          <p:cNvPr id="4" name="TextBox 3">
+          <p:cNvPr id="65" name="TextBox 64">
             <a:extLst>
               <a:ext uri="{FF2B5EF4-FFF2-40B4-BE49-F238E27FC236}">
-                <a16:creationId xmlns:a16="http://schemas.microsoft.com/office/drawing/2014/main" id="{DBA6053D-382F-40BC-A6BB-EBFF64E52C2D}"/>
+                <a16:creationId xmlns:a16="http://schemas.microsoft.com/office/drawing/2014/main" id="{1557ABEB-5D05-4619-970D-C0DCC800E4EE}"/>
               </a:ext>
             </a:extLst>
           </p:cNvPr>
@@ -3272,7 +3396,7 @@
         </p:nvSpPr>
         <p:spPr>
           <a:xfrm>
-            <a:off x="3168379" y="479624"/>
+            <a:off x="9235964" y="1589990"/>
             <a:ext cx="639919" cy="303481"/>
           </a:xfrm>
           <a:prstGeom prst="rect">
@@ -3299,10 +3423,10 @@
       </p:sp>
       <p:sp>
         <p:nvSpPr>
-          <p:cNvPr id="6" name="Right Arrow 21">
+          <p:cNvPr id="66" name="Rounded Rectangle 31">
             <a:extLst>
               <a:ext uri="{FF2B5EF4-FFF2-40B4-BE49-F238E27FC236}">
-                <a16:creationId xmlns:a16="http://schemas.microsoft.com/office/drawing/2014/main" id="{121A9F91-57E1-44B3-ABC4-46259DB9D38E}"/>
+                <a16:creationId xmlns:a16="http://schemas.microsoft.com/office/drawing/2014/main" id="{91E3641F-66F9-49A0-BBD1-B7396D7FE14B}"/>
               </a:ext>
             </a:extLst>
           </p:cNvPr>
@@ -3311,147 +3435,8 @@
         </p:nvSpPr>
         <p:spPr>
           <a:xfrm>
-            <a:off x="4415193" y="622873"/>
-            <a:ext cx="510152" cy="253427"/>
-          </a:xfrm>
-          <a:prstGeom prst="rightArrow">
-            <a:avLst/>
-          </a:prstGeom>
-        </p:spPr>
-        <p:style>
-          <a:lnRef idx="1">
-            <a:schemeClr val="accent1"/>
-          </a:lnRef>
-          <a:fillRef idx="3">
-            <a:schemeClr val="accent1"/>
-          </a:fillRef>
-          <a:effectRef idx="2">
-            <a:schemeClr val="accent1"/>
-          </a:effectRef>
-          <a:fontRef idx="minor">
-            <a:schemeClr val="lt1"/>
-          </a:fontRef>
-        </p:style>
-        <p:txBody>
-          <a:bodyPr rot="0" spcFirstLastPara="0" vertOverflow="overflow" horzOverflow="overflow" vert="horz" wrap="square" lIns="69681" tIns="34840" rIns="69681" bIns="34840" numCol="1" spcCol="0" rtlCol="0" fromWordArt="0" anchor="ctr" anchorCtr="0" forceAA="0" compatLnSpc="1">
-            <a:prstTxWarp prst="textNoShape">
-              <a:avLst/>
-            </a:prstTxWarp>
-            <a:noAutofit/>
-          </a:bodyPr>
-          <a:lstStyle/>
-          <a:p>
-            <a:pPr algn="ctr"/>
-            <a:endParaRPr lang="en-US" sz="1372">
-              <a:ln w="0"/>
-              <a:solidFill>
-                <a:schemeClr val="accent1"/>
-              </a:solidFill>
-              <a:effectLst>
-                <a:outerShdw blurRad="38100" dist="25400" dir="5400000" algn="ctr" rotWithShape="0">
-                  <a:srgbClr val="6E747A">
-                    <a:alpha val="43000"/>
-                  </a:srgbClr>
-                </a:outerShdw>
-              </a:effectLst>
-            </a:endParaRPr>
-          </a:p>
-        </p:txBody>
-      </p:sp>
-      <p:sp>
-        <p:nvSpPr>
-          <p:cNvPr id="7" name="TextBox 6">
-            <a:extLst>
-              <a:ext uri="{FF2B5EF4-FFF2-40B4-BE49-F238E27FC236}">
-                <a16:creationId xmlns:a16="http://schemas.microsoft.com/office/drawing/2014/main" id="{4ADC46AF-9F7F-45D0-BE17-61EBAE755FBB}"/>
-              </a:ext>
-            </a:extLst>
-          </p:cNvPr>
-          <p:cNvSpPr txBox="1"/>
-          <p:nvPr/>
-        </p:nvSpPr>
-        <p:spPr>
-          <a:xfrm>
-            <a:off x="4310489" y="384918"/>
-            <a:ext cx="838756" cy="303481"/>
-          </a:xfrm>
-          <a:prstGeom prst="rect">
-            <a:avLst/>
-          </a:prstGeom>
-          <a:noFill/>
-        </p:spPr>
-        <p:txBody>
-          <a:bodyPr wrap="none" rtlCol="0">
-            <a:spAutoFit/>
-          </a:bodyPr>
-          <a:lstStyle/>
-          <a:p>
-            <a:r>
-              <a:rPr lang="en-US" sz="1372" b="1" dirty="0">
-                <a:solidFill>
-                  <a:schemeClr val="accent1"/>
-                </a:solidFill>
-              </a:rPr>
-              <a:t>PROVIDE</a:t>
-            </a:r>
-          </a:p>
-        </p:txBody>
-      </p:sp>
-      <p:sp>
-        <p:nvSpPr>
-          <p:cNvPr id="8" name="TextBox 7">
-            <a:extLst>
-              <a:ext uri="{FF2B5EF4-FFF2-40B4-BE49-F238E27FC236}">
-                <a16:creationId xmlns:a16="http://schemas.microsoft.com/office/drawing/2014/main" id="{FF499AE0-39F9-4A7E-A432-0E348C62BE45}"/>
-              </a:ext>
-            </a:extLst>
-          </p:cNvPr>
-          <p:cNvSpPr txBox="1"/>
-          <p:nvPr/>
-        </p:nvSpPr>
-        <p:spPr>
-          <a:xfrm>
-            <a:off x="5848079" y="416124"/>
-            <a:ext cx="1149674" cy="303481"/>
-          </a:xfrm>
-          <a:prstGeom prst="rect">
-            <a:avLst/>
-          </a:prstGeom>
-          <a:noFill/>
-        </p:spPr>
-        <p:txBody>
-          <a:bodyPr wrap="none" rtlCol="0">
-            <a:spAutoFit/>
-          </a:bodyPr>
-          <a:lstStyle/>
-          <a:p>
-            <a:r>
-              <a:rPr lang="en-US" sz="1372" b="1" i="1" dirty="0">
-                <a:solidFill>
-                  <a:srgbClr val="FF0000"/>
-                </a:solidFill>
-              </a:rPr>
-              <a:t>&lt;navigation&gt;</a:t>
-            </a:r>
-          </a:p>
-        </p:txBody>
-      </p:sp>
-      <p:sp>
-        <p:nvSpPr>
-          <p:cNvPr id="9" name="Rounded Rectangle 4">
-            <a:extLst>
-              <a:ext uri="{FF2B5EF4-FFF2-40B4-BE49-F238E27FC236}">
-                <a16:creationId xmlns:a16="http://schemas.microsoft.com/office/drawing/2014/main" id="{E71D95A2-4801-411B-8E13-60570F6FDEB8}"/>
-              </a:ext>
-            </a:extLst>
-          </p:cNvPr>
-          <p:cNvSpPr/>
-          <p:nvPr/>
-        </p:nvSpPr>
-        <p:spPr>
-          <a:xfrm>
-            <a:off x="5622788" y="309043"/>
-            <a:ext cx="1650319" cy="567257"/>
+            <a:off x="8766313" y="1504890"/>
+            <a:ext cx="1650319" cy="853997"/>
           </a:xfrm>
           <a:prstGeom prst="roundRect">
             <a:avLst/>
@@ -3491,10 +3476,49 @@
       </p:sp>
       <p:sp>
         <p:nvSpPr>
-          <p:cNvPr id="10" name="Rounded Rectangle 4">
+          <p:cNvPr id="67" name="TextBox 66">
             <a:extLst>
               <a:ext uri="{FF2B5EF4-FFF2-40B4-BE49-F238E27FC236}">
-                <a16:creationId xmlns:a16="http://schemas.microsoft.com/office/drawing/2014/main" id="{32ADA94A-27F9-4D5A-B400-CA07138373C9}"/>
+                <a16:creationId xmlns:a16="http://schemas.microsoft.com/office/drawing/2014/main" id="{81CE266F-1308-4FAF-9078-25288F0C0BF9}"/>
+              </a:ext>
+            </a:extLst>
+          </p:cNvPr>
+          <p:cNvSpPr txBox="1"/>
+          <p:nvPr/>
+        </p:nvSpPr>
+        <p:spPr>
+          <a:xfrm>
+            <a:off x="9235963" y="1912311"/>
+            <a:ext cx="587020" cy="303481"/>
+          </a:xfrm>
+          <a:prstGeom prst="rect">
+            <a:avLst/>
+          </a:prstGeom>
+          <a:noFill/>
+        </p:spPr>
+        <p:txBody>
+          <a:bodyPr wrap="none" rtlCol="0">
+            <a:spAutoFit/>
+          </a:bodyPr>
+          <a:lstStyle/>
+          <a:p>
+            <a:r>
+              <a:rPr lang="en-US" sz="1372" b="1" i="1" dirty="0">
+                <a:solidFill>
+                  <a:srgbClr val="FF0000"/>
+                </a:solidFill>
+              </a:rPr>
+              <a:t>Users</a:t>
+            </a:r>
+          </a:p>
+        </p:txBody>
+      </p:sp>
+      <p:sp>
+        <p:nvSpPr>
+          <p:cNvPr id="68" name="Arrow: Down 67">
+            <a:extLst>
+              <a:ext uri="{FF2B5EF4-FFF2-40B4-BE49-F238E27FC236}">
+                <a16:creationId xmlns:a16="http://schemas.microsoft.com/office/drawing/2014/main" id="{DA179539-066A-405E-B2C4-069860F42824}"/>
               </a:ext>
             </a:extLst>
           </p:cNvPr>
@@ -3502,32 +3526,25 @@
           <p:nvPr/>
         </p:nvSpPr>
         <p:spPr>
-          <a:xfrm>
-            <a:off x="2725281" y="379961"/>
-            <a:ext cx="1650319" cy="567257"/>
-          </a:xfrm>
-          <a:prstGeom prst="roundRect">
+          <a:xfrm rot="16200000">
+            <a:off x="6809452" y="1153364"/>
+            <a:ext cx="172192" cy="1293450"/>
+          </a:xfrm>
+          <a:prstGeom prst="downArrow">
             <a:avLst/>
           </a:prstGeom>
-          <a:noFill/>
-          <a:ln>
-            <a:solidFill>
-              <a:srgbClr val="FF0000"/>
-            </a:solidFill>
-            <a:prstDash val="lgDash"/>
-          </a:ln>
         </p:spPr>
         <p:style>
           <a:lnRef idx="2">
-            <a:schemeClr val="accent1">
+            <a:schemeClr val="accent6">
               <a:shade val="50000"/>
             </a:schemeClr>
           </a:lnRef>
           <a:fillRef idx="1">
-            <a:schemeClr val="accent1"/>
+            <a:schemeClr val="accent6"/>
           </a:fillRef>
           <a:effectRef idx="0">
-            <a:schemeClr val="accent1"/>
+            <a:schemeClr val="accent6"/>
           </a:effectRef>
           <a:fontRef idx="minor">
             <a:schemeClr val="lt1"/>
@@ -3538,16 +3555,20 @@
           <a:lstStyle/>
           <a:p>
             <a:pPr algn="ctr"/>
-            <a:endParaRPr lang="en-US" sz="1372"/>
-          </a:p>
-        </p:txBody>
-      </p:sp>
-      <p:sp>
-        <p:nvSpPr>
-          <p:cNvPr id="11" name="TextBox 10">
+            <a:endParaRPr lang="en-US">
+              <a:solidFill>
+                <a:srgbClr val="FF0000"/>
+              </a:solidFill>
+            </a:endParaRPr>
+          </a:p>
+        </p:txBody>
+      </p:sp>
+      <p:sp>
+        <p:nvSpPr>
+          <p:cNvPr id="69" name="TextBox 68">
             <a:extLst>
               <a:ext uri="{FF2B5EF4-FFF2-40B4-BE49-F238E27FC236}">
-                <a16:creationId xmlns:a16="http://schemas.microsoft.com/office/drawing/2014/main" id="{531B3B2F-6EFB-48C8-8CF5-B2320489B760}"/>
+                <a16:creationId xmlns:a16="http://schemas.microsoft.com/office/drawing/2014/main" id="{EEDFFC01-625E-4B9B-B8AF-1ECEB30C6B9F}"/>
               </a:ext>
             </a:extLst>
           </p:cNvPr>
@@ -3556,8 +3577,8 @@
         </p:nvSpPr>
         <p:spPr>
           <a:xfrm>
-            <a:off x="4608402" y="1488853"/>
-            <a:ext cx="1215717" cy="303481"/>
+            <a:off x="6385425" y="1819423"/>
+            <a:ext cx="849913" cy="338554"/>
           </a:xfrm>
           <a:prstGeom prst="rect">
             <a:avLst/>
@@ -3565,449 +3586,24 @@
           <a:noFill/>
         </p:spPr>
         <p:txBody>
-          <a:bodyPr wrap="none" rtlCol="0">
+          <a:bodyPr wrap="square" rtlCol="0">
             <a:spAutoFit/>
           </a:bodyPr>
           <a:lstStyle/>
           <a:p>
             <a:r>
-              <a:rPr lang="en-US" sz="1372" b="1" i="1" dirty="0">
-                <a:solidFill>
-                  <a:srgbClr val="FF0000"/>
-                </a:solidFill>
-              </a:rPr>
-              <a:t>&lt;router-view&gt;</a:t>
-            </a:r>
-          </a:p>
-        </p:txBody>
-      </p:sp>
-      <p:cxnSp>
-        <p:nvCxnSpPr>
-          <p:cNvPr id="13" name="Straight Arrow Connector 12">
+              <a:rPr lang="en-US" sz="1600" dirty="0"/>
+              <a:t>user</a:t>
+            </a:r>
+          </a:p>
+        </p:txBody>
+      </p:sp>
+      <p:sp>
+        <p:nvSpPr>
+          <p:cNvPr id="70" name="TextBox 69">
             <a:extLst>
               <a:ext uri="{FF2B5EF4-FFF2-40B4-BE49-F238E27FC236}">
-                <a16:creationId xmlns:a16="http://schemas.microsoft.com/office/drawing/2014/main" id="{A9F3CA7B-A1E3-44DE-BFAE-D21F2647A6BA}"/>
-              </a:ext>
-            </a:extLst>
-          </p:cNvPr>
-          <p:cNvCxnSpPr>
-            <a:stCxn id="9" idx="2"/>
-          </p:cNvCxnSpPr>
-          <p:nvPr/>
-        </p:nvCxnSpPr>
-        <p:spPr>
-          <a:xfrm flipH="1">
-            <a:off x="6447947" y="876300"/>
-            <a:ext cx="1" cy="505893"/>
-          </a:xfrm>
-          <a:prstGeom prst="straightConnector1">
-            <a:avLst/>
-          </a:prstGeom>
-          <a:ln>
-            <a:tailEnd type="triangle"/>
-          </a:ln>
-        </p:spPr>
-        <p:style>
-          <a:lnRef idx="3">
-            <a:schemeClr val="accent1"/>
-          </a:lnRef>
-          <a:fillRef idx="0">
-            <a:schemeClr val="accent1"/>
-          </a:fillRef>
-          <a:effectRef idx="2">
-            <a:schemeClr val="accent1"/>
-          </a:effectRef>
-          <a:fontRef idx="minor">
-            <a:schemeClr val="tx1"/>
-          </a:fontRef>
-        </p:style>
-      </p:cxnSp>
-      <p:sp>
-        <p:nvSpPr>
-          <p:cNvPr id="15" name="Rounded Rectangle 4">
-            <a:extLst>
-              <a:ext uri="{FF2B5EF4-FFF2-40B4-BE49-F238E27FC236}">
-                <a16:creationId xmlns:a16="http://schemas.microsoft.com/office/drawing/2014/main" id="{24F74C3E-E81A-4BF3-BB56-95631F485D72}"/>
-              </a:ext>
-            </a:extLst>
-          </p:cNvPr>
-          <p:cNvSpPr/>
-          <p:nvPr/>
-        </p:nvSpPr>
-        <p:spPr>
-          <a:xfrm>
-            <a:off x="750486" y="2515647"/>
-            <a:ext cx="1650319" cy="567257"/>
-          </a:xfrm>
-          <a:prstGeom prst="roundRect">
-            <a:avLst/>
-          </a:prstGeom>
-          <a:noFill/>
-          <a:ln>
-            <a:solidFill>
-              <a:srgbClr val="FF0000"/>
-            </a:solidFill>
-            <a:prstDash val="lgDash"/>
-          </a:ln>
-        </p:spPr>
-        <p:style>
-          <a:lnRef idx="2">
-            <a:schemeClr val="accent1">
-              <a:shade val="50000"/>
-            </a:schemeClr>
-          </a:lnRef>
-          <a:fillRef idx="1">
-            <a:schemeClr val="accent1"/>
-          </a:fillRef>
-          <a:effectRef idx="0">
-            <a:schemeClr val="accent1"/>
-          </a:effectRef>
-          <a:fontRef idx="minor">
-            <a:schemeClr val="lt1"/>
-          </a:fontRef>
-        </p:style>
-        <p:txBody>
-          <a:bodyPr rtlCol="0" anchor="ctr"/>
-          <a:lstStyle/>
-          <a:p>
-            <a:pPr algn="ctr"/>
-            <a:endParaRPr lang="en-US" sz="1372"/>
-          </a:p>
-        </p:txBody>
-      </p:sp>
-      <p:sp>
-        <p:nvSpPr>
-          <p:cNvPr id="16" name="Rounded Rectangle 4">
-            <a:extLst>
-              <a:ext uri="{FF2B5EF4-FFF2-40B4-BE49-F238E27FC236}">
-                <a16:creationId xmlns:a16="http://schemas.microsoft.com/office/drawing/2014/main" id="{92551659-18A6-4CEA-BAEC-32546F63453A}"/>
-              </a:ext>
-            </a:extLst>
-          </p:cNvPr>
-          <p:cNvSpPr/>
-          <p:nvPr/>
-        </p:nvSpPr>
-        <p:spPr>
-          <a:xfrm>
-            <a:off x="3141884" y="2515646"/>
-            <a:ext cx="1650319" cy="567257"/>
-          </a:xfrm>
-          <a:prstGeom prst="roundRect">
-            <a:avLst/>
-          </a:prstGeom>
-          <a:noFill/>
-          <a:ln>
-            <a:solidFill>
-              <a:srgbClr val="FF0000"/>
-            </a:solidFill>
-            <a:prstDash val="lgDash"/>
-          </a:ln>
-        </p:spPr>
-        <p:style>
-          <a:lnRef idx="2">
-            <a:schemeClr val="accent1">
-              <a:shade val="50000"/>
-            </a:schemeClr>
-          </a:lnRef>
-          <a:fillRef idx="1">
-            <a:schemeClr val="accent1"/>
-          </a:fillRef>
-          <a:effectRef idx="0">
-            <a:schemeClr val="accent1"/>
-          </a:effectRef>
-          <a:fontRef idx="minor">
-            <a:schemeClr val="lt1"/>
-          </a:fontRef>
-        </p:style>
-        <p:txBody>
-          <a:bodyPr rtlCol="0" anchor="ctr"/>
-          <a:lstStyle/>
-          <a:p>
-            <a:pPr algn="ctr"/>
-            <a:endParaRPr lang="en-US" sz="1372"/>
-          </a:p>
-        </p:txBody>
-      </p:sp>
-      <p:sp>
-        <p:nvSpPr>
-          <p:cNvPr id="17" name="Rounded Rectangle 4">
-            <a:extLst>
-              <a:ext uri="{FF2B5EF4-FFF2-40B4-BE49-F238E27FC236}">
-                <a16:creationId xmlns:a16="http://schemas.microsoft.com/office/drawing/2014/main" id="{C388B1B6-B3C4-45E4-B133-66DD735B3F88}"/>
-              </a:ext>
-            </a:extLst>
-          </p:cNvPr>
-          <p:cNvSpPr/>
-          <p:nvPr/>
-        </p:nvSpPr>
-        <p:spPr>
-          <a:xfrm>
-            <a:off x="5514194" y="2515661"/>
-            <a:ext cx="1650319" cy="567257"/>
-          </a:xfrm>
-          <a:prstGeom prst="roundRect">
-            <a:avLst/>
-          </a:prstGeom>
-          <a:noFill/>
-          <a:ln>
-            <a:solidFill>
-              <a:srgbClr val="FF0000"/>
-            </a:solidFill>
-            <a:prstDash val="lgDash"/>
-          </a:ln>
-        </p:spPr>
-        <p:style>
-          <a:lnRef idx="2">
-            <a:schemeClr val="accent1">
-              <a:shade val="50000"/>
-            </a:schemeClr>
-          </a:lnRef>
-          <a:fillRef idx="1">
-            <a:schemeClr val="accent1"/>
-          </a:fillRef>
-          <a:effectRef idx="0">
-            <a:schemeClr val="accent1"/>
-          </a:effectRef>
-          <a:fontRef idx="minor">
-            <a:schemeClr val="lt1"/>
-          </a:fontRef>
-        </p:style>
-        <p:txBody>
-          <a:bodyPr rtlCol="0" anchor="ctr"/>
-          <a:lstStyle/>
-          <a:p>
-            <a:pPr algn="ctr"/>
-            <a:endParaRPr lang="en-US" sz="1372"/>
-          </a:p>
-        </p:txBody>
-      </p:sp>
-      <p:sp>
-        <p:nvSpPr>
-          <p:cNvPr id="18" name="Rounded Rectangle 4">
-            <a:extLst>
-              <a:ext uri="{FF2B5EF4-FFF2-40B4-BE49-F238E27FC236}">
-                <a16:creationId xmlns:a16="http://schemas.microsoft.com/office/drawing/2014/main" id="{0C2D0C7D-E6B3-4F86-AC17-70EEC176BB95}"/>
-              </a:ext>
-            </a:extLst>
-          </p:cNvPr>
-          <p:cNvSpPr/>
-          <p:nvPr/>
-        </p:nvSpPr>
-        <p:spPr>
-          <a:xfrm>
-            <a:off x="7803395" y="2515646"/>
-            <a:ext cx="1650319" cy="567257"/>
-          </a:xfrm>
-          <a:prstGeom prst="roundRect">
-            <a:avLst/>
-          </a:prstGeom>
-          <a:noFill/>
-          <a:ln>
-            <a:solidFill>
-              <a:srgbClr val="FF0000"/>
-            </a:solidFill>
-            <a:prstDash val="lgDash"/>
-          </a:ln>
-        </p:spPr>
-        <p:style>
-          <a:lnRef idx="2">
-            <a:schemeClr val="accent1">
-              <a:shade val="50000"/>
-            </a:schemeClr>
-          </a:lnRef>
-          <a:fillRef idx="1">
-            <a:schemeClr val="accent1"/>
-          </a:fillRef>
-          <a:effectRef idx="0">
-            <a:schemeClr val="accent1"/>
-          </a:effectRef>
-          <a:fontRef idx="minor">
-            <a:schemeClr val="lt1"/>
-          </a:fontRef>
-        </p:style>
-        <p:txBody>
-          <a:bodyPr rtlCol="0" anchor="ctr"/>
-          <a:lstStyle/>
-          <a:p>
-            <a:pPr algn="ctr"/>
-            <a:endParaRPr lang="en-US" sz="1372"/>
-          </a:p>
-        </p:txBody>
-      </p:sp>
-      <p:cxnSp>
-        <p:nvCxnSpPr>
-          <p:cNvPr id="19" name="Straight Arrow Connector 18">
-            <a:extLst>
-              <a:ext uri="{FF2B5EF4-FFF2-40B4-BE49-F238E27FC236}">
-                <a16:creationId xmlns:a16="http://schemas.microsoft.com/office/drawing/2014/main" id="{17BF3FC2-2886-4EDE-A3E2-BCC76291DAE6}"/>
-              </a:ext>
-            </a:extLst>
-          </p:cNvPr>
-          <p:cNvCxnSpPr>
-            <a:cxnSpLocks/>
-            <a:endCxn id="18" idx="0"/>
-          </p:cNvCxnSpPr>
-          <p:nvPr/>
-        </p:nvCxnSpPr>
-        <p:spPr>
-          <a:xfrm>
-            <a:off x="8628553" y="1949450"/>
-            <a:ext cx="2" cy="566196"/>
-          </a:xfrm>
-          <a:prstGeom prst="straightConnector1">
-            <a:avLst/>
-          </a:prstGeom>
-          <a:ln>
-            <a:tailEnd type="triangle"/>
-          </a:ln>
-        </p:spPr>
-        <p:style>
-          <a:lnRef idx="3">
-            <a:schemeClr val="accent1"/>
-          </a:lnRef>
-          <a:fillRef idx="0">
-            <a:schemeClr val="accent1"/>
-          </a:fillRef>
-          <a:effectRef idx="2">
-            <a:schemeClr val="accent1"/>
-          </a:effectRef>
-          <a:fontRef idx="minor">
-            <a:schemeClr val="tx1"/>
-          </a:fontRef>
-        </p:style>
-      </p:cxnSp>
-      <p:cxnSp>
-        <p:nvCxnSpPr>
-          <p:cNvPr id="20" name="Straight Arrow Connector 19">
-            <a:extLst>
-              <a:ext uri="{FF2B5EF4-FFF2-40B4-BE49-F238E27FC236}">
-                <a16:creationId xmlns:a16="http://schemas.microsoft.com/office/drawing/2014/main" id="{54443EAC-AC99-4A8C-BE0D-9EF2E75C496D}"/>
-              </a:ext>
-            </a:extLst>
-          </p:cNvPr>
-          <p:cNvCxnSpPr>
-            <a:cxnSpLocks/>
-            <a:endCxn id="17" idx="0"/>
-          </p:cNvCxnSpPr>
-          <p:nvPr/>
-        </p:nvCxnSpPr>
-        <p:spPr>
-          <a:xfrm>
-            <a:off x="6339354" y="1949450"/>
-            <a:ext cx="0" cy="566211"/>
-          </a:xfrm>
-          <a:prstGeom prst="straightConnector1">
-            <a:avLst/>
-          </a:prstGeom>
-          <a:ln>
-            <a:tailEnd type="triangle"/>
-          </a:ln>
-        </p:spPr>
-        <p:style>
-          <a:lnRef idx="3">
-            <a:schemeClr val="accent1"/>
-          </a:lnRef>
-          <a:fillRef idx="0">
-            <a:schemeClr val="accent1"/>
-          </a:fillRef>
-          <a:effectRef idx="2">
-            <a:schemeClr val="accent1"/>
-          </a:effectRef>
-          <a:fontRef idx="minor">
-            <a:schemeClr val="tx1"/>
-          </a:fontRef>
-        </p:style>
-      </p:cxnSp>
-      <p:cxnSp>
-        <p:nvCxnSpPr>
-          <p:cNvPr id="21" name="Straight Arrow Connector 20">
-            <a:extLst>
-              <a:ext uri="{FF2B5EF4-FFF2-40B4-BE49-F238E27FC236}">
-                <a16:creationId xmlns:a16="http://schemas.microsoft.com/office/drawing/2014/main" id="{0776B727-2BD6-49DE-8499-0539D693556B}"/>
-              </a:ext>
-            </a:extLst>
-          </p:cNvPr>
-          <p:cNvCxnSpPr>
-            <a:cxnSpLocks/>
-            <a:endCxn id="16" idx="0"/>
-          </p:cNvCxnSpPr>
-          <p:nvPr/>
-        </p:nvCxnSpPr>
-        <p:spPr>
-          <a:xfrm>
-            <a:off x="3967044" y="1949450"/>
-            <a:ext cx="0" cy="566196"/>
-          </a:xfrm>
-          <a:prstGeom prst="straightConnector1">
-            <a:avLst/>
-          </a:prstGeom>
-          <a:ln>
-            <a:tailEnd type="triangle"/>
-          </a:ln>
-        </p:spPr>
-        <p:style>
-          <a:lnRef idx="3">
-            <a:schemeClr val="accent1"/>
-          </a:lnRef>
-          <a:fillRef idx="0">
-            <a:schemeClr val="accent1"/>
-          </a:fillRef>
-          <a:effectRef idx="2">
-            <a:schemeClr val="accent1"/>
-          </a:effectRef>
-          <a:fontRef idx="minor">
-            <a:schemeClr val="tx1"/>
-          </a:fontRef>
-        </p:style>
-      </p:cxnSp>
-      <p:cxnSp>
-        <p:nvCxnSpPr>
-          <p:cNvPr id="22" name="Straight Arrow Connector 21">
-            <a:extLst>
-              <a:ext uri="{FF2B5EF4-FFF2-40B4-BE49-F238E27FC236}">
-                <a16:creationId xmlns:a16="http://schemas.microsoft.com/office/drawing/2014/main" id="{7E2AA6A5-B313-47B1-9D08-9ACD91D7D977}"/>
-              </a:ext>
-            </a:extLst>
-          </p:cNvPr>
-          <p:cNvCxnSpPr>
-            <a:cxnSpLocks/>
-            <a:endCxn id="15" idx="0"/>
-          </p:cNvCxnSpPr>
-          <p:nvPr/>
-        </p:nvCxnSpPr>
-        <p:spPr>
-          <a:xfrm>
-            <a:off x="1575646" y="1949450"/>
-            <a:ext cx="0" cy="566197"/>
-          </a:xfrm>
-          <a:prstGeom prst="straightConnector1">
-            <a:avLst/>
-          </a:prstGeom>
-          <a:ln>
-            <a:tailEnd type="triangle"/>
-          </a:ln>
-        </p:spPr>
-        <p:style>
-          <a:lnRef idx="3">
-            <a:schemeClr val="accent1"/>
-          </a:lnRef>
-          <a:fillRef idx="0">
-            <a:schemeClr val="accent1"/>
-          </a:fillRef>
-          <a:effectRef idx="2">
-            <a:schemeClr val="accent1"/>
-          </a:effectRef>
-          <a:fontRef idx="minor">
-            <a:schemeClr val="tx1"/>
-          </a:fontRef>
-        </p:style>
-      </p:cxnSp>
-      <p:sp>
-        <p:nvSpPr>
-          <p:cNvPr id="39" name="TextBox 38">
-            <a:extLst>
-              <a:ext uri="{FF2B5EF4-FFF2-40B4-BE49-F238E27FC236}">
-                <a16:creationId xmlns:a16="http://schemas.microsoft.com/office/drawing/2014/main" id="{E5048BB6-E8DC-407B-9D6C-BEB8032C986B}"/>
+                <a16:creationId xmlns:a16="http://schemas.microsoft.com/office/drawing/2014/main" id="{E56F69CA-2766-4032-AF6E-FC1682D0EB91}"/>
               </a:ext>
             </a:extLst>
           </p:cNvPr>
@@ -4016,8 +3612,8 @@
         </p:nvSpPr>
         <p:spPr>
           <a:xfrm>
-            <a:off x="1555608" y="2105087"/>
-            <a:ext cx="675185" cy="303481"/>
+            <a:off x="4293704" y="3273287"/>
+            <a:ext cx="6546574" cy="1200329"/>
           </a:xfrm>
           <a:prstGeom prst="rect">
             <a:avLst/>
@@ -4025,28 +3621,44 @@
           <a:noFill/>
         </p:spPr>
         <p:txBody>
-          <a:bodyPr wrap="none" rtlCol="0">
+          <a:bodyPr wrap="square" rtlCol="0">
             <a:spAutoFit/>
           </a:bodyPr>
           <a:lstStyle/>
           <a:p>
             <a:r>
-              <a:rPr lang="en-US" sz="1372" b="1" i="1" dirty="0">
-                <a:solidFill>
-                  <a:schemeClr val="accent1"/>
-                </a:solidFill>
-              </a:rPr>
-              <a:t>/home</a:t>
-            </a:r>
-          </a:p>
-        </p:txBody>
-      </p:sp>
-      <p:sp>
-        <p:nvSpPr>
-          <p:cNvPr id="40" name="TextBox 39">
+              <a:rPr lang="en-US" dirty="0"/>
+              <a:t>WHAT WILL HAPPENED:</a:t>
+            </a:r>
+          </a:p>
+          <a:p>
+            <a:pPr marL="285750" indent="-285750">
+              <a:buFontTx/>
+              <a:buChar char="-"/>
+            </a:pPr>
+            <a:r>
+              <a:rPr lang="en-US" dirty="0"/>
+              <a:t>Compare or check of email, and password match to the information that we signed before.</a:t>
+            </a:r>
+          </a:p>
+          <a:p>
+            <a:pPr marL="285750" indent="-285750">
+              <a:buFontTx/>
+              <a:buChar char="-"/>
+            </a:pPr>
+            <a:r>
+              <a:rPr lang="en-US" dirty="0"/>
+              <a:t> If email and pass don’t match, cannot login.</a:t>
+            </a:r>
+          </a:p>
+        </p:txBody>
+      </p:sp>
+      <p:sp>
+        <p:nvSpPr>
+          <p:cNvPr id="71" name="TextBox 70">
             <a:extLst>
               <a:ext uri="{FF2B5EF4-FFF2-40B4-BE49-F238E27FC236}">
-                <a16:creationId xmlns:a16="http://schemas.microsoft.com/office/drawing/2014/main" id="{5E74C44A-27F5-4028-B52B-EAA7DA1B474A}"/>
+                <a16:creationId xmlns:a16="http://schemas.microsoft.com/office/drawing/2014/main" id="{B5AA14E7-3E10-4823-BE1C-FC74D4AC4F9A}"/>
               </a:ext>
             </a:extLst>
           </p:cNvPr>
@@ -4055,8 +3667,8 @@
         </p:nvSpPr>
         <p:spPr>
           <a:xfrm>
-            <a:off x="3923993" y="2080807"/>
-            <a:ext cx="945067" cy="303481"/>
+            <a:off x="6281528" y="1412635"/>
+            <a:ext cx="523605" cy="307777"/>
           </a:xfrm>
           <a:prstGeom prst="rect">
             <a:avLst/>
@@ -4070,865 +3682,12 @@
           <a:lstStyle/>
           <a:p>
             <a:r>
-              <a:rPr lang="en-US" sz="1372" b="1" i="1" dirty="0">
-                <a:solidFill>
-                  <a:schemeClr val="accent1"/>
-                </a:solidFill>
-              </a:rPr>
-              <a:t>/my-event</a:t>
-            </a:r>
-          </a:p>
-        </p:txBody>
-      </p:sp>
-      <p:sp>
-        <p:nvSpPr>
-          <p:cNvPr id="41" name="TextBox 40">
-            <a:extLst>
-              <a:ext uri="{FF2B5EF4-FFF2-40B4-BE49-F238E27FC236}">
-                <a16:creationId xmlns:a16="http://schemas.microsoft.com/office/drawing/2014/main" id="{3E8C73EC-EE09-4455-A690-B2F0CD452C1A}"/>
-              </a:ext>
-            </a:extLst>
-          </p:cNvPr>
-          <p:cNvSpPr txBox="1"/>
-          <p:nvPr/>
-        </p:nvSpPr>
-        <p:spPr>
-          <a:xfrm>
-            <a:off x="6283078" y="2109904"/>
-            <a:ext cx="715260" cy="303481"/>
-          </a:xfrm>
-          <a:prstGeom prst="rect">
-            <a:avLst/>
-          </a:prstGeom>
-          <a:noFill/>
-        </p:spPr>
-        <p:txBody>
-          <a:bodyPr wrap="none" rtlCol="0">
-            <a:spAutoFit/>
-          </a:bodyPr>
-          <a:lstStyle/>
-          <a:p>
-            <a:r>
-              <a:rPr lang="en-US" sz="1372" b="1" i="1" dirty="0">
-                <a:solidFill>
-                  <a:schemeClr val="accent1"/>
-                </a:solidFill>
-              </a:rPr>
-              <a:t>/joined</a:t>
-            </a:r>
-          </a:p>
-        </p:txBody>
-      </p:sp>
-      <p:sp>
-        <p:nvSpPr>
-          <p:cNvPr id="42" name="TextBox 41">
-            <a:extLst>
-              <a:ext uri="{FF2B5EF4-FFF2-40B4-BE49-F238E27FC236}">
-                <a16:creationId xmlns:a16="http://schemas.microsoft.com/office/drawing/2014/main" id="{EF6B2926-AB1F-4CC1-B4FA-E23691624064}"/>
-              </a:ext>
-            </a:extLst>
-          </p:cNvPr>
-          <p:cNvSpPr txBox="1"/>
-          <p:nvPr/>
-        </p:nvSpPr>
-        <p:spPr>
-          <a:xfrm>
-            <a:off x="8587656" y="2080277"/>
-            <a:ext cx="899926" cy="303481"/>
-          </a:xfrm>
-          <a:prstGeom prst="rect">
-            <a:avLst/>
-          </a:prstGeom>
-          <a:noFill/>
-        </p:spPr>
-        <p:txBody>
-          <a:bodyPr wrap="none" rtlCol="0">
-            <a:spAutoFit/>
-          </a:bodyPr>
-          <a:lstStyle/>
-          <a:p>
-            <a:r>
-              <a:rPr lang="en-US" sz="1372" b="1" i="1" dirty="0">
-                <a:solidFill>
-                  <a:schemeClr val="accent1"/>
-                </a:solidFill>
-              </a:rPr>
-              <a:t>/category</a:t>
-            </a:r>
-          </a:p>
-        </p:txBody>
-      </p:sp>
-      <p:sp>
-        <p:nvSpPr>
-          <p:cNvPr id="43" name="TextBox 42">
-            <a:extLst>
-              <a:ext uri="{FF2B5EF4-FFF2-40B4-BE49-F238E27FC236}">
-                <a16:creationId xmlns:a16="http://schemas.microsoft.com/office/drawing/2014/main" id="{2EB0045F-7BFB-4DDC-9F7E-1CCDE44CA8F6}"/>
-              </a:ext>
-            </a:extLst>
-          </p:cNvPr>
-          <p:cNvSpPr txBox="1"/>
-          <p:nvPr/>
-        </p:nvSpPr>
-        <p:spPr>
-          <a:xfrm>
-            <a:off x="995930" y="2643243"/>
-            <a:ext cx="1172372" cy="303481"/>
-          </a:xfrm>
-          <a:prstGeom prst="rect">
-            <a:avLst/>
-          </a:prstGeom>
-          <a:noFill/>
-        </p:spPr>
-        <p:txBody>
-          <a:bodyPr wrap="none" rtlCol="0">
-            <a:spAutoFit/>
-          </a:bodyPr>
-          <a:lstStyle/>
-          <a:p>
-            <a:r>
-              <a:rPr lang="en-US" sz="1372" b="1" i="1" dirty="0">
+              <a:rPr lang="en-US" sz="1400" b="1" i="1" dirty="0">
                 <a:solidFill>
                   <a:srgbClr val="FF0000"/>
                 </a:solidFill>
               </a:rPr>
-              <a:t>&lt;home-view&gt;</a:t>
-            </a:r>
-          </a:p>
-        </p:txBody>
-      </p:sp>
-      <p:sp>
-        <p:nvSpPr>
-          <p:cNvPr id="44" name="TextBox 43">
-            <a:extLst>
-              <a:ext uri="{FF2B5EF4-FFF2-40B4-BE49-F238E27FC236}">
-                <a16:creationId xmlns:a16="http://schemas.microsoft.com/office/drawing/2014/main" id="{A7572E00-979E-4139-825C-B8D55B15DEB6}"/>
-              </a:ext>
-            </a:extLst>
-          </p:cNvPr>
-          <p:cNvSpPr txBox="1"/>
-          <p:nvPr/>
-        </p:nvSpPr>
-        <p:spPr>
-          <a:xfrm>
-            <a:off x="3298669" y="2643244"/>
-            <a:ext cx="1442254" cy="303481"/>
-          </a:xfrm>
-          <a:prstGeom prst="rect">
-            <a:avLst/>
-          </a:prstGeom>
-          <a:noFill/>
-        </p:spPr>
-        <p:txBody>
-          <a:bodyPr wrap="none" rtlCol="0">
-            <a:spAutoFit/>
-          </a:bodyPr>
-          <a:lstStyle/>
-          <a:p>
-            <a:r>
-              <a:rPr lang="en-US" sz="1372" b="1" i="1" dirty="0">
-                <a:solidFill>
-                  <a:srgbClr val="FF0000"/>
-                </a:solidFill>
-              </a:rPr>
-              <a:t>&lt;my-event-view&gt;</a:t>
-            </a:r>
-          </a:p>
-        </p:txBody>
-      </p:sp>
-      <p:sp>
-        <p:nvSpPr>
-          <p:cNvPr id="45" name="TextBox 44">
-            <a:extLst>
-              <a:ext uri="{FF2B5EF4-FFF2-40B4-BE49-F238E27FC236}">
-                <a16:creationId xmlns:a16="http://schemas.microsoft.com/office/drawing/2014/main" id="{EE2B83B0-0F95-4CA2-BD00-F34ABD209B3D}"/>
-              </a:ext>
-            </a:extLst>
-          </p:cNvPr>
-          <p:cNvSpPr txBox="1"/>
-          <p:nvPr/>
-        </p:nvSpPr>
-        <p:spPr>
-          <a:xfrm>
-            <a:off x="5725396" y="2617937"/>
-            <a:ext cx="1212448" cy="303481"/>
-          </a:xfrm>
-          <a:prstGeom prst="rect">
-            <a:avLst/>
-          </a:prstGeom>
-          <a:noFill/>
-        </p:spPr>
-        <p:txBody>
-          <a:bodyPr wrap="none" rtlCol="0">
-            <a:spAutoFit/>
-          </a:bodyPr>
-          <a:lstStyle/>
-          <a:p>
-            <a:r>
-              <a:rPr lang="en-US" sz="1372" b="1" i="1" dirty="0">
-                <a:solidFill>
-                  <a:srgbClr val="FF0000"/>
-                </a:solidFill>
-              </a:rPr>
-              <a:t>&lt;joined-view&gt;</a:t>
-            </a:r>
-          </a:p>
-        </p:txBody>
-      </p:sp>
-      <p:sp>
-        <p:nvSpPr>
-          <p:cNvPr id="46" name="TextBox 45">
-            <a:extLst>
-              <a:ext uri="{FF2B5EF4-FFF2-40B4-BE49-F238E27FC236}">
-                <a16:creationId xmlns:a16="http://schemas.microsoft.com/office/drawing/2014/main" id="{48BEA699-E283-4BE4-8BF2-A929BBCA8650}"/>
-              </a:ext>
-            </a:extLst>
-          </p:cNvPr>
-          <p:cNvSpPr txBox="1"/>
-          <p:nvPr/>
-        </p:nvSpPr>
-        <p:spPr>
-          <a:xfrm>
-            <a:off x="7978867" y="2617936"/>
-            <a:ext cx="1401409" cy="303481"/>
-          </a:xfrm>
-          <a:prstGeom prst="rect">
-            <a:avLst/>
-          </a:prstGeom>
-          <a:noFill/>
-        </p:spPr>
-        <p:txBody>
-          <a:bodyPr wrap="none" rtlCol="0">
-            <a:spAutoFit/>
-          </a:bodyPr>
-          <a:lstStyle/>
-          <a:p>
-            <a:r>
-              <a:rPr lang="en-US" sz="1372" b="1" i="1" dirty="0">
-                <a:solidFill>
-                  <a:srgbClr val="FF0000"/>
-                </a:solidFill>
-              </a:rPr>
-              <a:t>&lt;category-view&gt;</a:t>
-            </a:r>
-          </a:p>
-        </p:txBody>
-      </p:sp>
-      <p:sp>
-        <p:nvSpPr>
-          <p:cNvPr id="47" name="Rounded Rectangle 4">
-            <a:extLst>
-              <a:ext uri="{FF2B5EF4-FFF2-40B4-BE49-F238E27FC236}">
-                <a16:creationId xmlns:a16="http://schemas.microsoft.com/office/drawing/2014/main" id="{EBFFA4EA-0E62-44A3-9ABF-4B3D4389B183}"/>
-              </a:ext>
-            </a:extLst>
-          </p:cNvPr>
-          <p:cNvSpPr/>
-          <p:nvPr/>
-        </p:nvSpPr>
-        <p:spPr>
-          <a:xfrm>
-            <a:off x="750486" y="3766133"/>
-            <a:ext cx="1650319" cy="567257"/>
-          </a:xfrm>
-          <a:prstGeom prst="roundRect">
-            <a:avLst/>
-          </a:prstGeom>
-          <a:noFill/>
-          <a:ln>
-            <a:solidFill>
-              <a:srgbClr val="FF0000"/>
-            </a:solidFill>
-            <a:prstDash val="lgDash"/>
-          </a:ln>
-        </p:spPr>
-        <p:style>
-          <a:lnRef idx="2">
-            <a:schemeClr val="accent1">
-              <a:shade val="50000"/>
-            </a:schemeClr>
-          </a:lnRef>
-          <a:fillRef idx="1">
-            <a:schemeClr val="accent1"/>
-          </a:fillRef>
-          <a:effectRef idx="0">
-            <a:schemeClr val="accent1"/>
-          </a:effectRef>
-          <a:fontRef idx="minor">
-            <a:schemeClr val="lt1"/>
-          </a:fontRef>
-        </p:style>
-        <p:txBody>
-          <a:bodyPr rtlCol="0" anchor="ctr"/>
-          <a:lstStyle/>
-          <a:p>
-            <a:pPr algn="ctr"/>
-            <a:endParaRPr lang="en-US" sz="1372"/>
-          </a:p>
-        </p:txBody>
-      </p:sp>
-      <p:sp>
-        <p:nvSpPr>
-          <p:cNvPr id="48" name="Rounded Rectangle 4">
-            <a:extLst>
-              <a:ext uri="{FF2B5EF4-FFF2-40B4-BE49-F238E27FC236}">
-                <a16:creationId xmlns:a16="http://schemas.microsoft.com/office/drawing/2014/main" id="{9718C553-4775-488F-9C9D-B549D1E707A0}"/>
-              </a:ext>
-            </a:extLst>
-          </p:cNvPr>
-          <p:cNvSpPr/>
-          <p:nvPr/>
-        </p:nvSpPr>
-        <p:spPr>
-          <a:xfrm>
-            <a:off x="3141884" y="3766132"/>
-            <a:ext cx="1650319" cy="567257"/>
-          </a:xfrm>
-          <a:prstGeom prst="roundRect">
-            <a:avLst/>
-          </a:prstGeom>
-          <a:noFill/>
-          <a:ln>
-            <a:solidFill>
-              <a:srgbClr val="FF0000"/>
-            </a:solidFill>
-            <a:prstDash val="lgDash"/>
-          </a:ln>
-        </p:spPr>
-        <p:style>
-          <a:lnRef idx="2">
-            <a:schemeClr val="accent1">
-              <a:shade val="50000"/>
-            </a:schemeClr>
-          </a:lnRef>
-          <a:fillRef idx="1">
-            <a:schemeClr val="accent1"/>
-          </a:fillRef>
-          <a:effectRef idx="0">
-            <a:schemeClr val="accent1"/>
-          </a:effectRef>
-          <a:fontRef idx="minor">
-            <a:schemeClr val="lt1"/>
-          </a:fontRef>
-        </p:style>
-        <p:txBody>
-          <a:bodyPr rtlCol="0" anchor="ctr"/>
-          <a:lstStyle/>
-          <a:p>
-            <a:pPr algn="ctr"/>
-            <a:endParaRPr lang="en-US" sz="1372"/>
-          </a:p>
-        </p:txBody>
-      </p:sp>
-      <p:sp>
-        <p:nvSpPr>
-          <p:cNvPr id="49" name="Rounded Rectangle 4">
-            <a:extLst>
-              <a:ext uri="{FF2B5EF4-FFF2-40B4-BE49-F238E27FC236}">
-                <a16:creationId xmlns:a16="http://schemas.microsoft.com/office/drawing/2014/main" id="{CCD69186-7866-440F-ABF4-6494BCFBB47D}"/>
-              </a:ext>
-            </a:extLst>
-          </p:cNvPr>
-          <p:cNvSpPr/>
-          <p:nvPr/>
-        </p:nvSpPr>
-        <p:spPr>
-          <a:xfrm>
-            <a:off x="5514194" y="3766147"/>
-            <a:ext cx="1650319" cy="567257"/>
-          </a:xfrm>
-          <a:prstGeom prst="roundRect">
-            <a:avLst/>
-          </a:prstGeom>
-          <a:noFill/>
-          <a:ln>
-            <a:solidFill>
-              <a:srgbClr val="FF0000"/>
-            </a:solidFill>
-            <a:prstDash val="lgDash"/>
-          </a:ln>
-        </p:spPr>
-        <p:style>
-          <a:lnRef idx="2">
-            <a:schemeClr val="accent1">
-              <a:shade val="50000"/>
-            </a:schemeClr>
-          </a:lnRef>
-          <a:fillRef idx="1">
-            <a:schemeClr val="accent1"/>
-          </a:fillRef>
-          <a:effectRef idx="0">
-            <a:schemeClr val="accent1"/>
-          </a:effectRef>
-          <a:fontRef idx="minor">
-            <a:schemeClr val="lt1"/>
-          </a:fontRef>
-        </p:style>
-        <p:txBody>
-          <a:bodyPr rtlCol="0" anchor="ctr"/>
-          <a:lstStyle/>
-          <a:p>
-            <a:pPr algn="ctr"/>
-            <a:endParaRPr lang="en-US" sz="1372"/>
-          </a:p>
-        </p:txBody>
-      </p:sp>
-      <p:sp>
-        <p:nvSpPr>
-          <p:cNvPr id="50" name="Rounded Rectangle 4">
-            <a:extLst>
-              <a:ext uri="{FF2B5EF4-FFF2-40B4-BE49-F238E27FC236}">
-                <a16:creationId xmlns:a16="http://schemas.microsoft.com/office/drawing/2014/main" id="{2031453D-96DD-420B-A8F4-E02BD2E97FA4}"/>
-              </a:ext>
-            </a:extLst>
-          </p:cNvPr>
-          <p:cNvSpPr/>
-          <p:nvPr/>
-        </p:nvSpPr>
-        <p:spPr>
-          <a:xfrm>
-            <a:off x="7803395" y="3766132"/>
-            <a:ext cx="1650319" cy="567257"/>
-          </a:xfrm>
-          <a:prstGeom prst="roundRect">
-            <a:avLst/>
-          </a:prstGeom>
-          <a:noFill/>
-          <a:ln>
-            <a:solidFill>
-              <a:srgbClr val="FF0000"/>
-            </a:solidFill>
-            <a:prstDash val="lgDash"/>
-          </a:ln>
-        </p:spPr>
-        <p:style>
-          <a:lnRef idx="2">
-            <a:schemeClr val="accent1">
-              <a:shade val="50000"/>
-            </a:schemeClr>
-          </a:lnRef>
-          <a:fillRef idx="1">
-            <a:schemeClr val="accent1"/>
-          </a:fillRef>
-          <a:effectRef idx="0">
-            <a:schemeClr val="accent1"/>
-          </a:effectRef>
-          <a:fontRef idx="minor">
-            <a:schemeClr val="lt1"/>
-          </a:fontRef>
-        </p:style>
-        <p:txBody>
-          <a:bodyPr rtlCol="0" anchor="ctr"/>
-          <a:lstStyle/>
-          <a:p>
-            <a:pPr algn="ctr"/>
-            <a:endParaRPr lang="en-US" sz="1372"/>
-          </a:p>
-        </p:txBody>
-      </p:sp>
-      <p:sp>
-        <p:nvSpPr>
-          <p:cNvPr id="51" name="TextBox 50">
-            <a:extLst>
-              <a:ext uri="{FF2B5EF4-FFF2-40B4-BE49-F238E27FC236}">
-                <a16:creationId xmlns:a16="http://schemas.microsoft.com/office/drawing/2014/main" id="{9B90995F-F96F-444F-A642-EA6F3AA194A4}"/>
-              </a:ext>
-            </a:extLst>
-          </p:cNvPr>
-          <p:cNvSpPr txBox="1"/>
-          <p:nvPr/>
-        </p:nvSpPr>
-        <p:spPr>
-          <a:xfrm>
-            <a:off x="1027680" y="3893729"/>
-            <a:ext cx="1142044" cy="303481"/>
-          </a:xfrm>
-          <a:prstGeom prst="rect">
-            <a:avLst/>
-          </a:prstGeom>
-          <a:noFill/>
-        </p:spPr>
-        <p:txBody>
-          <a:bodyPr wrap="none" rtlCol="0">
-            <a:spAutoFit/>
-          </a:bodyPr>
-          <a:lstStyle/>
-          <a:p>
-            <a:r>
-              <a:rPr lang="en-US" sz="1372" b="1" i="1" dirty="0">
-                <a:solidFill>
-                  <a:srgbClr val="FF0000"/>
-                </a:solidFill>
-              </a:rPr>
-              <a:t>&lt;event-card&gt;</a:t>
-            </a:r>
-          </a:p>
-        </p:txBody>
-      </p:sp>
-      <p:sp>
-        <p:nvSpPr>
-          <p:cNvPr id="55" name="TextBox 54">
-            <a:extLst>
-              <a:ext uri="{FF2B5EF4-FFF2-40B4-BE49-F238E27FC236}">
-                <a16:creationId xmlns:a16="http://schemas.microsoft.com/office/drawing/2014/main" id="{92A31547-0B6B-4DFF-A100-CEC82D7A6D64}"/>
-              </a:ext>
-            </a:extLst>
-          </p:cNvPr>
-          <p:cNvSpPr txBox="1"/>
-          <p:nvPr/>
-        </p:nvSpPr>
-        <p:spPr>
-          <a:xfrm>
-            <a:off x="8042367" y="3893729"/>
-            <a:ext cx="1142044" cy="303481"/>
-          </a:xfrm>
-          <a:prstGeom prst="rect">
-            <a:avLst/>
-          </a:prstGeom>
-          <a:noFill/>
-        </p:spPr>
-        <p:txBody>
-          <a:bodyPr wrap="none" rtlCol="0">
-            <a:spAutoFit/>
-          </a:bodyPr>
-          <a:lstStyle/>
-          <a:p>
-            <a:r>
-              <a:rPr lang="en-US" sz="1372" b="1" i="1" dirty="0">
-                <a:solidFill>
-                  <a:srgbClr val="FF0000"/>
-                </a:solidFill>
-              </a:rPr>
-              <a:t>&lt;event-card&gt;</a:t>
-            </a:r>
-          </a:p>
-        </p:txBody>
-      </p:sp>
-      <p:sp>
-        <p:nvSpPr>
-          <p:cNvPr id="56" name="TextBox 55">
-            <a:extLst>
-              <a:ext uri="{FF2B5EF4-FFF2-40B4-BE49-F238E27FC236}">
-                <a16:creationId xmlns:a16="http://schemas.microsoft.com/office/drawing/2014/main" id="{FFF1C9C7-4857-4D1D-9E57-6EB238B85D04}"/>
-              </a:ext>
-            </a:extLst>
-          </p:cNvPr>
-          <p:cNvSpPr txBox="1"/>
-          <p:nvPr/>
-        </p:nvSpPr>
-        <p:spPr>
-          <a:xfrm>
-            <a:off x="5760598" y="3893729"/>
-            <a:ext cx="1142044" cy="303481"/>
-          </a:xfrm>
-          <a:prstGeom prst="rect">
-            <a:avLst/>
-          </a:prstGeom>
-          <a:noFill/>
-        </p:spPr>
-        <p:txBody>
-          <a:bodyPr wrap="none" rtlCol="0">
-            <a:spAutoFit/>
-          </a:bodyPr>
-          <a:lstStyle/>
-          <a:p>
-            <a:r>
-              <a:rPr lang="en-US" sz="1372" b="1" i="1" dirty="0">
-                <a:solidFill>
-                  <a:srgbClr val="FF0000"/>
-                </a:solidFill>
-              </a:rPr>
-              <a:t>&lt;event-card&gt;</a:t>
-            </a:r>
-          </a:p>
-        </p:txBody>
-      </p:sp>
-      <p:sp>
-        <p:nvSpPr>
-          <p:cNvPr id="57" name="TextBox 56">
-            <a:extLst>
-              <a:ext uri="{FF2B5EF4-FFF2-40B4-BE49-F238E27FC236}">
-                <a16:creationId xmlns:a16="http://schemas.microsoft.com/office/drawing/2014/main" id="{75C0880C-26CE-4E61-AD01-ECCC790F2860}"/>
-              </a:ext>
-            </a:extLst>
-          </p:cNvPr>
-          <p:cNvSpPr txBox="1"/>
-          <p:nvPr/>
-        </p:nvSpPr>
-        <p:spPr>
-          <a:xfrm>
-            <a:off x="3390155" y="3893729"/>
-            <a:ext cx="1142044" cy="303481"/>
-          </a:xfrm>
-          <a:prstGeom prst="rect">
-            <a:avLst/>
-          </a:prstGeom>
-          <a:noFill/>
-        </p:spPr>
-        <p:txBody>
-          <a:bodyPr wrap="none" rtlCol="0">
-            <a:spAutoFit/>
-          </a:bodyPr>
-          <a:lstStyle/>
-          <a:p>
-            <a:r>
-              <a:rPr lang="en-US" sz="1372" b="1" i="1" dirty="0">
-                <a:solidFill>
-                  <a:srgbClr val="FF0000"/>
-                </a:solidFill>
-              </a:rPr>
-              <a:t>&lt;event-card&gt;</a:t>
-            </a:r>
-          </a:p>
-        </p:txBody>
-      </p:sp>
-      <p:cxnSp>
-        <p:nvCxnSpPr>
-          <p:cNvPr id="58" name="Straight Arrow Connector 57">
-            <a:extLst>
-              <a:ext uri="{FF2B5EF4-FFF2-40B4-BE49-F238E27FC236}">
-                <a16:creationId xmlns:a16="http://schemas.microsoft.com/office/drawing/2014/main" id="{A721FDBE-BE3C-4944-9798-C45538D439BD}"/>
-              </a:ext>
-            </a:extLst>
-          </p:cNvPr>
-          <p:cNvCxnSpPr>
-            <a:cxnSpLocks/>
-            <a:endCxn id="47" idx="0"/>
-          </p:cNvCxnSpPr>
-          <p:nvPr/>
-        </p:nvCxnSpPr>
-        <p:spPr>
-          <a:xfrm flipH="1">
-            <a:off x="1575646" y="3082903"/>
-            <a:ext cx="6470" cy="683230"/>
-          </a:xfrm>
-          <a:prstGeom prst="straightConnector1">
-            <a:avLst/>
-          </a:prstGeom>
-          <a:ln>
-            <a:tailEnd type="triangle"/>
-          </a:ln>
-        </p:spPr>
-        <p:style>
-          <a:lnRef idx="3">
-            <a:schemeClr val="accent1"/>
-          </a:lnRef>
-          <a:fillRef idx="0">
-            <a:schemeClr val="accent1"/>
-          </a:fillRef>
-          <a:effectRef idx="2">
-            <a:schemeClr val="accent1"/>
-          </a:effectRef>
-          <a:fontRef idx="minor">
-            <a:schemeClr val="tx1"/>
-          </a:fontRef>
-        </p:style>
-      </p:cxnSp>
-      <p:cxnSp>
-        <p:nvCxnSpPr>
-          <p:cNvPr id="60" name="Straight Arrow Connector 59">
-            <a:extLst>
-              <a:ext uri="{FF2B5EF4-FFF2-40B4-BE49-F238E27FC236}">
-                <a16:creationId xmlns:a16="http://schemas.microsoft.com/office/drawing/2014/main" id="{41BFA7DF-310B-43CB-8E5E-AEF50761B7C4}"/>
-              </a:ext>
-            </a:extLst>
-          </p:cNvPr>
-          <p:cNvCxnSpPr>
-            <a:cxnSpLocks/>
-          </p:cNvCxnSpPr>
-          <p:nvPr/>
-        </p:nvCxnSpPr>
-        <p:spPr>
-          <a:xfrm flipH="1">
-            <a:off x="8629519" y="3076188"/>
-            <a:ext cx="6470" cy="683230"/>
-          </a:xfrm>
-          <a:prstGeom prst="straightConnector1">
-            <a:avLst/>
-          </a:prstGeom>
-          <a:ln>
-            <a:tailEnd type="triangle"/>
-          </a:ln>
-        </p:spPr>
-        <p:style>
-          <a:lnRef idx="3">
-            <a:schemeClr val="accent1"/>
-          </a:lnRef>
-          <a:fillRef idx="0">
-            <a:schemeClr val="accent1"/>
-          </a:fillRef>
-          <a:effectRef idx="2">
-            <a:schemeClr val="accent1"/>
-          </a:effectRef>
-          <a:fontRef idx="minor">
-            <a:schemeClr val="tx1"/>
-          </a:fontRef>
-        </p:style>
-      </p:cxnSp>
-      <p:cxnSp>
-        <p:nvCxnSpPr>
-          <p:cNvPr id="61" name="Straight Arrow Connector 60">
-            <a:extLst>
-              <a:ext uri="{FF2B5EF4-FFF2-40B4-BE49-F238E27FC236}">
-                <a16:creationId xmlns:a16="http://schemas.microsoft.com/office/drawing/2014/main" id="{07DC3A99-7517-4DEB-8DF2-40AF9C12BCB8}"/>
-              </a:ext>
-            </a:extLst>
-          </p:cNvPr>
-          <p:cNvCxnSpPr>
-            <a:cxnSpLocks/>
-          </p:cNvCxnSpPr>
-          <p:nvPr/>
-        </p:nvCxnSpPr>
-        <p:spPr>
-          <a:xfrm flipH="1">
-            <a:off x="6339353" y="3076188"/>
-            <a:ext cx="6470" cy="683230"/>
-          </a:xfrm>
-          <a:prstGeom prst="straightConnector1">
-            <a:avLst/>
-          </a:prstGeom>
-          <a:ln>
-            <a:tailEnd type="triangle"/>
-          </a:ln>
-        </p:spPr>
-        <p:style>
-          <a:lnRef idx="3">
-            <a:schemeClr val="accent1"/>
-          </a:lnRef>
-          <a:fillRef idx="0">
-            <a:schemeClr val="accent1"/>
-          </a:fillRef>
-          <a:effectRef idx="2">
-            <a:schemeClr val="accent1"/>
-          </a:effectRef>
-          <a:fontRef idx="minor">
-            <a:schemeClr val="tx1"/>
-          </a:fontRef>
-        </p:style>
-      </p:cxnSp>
-      <p:cxnSp>
-        <p:nvCxnSpPr>
-          <p:cNvPr id="62" name="Straight Arrow Connector 61">
-            <a:extLst>
-              <a:ext uri="{FF2B5EF4-FFF2-40B4-BE49-F238E27FC236}">
-                <a16:creationId xmlns:a16="http://schemas.microsoft.com/office/drawing/2014/main" id="{05882833-3A74-4668-B3BC-2CC0B6024919}"/>
-              </a:ext>
-            </a:extLst>
-          </p:cNvPr>
-          <p:cNvCxnSpPr>
-            <a:cxnSpLocks/>
-          </p:cNvCxnSpPr>
-          <p:nvPr/>
-        </p:nvCxnSpPr>
-        <p:spPr>
-          <a:xfrm flipH="1">
-            <a:off x="3967042" y="3067517"/>
-            <a:ext cx="6470" cy="683230"/>
-          </a:xfrm>
-          <a:prstGeom prst="straightConnector1">
-            <a:avLst/>
-          </a:prstGeom>
-          <a:ln>
-            <a:tailEnd type="triangle"/>
-          </a:ln>
-        </p:spPr>
-        <p:style>
-          <a:lnRef idx="3">
-            <a:schemeClr val="accent1"/>
-          </a:lnRef>
-          <a:fillRef idx="0">
-            <a:schemeClr val="accent1"/>
-          </a:fillRef>
-          <a:effectRef idx="2">
-            <a:schemeClr val="accent1"/>
-          </a:effectRef>
-          <a:fontRef idx="minor">
-            <a:schemeClr val="tx1"/>
-          </a:fontRef>
-        </p:style>
-      </p:cxnSp>
-      <p:sp>
-        <p:nvSpPr>
-          <p:cNvPr id="63" name="Left Brace 62">
-            <a:extLst>
-              <a:ext uri="{FF2B5EF4-FFF2-40B4-BE49-F238E27FC236}">
-                <a16:creationId xmlns:a16="http://schemas.microsoft.com/office/drawing/2014/main" id="{5BBE628C-51BE-4150-B5FE-8E1D9875822A}"/>
-              </a:ext>
-            </a:extLst>
-          </p:cNvPr>
-          <p:cNvSpPr/>
-          <p:nvPr/>
-        </p:nvSpPr>
-        <p:spPr>
-          <a:xfrm rot="16200000">
-            <a:off x="4950359" y="113094"/>
-            <a:ext cx="303482" cy="8703229"/>
-          </a:xfrm>
-          <a:prstGeom prst="leftBrace">
-            <a:avLst>
-              <a:gd name="adj1" fmla="val 8333"/>
-              <a:gd name="adj2" fmla="val 49854"/>
-            </a:avLst>
-          </a:prstGeom>
-        </p:spPr>
-        <p:style>
-          <a:lnRef idx="3">
-            <a:schemeClr val="accent1"/>
-          </a:lnRef>
-          <a:fillRef idx="0">
-            <a:schemeClr val="accent1"/>
-          </a:fillRef>
-          <a:effectRef idx="2">
-            <a:schemeClr val="accent1"/>
-          </a:effectRef>
-          <a:fontRef idx="minor">
-            <a:schemeClr val="tx1"/>
-          </a:fontRef>
-        </p:style>
-        <p:txBody>
-          <a:bodyPr rtlCol="0" anchor="ctr"/>
-          <a:lstStyle/>
-          <a:p>
-            <a:pPr algn="ctr"/>
-            <a:endParaRPr lang="en-US"/>
-          </a:p>
-        </p:txBody>
-      </p:sp>
-      <p:sp>
-        <p:nvSpPr>
-          <p:cNvPr id="64" name="TextBox 63">
-            <a:extLst>
-              <a:ext uri="{FF2B5EF4-FFF2-40B4-BE49-F238E27FC236}">
-                <a16:creationId xmlns:a16="http://schemas.microsoft.com/office/drawing/2014/main" id="{AAFD8EA3-112F-492B-BF12-A485FB0632C2}"/>
-              </a:ext>
-            </a:extLst>
-          </p:cNvPr>
-          <p:cNvSpPr txBox="1"/>
-          <p:nvPr/>
-        </p:nvSpPr>
-        <p:spPr>
-          <a:xfrm>
-            <a:off x="4764507" y="4630196"/>
-            <a:ext cx="588623" cy="303481"/>
-          </a:xfrm>
-          <a:prstGeom prst="rect">
-            <a:avLst/>
-          </a:prstGeom>
-          <a:noFill/>
-        </p:spPr>
-        <p:txBody>
-          <a:bodyPr wrap="none" rtlCol="0">
-            <a:spAutoFit/>
-          </a:bodyPr>
-          <a:lstStyle/>
-          <a:p>
-            <a:r>
-              <a:rPr lang="en-US" sz="1372" b="1" i="1" dirty="0">
-                <a:solidFill>
-                  <a:schemeClr val="accent1"/>
-                </a:solidFill>
-              </a:rPr>
-              <a:t>Inject</a:t>
+              <a:t>Emit</a:t>
             </a:r>
           </a:p>
         </p:txBody>
@@ -4965,14 +3724,75 @@
       </p:grpSpPr>
       <p:sp>
         <p:nvSpPr>
-          <p:cNvPr id="4" name="TextBox 3"/>
+          <p:cNvPr id="2" name="Title 1">
+            <a:extLst>
+              <a:ext uri="{FF2B5EF4-FFF2-40B4-BE49-F238E27FC236}">
+                <a16:creationId xmlns:a16="http://schemas.microsoft.com/office/drawing/2014/main" id="{5DF505AA-43FF-4CD4-90AD-84125007DF24}"/>
+              </a:ext>
+            </a:extLst>
+          </p:cNvPr>
+          <p:cNvSpPr txBox="1">
+            <a:spLocks/>
+          </p:cNvSpPr>
+          <p:nvPr/>
+        </p:nvSpPr>
+        <p:spPr>
+          <a:xfrm>
+            <a:off x="838200" y="365126"/>
+            <a:ext cx="4860235" cy="315912"/>
+          </a:xfrm>
+          <a:prstGeom prst="rect">
+            <a:avLst/>
+          </a:prstGeom>
+        </p:spPr>
+        <p:txBody>
+          <a:bodyPr>
+            <a:normAutofit fontScale="52500" lnSpcReduction="20000"/>
+          </a:bodyPr>
+          <a:lstStyle>
+            <a:lvl1pPr algn="l" defTabSz="914400" rtl="0" eaLnBrk="1" latinLnBrk="0" hangingPunct="1">
+              <a:lnSpc>
+                <a:spcPct val="90000"/>
+              </a:lnSpc>
+              <a:spcBef>
+                <a:spcPct val="0"/>
+              </a:spcBef>
+              <a:buNone/>
+              <a:defRPr sz="4400" kern="1200">
+                <a:solidFill>
+                  <a:schemeClr val="tx1"/>
+                </a:solidFill>
+                <a:latin typeface="+mj-lt"/>
+                <a:ea typeface="+mj-ea"/>
+                <a:cs typeface="+mj-cs"/>
+              </a:defRPr>
+            </a:lvl1pPr>
+          </a:lstStyle>
+          <a:p>
+            <a:r>
+              <a:rPr lang="en-US" sz="3600" b="1"/>
+              <a:t>Sign up Component Diagram</a:t>
+            </a:r>
+            <a:endParaRPr lang="en-US" sz="3600" b="1" dirty="0"/>
+          </a:p>
+        </p:txBody>
+      </p:sp>
+      <p:sp>
+        <p:nvSpPr>
+          <p:cNvPr id="3" name="TextBox 2">
+            <a:extLst>
+              <a:ext uri="{FF2B5EF4-FFF2-40B4-BE49-F238E27FC236}">
+                <a16:creationId xmlns:a16="http://schemas.microsoft.com/office/drawing/2014/main" id="{9E5F5BE2-723C-4B8F-88E4-39218E73EEA8}"/>
+              </a:ext>
+            </a:extLst>
+          </p:cNvPr>
           <p:cNvSpPr txBox="1"/>
           <p:nvPr/>
         </p:nvSpPr>
         <p:spPr>
           <a:xfrm>
-            <a:off x="1009380" y="479624"/>
-            <a:ext cx="639919" cy="303481"/>
+            <a:off x="4895877" y="1741731"/>
+            <a:ext cx="921663" cy="303481"/>
           </a:xfrm>
           <a:prstGeom prst="rect">
             <a:avLst/>
@@ -4991,21 +3811,27 @@
                   <a:srgbClr val="FF0000"/>
                 </a:solidFill>
               </a:rPr>
-              <a:t>&lt;app&gt;</a:t>
-            </a:r>
-          </a:p>
-        </p:txBody>
-      </p:sp>
-      <p:sp>
-        <p:nvSpPr>
-          <p:cNvPr id="5" name="Rounded Rectangle 4"/>
+              <a:t>&lt;register&gt;</a:t>
+            </a:r>
+          </a:p>
+        </p:txBody>
+      </p:sp>
+      <p:sp>
+        <p:nvSpPr>
+          <p:cNvPr id="4" name="Rounded Rectangle 31">
+            <a:extLst>
+              <a:ext uri="{FF2B5EF4-FFF2-40B4-BE49-F238E27FC236}">
+                <a16:creationId xmlns:a16="http://schemas.microsoft.com/office/drawing/2014/main" id="{B56D2429-851C-4B8E-85B8-1FF4D3C1AEB3}"/>
+              </a:ext>
+            </a:extLst>
+          </p:cNvPr>
           <p:cNvSpPr/>
           <p:nvPr/>
         </p:nvSpPr>
         <p:spPr>
           <a:xfrm>
-            <a:off x="523323" y="309043"/>
-            <a:ext cx="1650319" cy="1166483"/>
+            <a:off x="4598504" y="1571151"/>
+            <a:ext cx="1650319" cy="630068"/>
           </a:xfrm>
           <a:prstGeom prst="roundRect">
             <a:avLst/>
@@ -5045,71 +3871,19 @@
       </p:sp>
       <p:sp>
         <p:nvSpPr>
-          <p:cNvPr id="6" name="TextBox 5"/>
+          <p:cNvPr id="5" name="TextBox 4">
+            <a:extLst>
+              <a:ext uri="{FF2B5EF4-FFF2-40B4-BE49-F238E27FC236}">
+                <a16:creationId xmlns:a16="http://schemas.microsoft.com/office/drawing/2014/main" id="{D5ED6753-21F7-4B02-B8CC-8354AC96CD4F}"/>
+              </a:ext>
+            </a:extLst>
+          </p:cNvPr>
           <p:cNvSpPr txBox="1"/>
           <p:nvPr/>
         </p:nvSpPr>
         <p:spPr>
           <a:xfrm>
-            <a:off x="885053" y="892284"/>
-            <a:ext cx="926857" cy="303481"/>
-          </a:xfrm>
-          <a:prstGeom prst="rect">
-            <a:avLst/>
-          </a:prstGeom>
-          <a:noFill/>
-        </p:spPr>
-        <p:txBody>
-          <a:bodyPr wrap="none" rtlCol="0">
-            <a:spAutoFit/>
-          </a:bodyPr>
-          <a:lstStyle/>
-          <a:p>
-            <a:r>
-              <a:rPr lang="en-US" sz="1372" dirty="0"/>
-              <a:t>Students[]</a:t>
-            </a:r>
-          </a:p>
-        </p:txBody>
-      </p:sp>
-      <p:sp>
-        <p:nvSpPr>
-          <p:cNvPr id="7" name="TextBox 6"/>
-          <p:cNvSpPr txBox="1"/>
-          <p:nvPr/>
-        </p:nvSpPr>
-        <p:spPr>
-          <a:xfrm>
-            <a:off x="119555" y="1627265"/>
-            <a:ext cx="3384709" cy="303481"/>
-          </a:xfrm>
-          <a:prstGeom prst="rect">
-            <a:avLst/>
-          </a:prstGeom>
-          <a:noFill/>
-        </p:spPr>
-        <p:txBody>
-          <a:bodyPr wrap="none" rtlCol="0">
-            <a:spAutoFit/>
-          </a:bodyPr>
-          <a:lstStyle/>
-          <a:p>
-            <a:r>
-              <a:rPr lang="en-US" sz="1372" dirty="0"/>
-              <a:t>// A component with a list of student as data</a:t>
-            </a:r>
-          </a:p>
-        </p:txBody>
-      </p:sp>
-      <p:sp>
-        <p:nvSpPr>
-          <p:cNvPr id="8" name="TextBox 7"/>
-          <p:cNvSpPr txBox="1"/>
-          <p:nvPr/>
-        </p:nvSpPr>
-        <p:spPr>
-          <a:xfrm>
-            <a:off x="1009380" y="2556074"/>
+            <a:off x="8652869" y="1589990"/>
             <a:ext cx="639919" cy="303481"/>
           </a:xfrm>
           <a:prstGeom prst="rect">
@@ -5136,14 +3910,20 @@
       </p:sp>
       <p:sp>
         <p:nvSpPr>
-          <p:cNvPr id="9" name="Rounded Rectangle 8"/>
+          <p:cNvPr id="6" name="Rounded Rectangle 31">
+            <a:extLst>
+              <a:ext uri="{FF2B5EF4-FFF2-40B4-BE49-F238E27FC236}">
+                <a16:creationId xmlns:a16="http://schemas.microsoft.com/office/drawing/2014/main" id="{0E57BF41-3D1E-4DA0-92C7-8DEDC347E563}"/>
+              </a:ext>
+            </a:extLst>
+          </p:cNvPr>
           <p:cNvSpPr/>
           <p:nvPr/>
         </p:nvSpPr>
         <p:spPr>
           <a:xfrm>
-            <a:off x="523323" y="2385493"/>
-            <a:ext cx="1650319" cy="1166483"/>
+            <a:off x="8183218" y="1504890"/>
+            <a:ext cx="1650319" cy="853997"/>
           </a:xfrm>
           <a:prstGeom prst="roundRect">
             <a:avLst/>
@@ -5183,92 +3963,20 @@
       </p:sp>
       <p:sp>
         <p:nvSpPr>
-          <p:cNvPr id="10" name="TextBox 9"/>
+          <p:cNvPr id="7" name="TextBox 6">
+            <a:extLst>
+              <a:ext uri="{FF2B5EF4-FFF2-40B4-BE49-F238E27FC236}">
+                <a16:creationId xmlns:a16="http://schemas.microsoft.com/office/drawing/2014/main" id="{2851DF73-1824-4CC0-BD65-523061B3BD7F}"/>
+              </a:ext>
+            </a:extLst>
+          </p:cNvPr>
           <p:cNvSpPr txBox="1"/>
           <p:nvPr/>
         </p:nvSpPr>
         <p:spPr>
           <a:xfrm>
-            <a:off x="885053" y="2968734"/>
-            <a:ext cx="926857" cy="303481"/>
-          </a:xfrm>
-          <a:prstGeom prst="rect">
-            <a:avLst/>
-          </a:prstGeom>
-          <a:noFill/>
-        </p:spPr>
-        <p:txBody>
-          <a:bodyPr wrap="none" rtlCol="0">
-            <a:spAutoFit/>
-          </a:bodyPr>
-          <a:lstStyle/>
-          <a:p>
-            <a:r>
-              <a:rPr lang="en-US" sz="1372" dirty="0"/>
-              <a:t>Students[]</a:t>
-            </a:r>
-          </a:p>
-        </p:txBody>
-      </p:sp>
-      <p:sp>
-        <p:nvSpPr>
-          <p:cNvPr id="11" name="TextBox 10"/>
-          <p:cNvSpPr txBox="1"/>
-          <p:nvPr/>
-        </p:nvSpPr>
-        <p:spPr>
-          <a:xfrm>
-            <a:off x="464251" y="3703715"/>
-            <a:ext cx="2183996" cy="303481"/>
-          </a:xfrm>
-          <a:prstGeom prst="rect">
-            <a:avLst/>
-          </a:prstGeom>
-          <a:noFill/>
-        </p:spPr>
-        <p:txBody>
-          <a:bodyPr wrap="none" rtlCol="0">
-            <a:spAutoFit/>
-          </a:bodyPr>
-          <a:lstStyle/>
-          <a:p>
-            <a:r>
-              <a:rPr lang="en-US" sz="1372" dirty="0"/>
-              <a:t>// </a:t>
-            </a:r>
-            <a:r>
-              <a:rPr lang="en-US" sz="1372" dirty="0">
-                <a:solidFill>
-                  <a:srgbClr val="FF0000"/>
-                </a:solidFill>
-              </a:rPr>
-              <a:t>app</a:t>
-            </a:r>
-            <a:r>
-              <a:rPr lang="en-US" sz="1372" dirty="0"/>
-              <a:t> send student to </a:t>
-            </a:r>
-            <a:r>
-              <a:rPr lang="en-US" sz="1372" dirty="0">
-                <a:solidFill>
-                  <a:srgbClr val="FF0000"/>
-                </a:solidFill>
-              </a:rPr>
-              <a:t>card </a:t>
-            </a:r>
-          </a:p>
-        </p:txBody>
-      </p:sp>
-      <p:sp>
-        <p:nvSpPr>
-          <p:cNvPr id="12" name="TextBox 11"/>
-          <p:cNvSpPr txBox="1"/>
-          <p:nvPr/>
-        </p:nvSpPr>
-        <p:spPr>
-          <a:xfrm>
-            <a:off x="1009380" y="4803105"/>
-            <a:ext cx="848309" cy="303481"/>
+            <a:off x="8652868" y="1912311"/>
+            <a:ext cx="587020" cy="303481"/>
           </a:xfrm>
           <a:prstGeom prst="rect">
             <a:avLst/>
@@ -5287,44 +3995,43 @@
                   <a:srgbClr val="FF0000"/>
                 </a:solidFill>
               </a:rPr>
-              <a:t>&lt;parent&gt;</a:t>
-            </a:r>
-          </a:p>
-        </p:txBody>
-      </p:sp>
-      <p:sp>
-        <p:nvSpPr>
-          <p:cNvPr id="13" name="Rounded Rectangle 12"/>
+              <a:t>Users</a:t>
+            </a:r>
+          </a:p>
+        </p:txBody>
+      </p:sp>
+      <p:sp>
+        <p:nvSpPr>
+          <p:cNvPr id="8" name="Arrow: Down 7">
+            <a:extLst>
+              <a:ext uri="{FF2B5EF4-FFF2-40B4-BE49-F238E27FC236}">
+                <a16:creationId xmlns:a16="http://schemas.microsoft.com/office/drawing/2014/main" id="{CFE9E673-E471-4177-9576-235C080150B8}"/>
+              </a:ext>
+            </a:extLst>
+          </p:cNvPr>
           <p:cNvSpPr/>
           <p:nvPr/>
         </p:nvSpPr>
         <p:spPr>
-          <a:xfrm>
-            <a:off x="523323" y="4632524"/>
-            <a:ext cx="1650319" cy="1166483"/>
-          </a:xfrm>
-          <a:prstGeom prst="roundRect">
+          <a:xfrm rot="16200000">
+            <a:off x="6809452" y="1285887"/>
+            <a:ext cx="172192" cy="1293450"/>
+          </a:xfrm>
+          <a:prstGeom prst="downArrow">
             <a:avLst/>
           </a:prstGeom>
-          <a:noFill/>
-          <a:ln>
-            <a:solidFill>
-              <a:srgbClr val="FF0000"/>
-            </a:solidFill>
-            <a:prstDash val="lgDash"/>
-          </a:ln>
         </p:spPr>
         <p:style>
           <a:lnRef idx="2">
-            <a:schemeClr val="accent1">
+            <a:schemeClr val="accent6">
               <a:shade val="50000"/>
             </a:schemeClr>
           </a:lnRef>
           <a:fillRef idx="1">
-            <a:schemeClr val="accent1"/>
+            <a:schemeClr val="accent6"/>
           </a:fillRef>
           <a:effectRef idx="0">
-            <a:schemeClr val="accent1"/>
+            <a:schemeClr val="accent6"/>
           </a:effectRef>
           <a:fontRef idx="minor">
             <a:schemeClr val="lt1"/>
@@ -5335,20 +4042,26 @@
           <a:lstStyle/>
           <a:p>
             <a:pPr algn="ctr"/>
-            <a:endParaRPr lang="en-US" sz="1372"/>
-          </a:p>
-        </p:txBody>
-      </p:sp>
-      <p:sp>
-        <p:nvSpPr>
-          <p:cNvPr id="14" name="TextBox 13"/>
+            <a:endParaRPr lang="en-US"/>
+          </a:p>
+        </p:txBody>
+      </p:sp>
+      <p:sp>
+        <p:nvSpPr>
+          <p:cNvPr id="9" name="TextBox 8">
+            <a:extLst>
+              <a:ext uri="{FF2B5EF4-FFF2-40B4-BE49-F238E27FC236}">
+                <a16:creationId xmlns:a16="http://schemas.microsoft.com/office/drawing/2014/main" id="{400AD0A8-0AB1-4DEA-BAAF-7E292501C2DD}"/>
+              </a:ext>
+            </a:extLst>
+          </p:cNvPr>
           <p:cNvSpPr txBox="1"/>
           <p:nvPr/>
         </p:nvSpPr>
         <p:spPr>
           <a:xfrm>
-            <a:off x="885053" y="5215765"/>
-            <a:ext cx="926857" cy="303481"/>
+            <a:off x="6332416" y="1521715"/>
+            <a:ext cx="568361" cy="338554"/>
           </a:xfrm>
           <a:prstGeom prst="rect">
             <a:avLst/>
@@ -5362,22 +4075,32 @@
           <a:lstStyle/>
           <a:p>
             <a:r>
-              <a:rPr lang="en-US" sz="1372" dirty="0"/>
-              <a:t>Students[]</a:t>
-            </a:r>
-          </a:p>
-        </p:txBody>
-      </p:sp>
-      <p:sp>
-        <p:nvSpPr>
-          <p:cNvPr id="15" name="TextBox 14"/>
+              <a:rPr lang="en-US" sz="1600" b="1" i="1" dirty="0">
+                <a:solidFill>
+                  <a:srgbClr val="FF0000"/>
+                </a:solidFill>
+              </a:rPr>
+              <a:t>Emit</a:t>
+            </a:r>
+          </a:p>
+        </p:txBody>
+      </p:sp>
+      <p:sp>
+        <p:nvSpPr>
+          <p:cNvPr id="10" name="TextBox 9">
+            <a:extLst>
+              <a:ext uri="{FF2B5EF4-FFF2-40B4-BE49-F238E27FC236}">
+                <a16:creationId xmlns:a16="http://schemas.microsoft.com/office/drawing/2014/main" id="{207FF20E-2901-45EA-88FB-1818B01FDFDB}"/>
+              </a:ext>
+            </a:extLst>
+          </p:cNvPr>
           <p:cNvSpPr txBox="1"/>
           <p:nvPr/>
         </p:nvSpPr>
         <p:spPr>
           <a:xfrm>
-            <a:off x="394083" y="6064417"/>
-            <a:ext cx="3216522" cy="303481"/>
+            <a:off x="6385425" y="1951946"/>
+            <a:ext cx="849913" cy="338554"/>
           </a:xfrm>
           <a:prstGeom prst="rect">
             <a:avLst/>
@@ -5385,95 +4108,34 @@
           <a:noFill/>
         </p:spPr>
         <p:txBody>
-          <a:bodyPr wrap="none" rtlCol="0">
+          <a:bodyPr wrap="square" rtlCol="0">
             <a:spAutoFit/>
           </a:bodyPr>
           <a:lstStyle/>
           <a:p>
             <a:r>
-              <a:rPr lang="en-US" sz="1372" dirty="0"/>
-              <a:t>// </a:t>
-            </a:r>
-            <a:r>
-              <a:rPr lang="en-US" sz="1372" dirty="0">
-                <a:solidFill>
-                  <a:srgbClr val="FF0000"/>
-                </a:solidFill>
-              </a:rPr>
-              <a:t>from</a:t>
-            </a:r>
-            <a:r>
-              <a:rPr lang="en-US" sz="1372" dirty="0"/>
-              <a:t> send the event validated to </a:t>
-            </a:r>
-            <a:r>
-              <a:rPr lang="en-US" sz="1372" dirty="0">
-                <a:solidFill>
-                  <a:srgbClr val="FF0000"/>
-                </a:solidFill>
-              </a:rPr>
-              <a:t>parent</a:t>
-            </a:r>
-          </a:p>
-        </p:txBody>
-      </p:sp>
-      <p:sp>
-        <p:nvSpPr>
-          <p:cNvPr id="17" name="Rounded Rectangle 16"/>
-          <p:cNvSpPr/>
-          <p:nvPr/>
-        </p:nvSpPr>
-        <p:spPr>
-          <a:xfrm>
-            <a:off x="3056973" y="2408786"/>
-            <a:ext cx="1650319" cy="1166483"/>
-          </a:xfrm>
-          <a:prstGeom prst="roundRect">
-            <a:avLst/>
-          </a:prstGeom>
-          <a:noFill/>
-          <a:ln>
-            <a:solidFill>
-              <a:srgbClr val="FF0000"/>
-            </a:solidFill>
-            <a:prstDash val="lgDash"/>
-          </a:ln>
-        </p:spPr>
-        <p:style>
-          <a:lnRef idx="2">
-            <a:schemeClr val="accent1">
-              <a:shade val="50000"/>
-            </a:schemeClr>
-          </a:lnRef>
-          <a:fillRef idx="1">
-            <a:schemeClr val="accent1"/>
-          </a:fillRef>
-          <a:effectRef idx="0">
-            <a:schemeClr val="accent1"/>
-          </a:effectRef>
-          <a:fontRef idx="minor">
-            <a:schemeClr val="lt1"/>
-          </a:fontRef>
-        </p:style>
-        <p:txBody>
-          <a:bodyPr rtlCol="0" anchor="ctr"/>
-          <a:lstStyle/>
-          <a:p>
-            <a:pPr algn="ctr"/>
-            <a:endParaRPr lang="en-US" sz="1372"/>
-          </a:p>
-        </p:txBody>
-      </p:sp>
-      <p:sp>
-        <p:nvSpPr>
-          <p:cNvPr id="18" name="TextBox 17"/>
+              <a:rPr lang="en-US" sz="1600" dirty="0"/>
+              <a:t>user</a:t>
+            </a:r>
+          </a:p>
+        </p:txBody>
+      </p:sp>
+      <p:sp>
+        <p:nvSpPr>
+          <p:cNvPr id="11" name="TextBox 10">
+            <a:extLst>
+              <a:ext uri="{FF2B5EF4-FFF2-40B4-BE49-F238E27FC236}">
+                <a16:creationId xmlns:a16="http://schemas.microsoft.com/office/drawing/2014/main" id="{1F230FCD-1EF8-4456-AB46-51772F254632}"/>
+              </a:ext>
+            </a:extLst>
+          </p:cNvPr>
           <p:cNvSpPr txBox="1"/>
           <p:nvPr/>
         </p:nvSpPr>
         <p:spPr>
           <a:xfrm>
-            <a:off x="3418703" y="2992027"/>
-            <a:ext cx="926857" cy="303481"/>
+            <a:off x="4293704" y="3273287"/>
+            <a:ext cx="6546574" cy="1477328"/>
           </a:xfrm>
           <a:prstGeom prst="rect">
             <a:avLst/>
@@ -5481,1067 +4143,72 @@
           <a:noFill/>
         </p:spPr>
         <p:txBody>
-          <a:bodyPr wrap="none" rtlCol="0">
+          <a:bodyPr wrap="square" rtlCol="0">
             <a:spAutoFit/>
           </a:bodyPr>
           <a:lstStyle/>
           <a:p>
             <a:r>
-              <a:rPr lang="en-US" sz="1372" dirty="0"/>
-              <a:t>Students[]</a:t>
-            </a:r>
-          </a:p>
-        </p:txBody>
-      </p:sp>
-      <p:sp>
-        <p:nvSpPr>
-          <p:cNvPr id="19" name="TextBox 18"/>
-          <p:cNvSpPr txBox="1"/>
+              <a:rPr lang="en-US" dirty="0"/>
+              <a:t>WHAT WILL HAPPENED:</a:t>
+            </a:r>
+          </a:p>
+          <a:p>
+            <a:pPr marL="285750" indent="-285750">
+              <a:buFontTx/>
+              <a:buChar char="-"/>
+            </a:pPr>
+            <a:r>
+              <a:rPr lang="en-US" dirty="0"/>
+              <a:t>Check if the validation doesn’t match or doesn’t have in the data (new user).</a:t>
+            </a:r>
+          </a:p>
+          <a:p>
+            <a:pPr marL="285750" indent="-285750">
+              <a:buFontTx/>
+              <a:buChar char="-"/>
+            </a:pPr>
+            <a:r>
+              <a:rPr lang="en-US" dirty="0"/>
+              <a:t>Need to confirm password if the confirm pass match to the password, then we can register</a:t>
+            </a:r>
+          </a:p>
+        </p:txBody>
+      </p:sp>
+      <p:pic>
+        <p:nvPicPr>
+          <p:cNvPr id="12" name="Picture 11">
+            <a:extLst>
+              <a:ext uri="{FF2B5EF4-FFF2-40B4-BE49-F238E27FC236}">
+                <a16:creationId xmlns:a16="http://schemas.microsoft.com/office/drawing/2014/main" id="{B3EB3590-65B4-4496-92D7-0D822A573C79}"/>
+              </a:ext>
+            </a:extLst>
+          </p:cNvPr>
+          <p:cNvPicPr>
+            <a:picLocks noChangeAspect="1"/>
+          </p:cNvPicPr>
           <p:nvPr/>
-        </p:nvSpPr>
-        <p:spPr>
-          <a:xfrm>
-            <a:off x="3666083" y="4779442"/>
-            <a:ext cx="713657" cy="303481"/>
+        </p:nvPicPr>
+        <p:blipFill>
+          <a:blip r:embed="rId2"/>
+          <a:stretch>
+            <a:fillRect/>
+          </a:stretch>
+        </p:blipFill>
+        <p:spPr>
+          <a:xfrm>
+            <a:off x="642822" y="1420674"/>
+            <a:ext cx="3305175" cy="3705225"/>
           </a:xfrm>
           <a:prstGeom prst="rect">
             <a:avLst/>
           </a:prstGeom>
-          <a:noFill/>
-        </p:spPr>
-        <p:txBody>
-          <a:bodyPr wrap="none" rtlCol="0">
-            <a:spAutoFit/>
-          </a:bodyPr>
-          <a:lstStyle/>
-          <a:p>
-            <a:r>
-              <a:rPr lang="en-US" sz="1372" b="1" i="1" dirty="0">
-                <a:solidFill>
-                  <a:srgbClr val="FF0000"/>
-                </a:solidFill>
-              </a:rPr>
-              <a:t>&lt;from&gt;</a:t>
-            </a:r>
-          </a:p>
-        </p:txBody>
-      </p:sp>
-      <p:sp>
-        <p:nvSpPr>
-          <p:cNvPr id="20" name="Rounded Rectangle 19"/>
-          <p:cNvSpPr/>
-          <p:nvPr/>
-        </p:nvSpPr>
-        <p:spPr>
-          <a:xfrm>
-            <a:off x="3180026" y="4608861"/>
-            <a:ext cx="1650319" cy="1166483"/>
-          </a:xfrm>
-          <a:prstGeom prst="roundRect">
-            <a:avLst/>
-          </a:prstGeom>
-          <a:noFill/>
-          <a:ln>
-            <a:solidFill>
-              <a:srgbClr val="FF0000"/>
-            </a:solidFill>
-            <a:prstDash val="lgDash"/>
-          </a:ln>
-        </p:spPr>
-        <p:style>
-          <a:lnRef idx="2">
-            <a:schemeClr val="accent1">
-              <a:shade val="50000"/>
-            </a:schemeClr>
-          </a:lnRef>
-          <a:fillRef idx="1">
-            <a:schemeClr val="accent1"/>
-          </a:fillRef>
-          <a:effectRef idx="0">
-            <a:schemeClr val="accent1"/>
-          </a:effectRef>
-          <a:fontRef idx="minor">
-            <a:schemeClr val="lt1"/>
-          </a:fontRef>
-        </p:style>
-        <p:txBody>
-          <a:bodyPr rtlCol="0" anchor="ctr"/>
-          <a:lstStyle/>
-          <a:p>
-            <a:pPr algn="ctr"/>
-            <a:endParaRPr lang="en-US" sz="1372"/>
-          </a:p>
-        </p:txBody>
-      </p:sp>
-      <p:sp>
-        <p:nvSpPr>
-          <p:cNvPr id="21" name="TextBox 20"/>
-          <p:cNvSpPr txBox="1"/>
-          <p:nvPr/>
-        </p:nvSpPr>
-        <p:spPr>
-          <a:xfrm>
-            <a:off x="3541756" y="5192102"/>
-            <a:ext cx="926857" cy="303481"/>
-          </a:xfrm>
-          <a:prstGeom prst="rect">
-            <a:avLst/>
-          </a:prstGeom>
-          <a:noFill/>
-        </p:spPr>
-        <p:txBody>
-          <a:bodyPr wrap="none" rtlCol="0">
-            <a:spAutoFit/>
-          </a:bodyPr>
-          <a:lstStyle/>
-          <a:p>
-            <a:r>
-              <a:rPr lang="en-US" sz="1372" dirty="0"/>
-              <a:t>Students[]</a:t>
-            </a:r>
-          </a:p>
-        </p:txBody>
-      </p:sp>
-      <p:sp>
-        <p:nvSpPr>
-          <p:cNvPr id="22" name="Right Arrow 21"/>
-          <p:cNvSpPr/>
-          <p:nvPr/>
-        </p:nvSpPr>
-        <p:spPr>
-          <a:xfrm>
-            <a:off x="2197551" y="2768367"/>
-            <a:ext cx="696809" cy="333683"/>
-          </a:xfrm>
-          <a:prstGeom prst="rightArrow">
-            <a:avLst/>
-          </a:prstGeom>
-          <a:solidFill>
-            <a:schemeClr val="accent6"/>
-          </a:solidFill>
-        </p:spPr>
-        <p:style>
-          <a:lnRef idx="2">
-            <a:schemeClr val="accent1">
-              <a:shade val="50000"/>
-            </a:schemeClr>
-          </a:lnRef>
-          <a:fillRef idx="1">
-            <a:schemeClr val="accent1"/>
-          </a:fillRef>
-          <a:effectRef idx="0">
-            <a:schemeClr val="accent1"/>
-          </a:effectRef>
-          <a:fontRef idx="minor">
-            <a:schemeClr val="lt1"/>
-          </a:fontRef>
-        </p:style>
-        <p:txBody>
-          <a:bodyPr rot="0" spcFirstLastPara="0" vertOverflow="overflow" horzOverflow="overflow" vert="horz" wrap="square" lIns="69681" tIns="34840" rIns="69681" bIns="34840" numCol="1" spcCol="0" rtlCol="0" fromWordArt="0" anchor="ctr" anchorCtr="0" forceAA="0" compatLnSpc="1">
-            <a:prstTxWarp prst="textNoShape">
-              <a:avLst/>
-            </a:prstTxWarp>
-            <a:noAutofit/>
-          </a:bodyPr>
-          <a:lstStyle/>
-          <a:p>
-            <a:pPr algn="ctr"/>
-            <a:endParaRPr lang="en-US" sz="1372"/>
-          </a:p>
-        </p:txBody>
-      </p:sp>
-      <p:sp>
-        <p:nvSpPr>
-          <p:cNvPr id="23" name="TextBox 22"/>
-          <p:cNvSpPr txBox="1"/>
-          <p:nvPr/>
-        </p:nvSpPr>
-        <p:spPr>
-          <a:xfrm>
-            <a:off x="2156606" y="3120474"/>
-            <a:ext cx="735714" cy="303481"/>
-          </a:xfrm>
-          <a:prstGeom prst="rect">
-            <a:avLst/>
-          </a:prstGeom>
-          <a:noFill/>
-        </p:spPr>
-        <p:txBody>
-          <a:bodyPr wrap="none" rtlCol="0">
-            <a:spAutoFit/>
-          </a:bodyPr>
-          <a:lstStyle/>
-          <a:p>
-            <a:r>
-              <a:rPr lang="en-US" sz="1372" dirty="0"/>
-              <a:t>student</a:t>
-            </a:r>
-          </a:p>
-        </p:txBody>
-      </p:sp>
-      <p:sp>
-        <p:nvSpPr>
-          <p:cNvPr id="24" name="TextBox 23"/>
-          <p:cNvSpPr txBox="1"/>
-          <p:nvPr/>
-        </p:nvSpPr>
-        <p:spPr>
-          <a:xfrm>
-            <a:off x="2188492" y="2550268"/>
-            <a:ext cx="670248" cy="303481"/>
-          </a:xfrm>
-          <a:prstGeom prst="rect">
-            <a:avLst/>
-          </a:prstGeom>
-          <a:noFill/>
-        </p:spPr>
-        <p:txBody>
-          <a:bodyPr wrap="none" rtlCol="0">
-            <a:spAutoFit/>
-          </a:bodyPr>
-          <a:lstStyle/>
-          <a:p>
-            <a:r>
-              <a:rPr lang="en-US" sz="1372" b="1" dirty="0">
-                <a:solidFill>
-                  <a:schemeClr val="accent6"/>
-                </a:solidFill>
-              </a:rPr>
-              <a:t>PROPS</a:t>
-            </a:r>
-          </a:p>
-        </p:txBody>
-      </p:sp>
-      <p:sp>
-        <p:nvSpPr>
-          <p:cNvPr id="25" name="TextBox 24"/>
-          <p:cNvSpPr txBox="1"/>
-          <p:nvPr/>
-        </p:nvSpPr>
-        <p:spPr>
-          <a:xfrm>
-            <a:off x="3562171" y="2587817"/>
-            <a:ext cx="680251" cy="303481"/>
-          </a:xfrm>
-          <a:prstGeom prst="rect">
-            <a:avLst/>
-          </a:prstGeom>
-          <a:noFill/>
-        </p:spPr>
-        <p:txBody>
-          <a:bodyPr wrap="none" rtlCol="0">
-            <a:spAutoFit/>
-          </a:bodyPr>
-          <a:lstStyle/>
-          <a:p>
-            <a:r>
-              <a:rPr lang="en-US" sz="1372" b="1" i="1" dirty="0">
-                <a:solidFill>
-                  <a:srgbClr val="FF0000"/>
-                </a:solidFill>
-              </a:rPr>
-              <a:t>&lt;card&gt;</a:t>
-            </a:r>
-          </a:p>
-        </p:txBody>
-      </p:sp>
-      <p:sp>
-        <p:nvSpPr>
-          <p:cNvPr id="26" name="Right Arrow 25"/>
-          <p:cNvSpPr/>
-          <p:nvPr/>
-        </p:nvSpPr>
-        <p:spPr>
-          <a:xfrm flipH="1">
-            <a:off x="2387600" y="5000637"/>
-            <a:ext cx="792424" cy="400041"/>
-          </a:xfrm>
-          <a:prstGeom prst="rightArrow">
-            <a:avLst/>
-          </a:prstGeom>
-          <a:solidFill>
-            <a:srgbClr val="FF0000"/>
-          </a:solidFill>
-        </p:spPr>
-        <p:style>
-          <a:lnRef idx="2">
-            <a:schemeClr val="accent1">
-              <a:shade val="50000"/>
-            </a:schemeClr>
-          </a:lnRef>
-          <a:fillRef idx="1">
-            <a:schemeClr val="accent1"/>
-          </a:fillRef>
-          <a:effectRef idx="0">
-            <a:schemeClr val="accent1"/>
-          </a:effectRef>
-          <a:fontRef idx="minor">
-            <a:schemeClr val="lt1"/>
-          </a:fontRef>
-        </p:style>
-        <p:txBody>
-          <a:bodyPr rot="0" spcFirstLastPara="0" vertOverflow="overflow" horzOverflow="overflow" vert="horz" wrap="square" lIns="69681" tIns="34840" rIns="69681" bIns="34840" numCol="1" spcCol="0" rtlCol="0" fromWordArt="0" anchor="ctr" anchorCtr="0" forceAA="0" compatLnSpc="1">
-            <a:prstTxWarp prst="textNoShape">
-              <a:avLst/>
-            </a:prstTxWarp>
-            <a:noAutofit/>
-          </a:bodyPr>
-          <a:lstStyle/>
-          <a:p>
-            <a:pPr algn="ctr"/>
-            <a:endParaRPr lang="en-US" sz="1372"/>
-          </a:p>
-        </p:txBody>
-      </p:sp>
-      <p:sp>
-        <p:nvSpPr>
-          <p:cNvPr id="27" name="TextBox 26"/>
-          <p:cNvSpPr txBox="1"/>
-          <p:nvPr/>
-        </p:nvSpPr>
-        <p:spPr>
-          <a:xfrm>
-            <a:off x="2523616" y="5336639"/>
-            <a:ext cx="701474" cy="303481"/>
-          </a:xfrm>
-          <a:prstGeom prst="rect">
-            <a:avLst/>
-          </a:prstGeom>
-          <a:noFill/>
-        </p:spPr>
-        <p:txBody>
-          <a:bodyPr wrap="none" rtlCol="0">
-            <a:spAutoFit/>
-          </a:bodyPr>
-          <a:lstStyle/>
-          <a:p>
-            <a:r>
-              <a:rPr lang="en-US" sz="1372" dirty="0" err="1"/>
-              <a:t>valided</a:t>
-            </a:r>
-            <a:endParaRPr lang="en-US" sz="1372" dirty="0"/>
-          </a:p>
-        </p:txBody>
-      </p:sp>
-      <p:sp>
-        <p:nvSpPr>
-          <p:cNvPr id="28" name="TextBox 27"/>
-          <p:cNvSpPr txBox="1"/>
-          <p:nvPr/>
-        </p:nvSpPr>
-        <p:spPr>
-          <a:xfrm>
-            <a:off x="2574806" y="4621286"/>
-            <a:ext cx="558166" cy="303481"/>
-          </a:xfrm>
-          <a:prstGeom prst="rect">
-            <a:avLst/>
-          </a:prstGeom>
-          <a:noFill/>
-        </p:spPr>
-        <p:txBody>
-          <a:bodyPr wrap="none" rtlCol="0">
-            <a:spAutoFit/>
-          </a:bodyPr>
-          <a:lstStyle/>
-          <a:p>
-            <a:r>
-              <a:rPr lang="en-US" sz="1372" b="1" dirty="0">
-                <a:solidFill>
-                  <a:srgbClr val="FF0000"/>
-                </a:solidFill>
-              </a:rPr>
-              <a:t>EMIT</a:t>
-            </a:r>
-          </a:p>
-        </p:txBody>
-      </p:sp>
-      <p:cxnSp>
-        <p:nvCxnSpPr>
-          <p:cNvPr id="30" name="Straight Connector 29"/>
-          <p:cNvCxnSpPr/>
-          <p:nvPr/>
-        </p:nvCxnSpPr>
-        <p:spPr>
-          <a:xfrm>
-            <a:off x="5733143" y="0"/>
-            <a:ext cx="29028" cy="6858000"/>
-          </a:xfrm>
-          <a:prstGeom prst="line">
-            <a:avLst/>
-          </a:prstGeom>
-        </p:spPr>
-        <p:style>
-          <a:lnRef idx="1">
-            <a:schemeClr val="accent1"/>
-          </a:lnRef>
-          <a:fillRef idx="0">
-            <a:schemeClr val="accent1"/>
-          </a:fillRef>
-          <a:effectRef idx="0">
-            <a:schemeClr val="accent1"/>
-          </a:effectRef>
-          <a:fontRef idx="minor">
-            <a:schemeClr val="tx1"/>
-          </a:fontRef>
-        </p:style>
-      </p:cxnSp>
-      <p:sp>
-        <p:nvSpPr>
-          <p:cNvPr id="31" name="TextBox 30"/>
-          <p:cNvSpPr txBox="1"/>
-          <p:nvPr/>
-        </p:nvSpPr>
-        <p:spPr>
-          <a:xfrm>
-            <a:off x="6720447" y="481416"/>
-            <a:ext cx="639919" cy="303481"/>
-          </a:xfrm>
-          <a:prstGeom prst="rect">
-            <a:avLst/>
-          </a:prstGeom>
-          <a:noFill/>
-        </p:spPr>
-        <p:txBody>
-          <a:bodyPr wrap="none" rtlCol="0">
-            <a:spAutoFit/>
-          </a:bodyPr>
-          <a:lstStyle/>
-          <a:p>
-            <a:r>
-              <a:rPr lang="en-US" sz="1372" b="1" i="1" dirty="0">
-                <a:solidFill>
-                  <a:srgbClr val="FF0000"/>
-                </a:solidFill>
-              </a:rPr>
-              <a:t>&lt;app&gt;</a:t>
-            </a:r>
-          </a:p>
-        </p:txBody>
-      </p:sp>
-      <p:sp>
-        <p:nvSpPr>
-          <p:cNvPr id="32" name="Rounded Rectangle 31"/>
-          <p:cNvSpPr/>
-          <p:nvPr/>
-        </p:nvSpPr>
-        <p:spPr>
-          <a:xfrm>
-            <a:off x="6234390" y="310835"/>
-            <a:ext cx="1650319" cy="1166483"/>
-          </a:xfrm>
-          <a:prstGeom prst="roundRect">
-            <a:avLst/>
-          </a:prstGeom>
-          <a:noFill/>
-          <a:ln>
-            <a:solidFill>
-              <a:srgbClr val="FF0000"/>
-            </a:solidFill>
-            <a:prstDash val="lgDash"/>
-          </a:ln>
-        </p:spPr>
-        <p:style>
-          <a:lnRef idx="2">
-            <a:schemeClr val="accent1">
-              <a:shade val="50000"/>
-            </a:schemeClr>
-          </a:lnRef>
-          <a:fillRef idx="1">
-            <a:schemeClr val="accent1"/>
-          </a:fillRef>
-          <a:effectRef idx="0">
-            <a:schemeClr val="accent1"/>
-          </a:effectRef>
-          <a:fontRef idx="minor">
-            <a:schemeClr val="lt1"/>
-          </a:fontRef>
-        </p:style>
-        <p:txBody>
-          <a:bodyPr rtlCol="0" anchor="ctr"/>
-          <a:lstStyle/>
-          <a:p>
-            <a:pPr algn="ctr"/>
-            <a:endParaRPr lang="en-US" sz="1372"/>
-          </a:p>
-        </p:txBody>
-      </p:sp>
-      <p:sp>
-        <p:nvSpPr>
-          <p:cNvPr id="33" name="TextBox 32"/>
-          <p:cNvSpPr txBox="1"/>
-          <p:nvPr/>
-        </p:nvSpPr>
-        <p:spPr>
-          <a:xfrm>
-            <a:off x="6596120" y="894076"/>
-            <a:ext cx="926857" cy="303481"/>
-          </a:xfrm>
-          <a:prstGeom prst="rect">
-            <a:avLst/>
-          </a:prstGeom>
-          <a:noFill/>
-        </p:spPr>
-        <p:txBody>
-          <a:bodyPr wrap="none" rtlCol="0">
-            <a:spAutoFit/>
-          </a:bodyPr>
-          <a:lstStyle/>
-          <a:p>
-            <a:r>
-              <a:rPr lang="en-US" sz="1372" dirty="0"/>
-              <a:t>Students[]</a:t>
-            </a:r>
-          </a:p>
-        </p:txBody>
-      </p:sp>
-      <p:sp>
-        <p:nvSpPr>
-          <p:cNvPr id="34" name="TextBox 33"/>
-          <p:cNvSpPr txBox="1"/>
-          <p:nvPr/>
-        </p:nvSpPr>
-        <p:spPr>
-          <a:xfrm>
-            <a:off x="6234390" y="1613780"/>
-            <a:ext cx="2858411" cy="303481"/>
-          </a:xfrm>
-          <a:prstGeom prst="rect">
-            <a:avLst/>
-          </a:prstGeom>
-          <a:noFill/>
-        </p:spPr>
-        <p:txBody>
-          <a:bodyPr wrap="none" rtlCol="0">
-            <a:spAutoFit/>
-          </a:bodyPr>
-          <a:lstStyle/>
-          <a:p>
-            <a:r>
-              <a:rPr lang="en-US" sz="1372" dirty="0"/>
-              <a:t>// </a:t>
-            </a:r>
-            <a:r>
-              <a:rPr lang="en-US" sz="1372" dirty="0">
-                <a:solidFill>
-                  <a:srgbClr val="FF0000"/>
-                </a:solidFill>
-              </a:rPr>
-              <a:t>app</a:t>
-            </a:r>
-            <a:r>
-              <a:rPr lang="en-US" sz="1372" dirty="0"/>
-              <a:t>  provides students to anymore</a:t>
-            </a:r>
-            <a:endParaRPr lang="en-US" sz="1372" dirty="0">
-              <a:solidFill>
-                <a:srgbClr val="FF0000"/>
-              </a:solidFill>
-            </a:endParaRPr>
-          </a:p>
-        </p:txBody>
-      </p:sp>
-      <p:sp>
-        <p:nvSpPr>
-          <p:cNvPr id="35" name="Rounded Rectangle 34"/>
-          <p:cNvSpPr/>
-          <p:nvPr/>
-        </p:nvSpPr>
-        <p:spPr>
-          <a:xfrm>
-            <a:off x="9792269" y="2129025"/>
-            <a:ext cx="1650319" cy="1166483"/>
-          </a:xfrm>
-          <a:prstGeom prst="roundRect">
-            <a:avLst/>
-          </a:prstGeom>
-          <a:noFill/>
-          <a:ln>
-            <a:solidFill>
-              <a:srgbClr val="FF0000"/>
-            </a:solidFill>
-            <a:prstDash val="lgDash"/>
-          </a:ln>
-        </p:spPr>
-        <p:style>
-          <a:lnRef idx="2">
-            <a:schemeClr val="accent1">
-              <a:shade val="50000"/>
-            </a:schemeClr>
-          </a:lnRef>
-          <a:fillRef idx="1">
-            <a:schemeClr val="accent1"/>
-          </a:fillRef>
-          <a:effectRef idx="0">
-            <a:schemeClr val="accent1"/>
-          </a:effectRef>
-          <a:fontRef idx="minor">
-            <a:schemeClr val="lt1"/>
-          </a:fontRef>
-        </p:style>
-        <p:txBody>
-          <a:bodyPr rtlCol="0" anchor="ctr"/>
-          <a:lstStyle/>
-          <a:p>
-            <a:pPr algn="ctr"/>
-            <a:endParaRPr lang="en-US" sz="1372"/>
-          </a:p>
-        </p:txBody>
-      </p:sp>
-      <p:sp>
-        <p:nvSpPr>
-          <p:cNvPr id="36" name="TextBox 35"/>
-          <p:cNvSpPr txBox="1"/>
-          <p:nvPr/>
-        </p:nvSpPr>
-        <p:spPr>
-          <a:xfrm>
-            <a:off x="10153999" y="2712266"/>
-            <a:ext cx="926857" cy="303481"/>
-          </a:xfrm>
-          <a:prstGeom prst="rect">
-            <a:avLst/>
-          </a:prstGeom>
-          <a:noFill/>
-        </p:spPr>
-        <p:txBody>
-          <a:bodyPr wrap="none" rtlCol="0">
-            <a:spAutoFit/>
-          </a:bodyPr>
-          <a:lstStyle/>
-          <a:p>
-            <a:r>
-              <a:rPr lang="en-US" sz="1372" dirty="0"/>
-              <a:t>Students[]</a:t>
-            </a:r>
-          </a:p>
-        </p:txBody>
-      </p:sp>
-      <p:sp>
-        <p:nvSpPr>
-          <p:cNvPr id="40" name="TextBox 39"/>
-          <p:cNvSpPr txBox="1"/>
-          <p:nvPr/>
-        </p:nvSpPr>
-        <p:spPr>
-          <a:xfrm>
-            <a:off x="10297467" y="2308056"/>
-            <a:ext cx="819455" cy="303481"/>
-          </a:xfrm>
-          <a:prstGeom prst="rect">
-            <a:avLst/>
-          </a:prstGeom>
-          <a:noFill/>
-        </p:spPr>
-        <p:txBody>
-          <a:bodyPr wrap="none" rtlCol="0">
-            <a:spAutoFit/>
-          </a:bodyPr>
-          <a:lstStyle/>
-          <a:p>
-            <a:r>
-              <a:rPr lang="en-US" sz="1372" b="1" i="1" dirty="0">
-                <a:solidFill>
-                  <a:srgbClr val="FF0000"/>
-                </a:solidFill>
-              </a:rPr>
-              <a:t>&lt;dialog&gt;</a:t>
-            </a:r>
-          </a:p>
-        </p:txBody>
-      </p:sp>
-      <p:sp>
-        <p:nvSpPr>
-          <p:cNvPr id="41" name="Right Arrow 40"/>
-          <p:cNvSpPr/>
-          <p:nvPr/>
-        </p:nvSpPr>
-        <p:spPr>
-          <a:xfrm>
-            <a:off x="7846423" y="727951"/>
-            <a:ext cx="696809" cy="333683"/>
-          </a:xfrm>
-          <a:prstGeom prst="rightArrow">
-            <a:avLst/>
-          </a:prstGeom>
-          <a:solidFill>
-            <a:srgbClr val="FFFF00"/>
-          </a:solidFill>
-        </p:spPr>
-        <p:style>
-          <a:lnRef idx="2">
-            <a:schemeClr val="accent1">
-              <a:shade val="50000"/>
-            </a:schemeClr>
-          </a:lnRef>
-          <a:fillRef idx="1">
-            <a:schemeClr val="accent1"/>
-          </a:fillRef>
-          <a:effectRef idx="0">
-            <a:schemeClr val="accent1"/>
-          </a:effectRef>
-          <a:fontRef idx="minor">
-            <a:schemeClr val="lt1"/>
-          </a:fontRef>
-        </p:style>
-        <p:txBody>
-          <a:bodyPr rot="0" spcFirstLastPara="0" vertOverflow="overflow" horzOverflow="overflow" vert="horz" wrap="square" lIns="69681" tIns="34840" rIns="69681" bIns="34840" numCol="1" spcCol="0" rtlCol="0" fromWordArt="0" anchor="ctr" anchorCtr="0" forceAA="0" compatLnSpc="1">
-            <a:prstTxWarp prst="textNoShape">
-              <a:avLst/>
-            </a:prstTxWarp>
-            <a:noAutofit/>
-          </a:bodyPr>
-          <a:lstStyle/>
-          <a:p>
-            <a:pPr algn="ctr"/>
-            <a:endParaRPr lang="en-US" sz="1372"/>
-          </a:p>
-        </p:txBody>
-      </p:sp>
-      <p:sp>
-        <p:nvSpPr>
-          <p:cNvPr id="42" name="TextBox 41"/>
-          <p:cNvSpPr txBox="1"/>
-          <p:nvPr/>
-        </p:nvSpPr>
-        <p:spPr>
-          <a:xfrm>
-            <a:off x="7837364" y="509852"/>
-            <a:ext cx="838756" cy="303481"/>
-          </a:xfrm>
-          <a:prstGeom prst="rect">
-            <a:avLst/>
-          </a:prstGeom>
-          <a:noFill/>
-        </p:spPr>
-        <p:txBody>
-          <a:bodyPr wrap="none" rtlCol="0">
-            <a:spAutoFit/>
-          </a:bodyPr>
-          <a:lstStyle/>
-          <a:p>
-            <a:r>
-              <a:rPr lang="en-US" sz="1372" b="1" dirty="0">
-                <a:solidFill>
-                  <a:schemeClr val="accent4"/>
-                </a:solidFill>
-              </a:rPr>
-              <a:t>PROVIDE</a:t>
-            </a:r>
-          </a:p>
-        </p:txBody>
-      </p:sp>
-      <p:sp>
-        <p:nvSpPr>
-          <p:cNvPr id="43" name="TextBox 42"/>
-          <p:cNvSpPr txBox="1"/>
-          <p:nvPr/>
-        </p:nvSpPr>
-        <p:spPr>
-          <a:xfrm>
-            <a:off x="7991050" y="1073307"/>
-            <a:ext cx="926857" cy="303481"/>
-          </a:xfrm>
-          <a:prstGeom prst="rect">
-            <a:avLst/>
-          </a:prstGeom>
-          <a:noFill/>
-        </p:spPr>
-        <p:txBody>
-          <a:bodyPr wrap="none" rtlCol="0">
-            <a:spAutoFit/>
-          </a:bodyPr>
-          <a:lstStyle/>
-          <a:p>
-            <a:r>
-              <a:rPr lang="en-US" sz="1372" dirty="0"/>
-              <a:t>Students[]</a:t>
-            </a:r>
-          </a:p>
-        </p:txBody>
-      </p:sp>
-      <p:sp>
-        <p:nvSpPr>
-          <p:cNvPr id="44" name="Right Arrow 43"/>
-          <p:cNvSpPr/>
-          <p:nvPr/>
-        </p:nvSpPr>
-        <p:spPr>
-          <a:xfrm>
-            <a:off x="9135788" y="2542676"/>
-            <a:ext cx="696809" cy="333683"/>
-          </a:xfrm>
-          <a:prstGeom prst="rightArrow">
-            <a:avLst/>
-          </a:prstGeom>
-          <a:solidFill>
-            <a:srgbClr val="FFFF00"/>
-          </a:solidFill>
-        </p:spPr>
-        <p:style>
-          <a:lnRef idx="2">
-            <a:schemeClr val="accent1">
-              <a:shade val="50000"/>
-            </a:schemeClr>
-          </a:lnRef>
-          <a:fillRef idx="1">
-            <a:schemeClr val="accent1"/>
-          </a:fillRef>
-          <a:effectRef idx="0">
-            <a:schemeClr val="accent1"/>
-          </a:effectRef>
-          <a:fontRef idx="minor">
-            <a:schemeClr val="lt1"/>
-          </a:fontRef>
-        </p:style>
-        <p:txBody>
-          <a:bodyPr rot="0" spcFirstLastPara="0" vertOverflow="overflow" horzOverflow="overflow" vert="horz" wrap="square" lIns="69681" tIns="34840" rIns="69681" bIns="34840" numCol="1" spcCol="0" rtlCol="0" fromWordArt="0" anchor="ctr" anchorCtr="0" forceAA="0" compatLnSpc="1">
-            <a:prstTxWarp prst="textNoShape">
-              <a:avLst/>
-            </a:prstTxWarp>
-            <a:noAutofit/>
-          </a:bodyPr>
-          <a:lstStyle/>
-          <a:p>
-            <a:pPr algn="ctr"/>
-            <a:endParaRPr lang="en-US" sz="1372"/>
-          </a:p>
-        </p:txBody>
-      </p:sp>
-      <p:sp>
-        <p:nvSpPr>
-          <p:cNvPr id="45" name="TextBox 44"/>
-          <p:cNvSpPr txBox="1"/>
-          <p:nvPr/>
-        </p:nvSpPr>
-        <p:spPr>
-          <a:xfrm>
-            <a:off x="9126729" y="2324577"/>
-            <a:ext cx="668645" cy="303481"/>
-          </a:xfrm>
-          <a:prstGeom prst="rect">
-            <a:avLst/>
-          </a:prstGeom>
-          <a:noFill/>
-        </p:spPr>
-        <p:txBody>
-          <a:bodyPr wrap="none" rtlCol="0">
-            <a:spAutoFit/>
-          </a:bodyPr>
-          <a:lstStyle/>
-          <a:p>
-            <a:r>
-              <a:rPr lang="en-US" sz="1372" b="1" dirty="0">
-                <a:solidFill>
-                  <a:schemeClr val="accent4"/>
-                </a:solidFill>
-              </a:rPr>
-              <a:t>INJECT</a:t>
-            </a:r>
-          </a:p>
-        </p:txBody>
-      </p:sp>
-      <p:sp>
-        <p:nvSpPr>
-          <p:cNvPr id="46" name="TextBox 45"/>
-          <p:cNvSpPr txBox="1"/>
-          <p:nvPr/>
-        </p:nvSpPr>
-        <p:spPr>
-          <a:xfrm>
-            <a:off x="9280415" y="2888032"/>
-            <a:ext cx="926857" cy="303481"/>
-          </a:xfrm>
-          <a:prstGeom prst="rect">
-            <a:avLst/>
-          </a:prstGeom>
-          <a:noFill/>
-        </p:spPr>
-        <p:txBody>
-          <a:bodyPr wrap="none" rtlCol="0">
-            <a:spAutoFit/>
-          </a:bodyPr>
-          <a:lstStyle/>
-          <a:p>
-            <a:r>
-              <a:rPr lang="en-US" sz="1372" dirty="0"/>
-              <a:t>Students[]</a:t>
-            </a:r>
-          </a:p>
-        </p:txBody>
-      </p:sp>
-      <p:sp>
-        <p:nvSpPr>
-          <p:cNvPr id="47" name="TextBox 46"/>
-          <p:cNvSpPr txBox="1"/>
-          <p:nvPr/>
-        </p:nvSpPr>
-        <p:spPr>
-          <a:xfrm>
-            <a:off x="8917907" y="3423528"/>
-            <a:ext cx="2987100" cy="303481"/>
-          </a:xfrm>
-          <a:prstGeom prst="rect">
-            <a:avLst/>
-          </a:prstGeom>
-          <a:noFill/>
-        </p:spPr>
-        <p:txBody>
-          <a:bodyPr wrap="none" rtlCol="0">
-            <a:spAutoFit/>
-          </a:bodyPr>
-          <a:lstStyle/>
-          <a:p>
-            <a:r>
-              <a:rPr lang="en-US" sz="1372" dirty="0"/>
-              <a:t>// </a:t>
-            </a:r>
-            <a:r>
-              <a:rPr lang="en-US" sz="1372" dirty="0">
-                <a:solidFill>
-                  <a:srgbClr val="FF0000"/>
-                </a:solidFill>
-              </a:rPr>
-              <a:t>dialog </a:t>
-            </a:r>
-            <a:r>
-              <a:rPr lang="en-US" sz="1372" dirty="0"/>
-              <a:t> gets students from a provider</a:t>
-            </a:r>
-            <a:endParaRPr lang="en-US" sz="1372" dirty="0">
-              <a:solidFill>
-                <a:srgbClr val="FF0000"/>
-              </a:solidFill>
-            </a:endParaRPr>
-          </a:p>
-        </p:txBody>
-      </p:sp>
-      <p:sp>
-        <p:nvSpPr>
-          <p:cNvPr id="48" name="TextBox 47"/>
-          <p:cNvSpPr txBox="1"/>
-          <p:nvPr/>
-        </p:nvSpPr>
-        <p:spPr>
-          <a:xfrm>
-            <a:off x="6561502" y="4305380"/>
-            <a:ext cx="1215717" cy="303481"/>
-          </a:xfrm>
-          <a:prstGeom prst="rect">
-            <a:avLst/>
-          </a:prstGeom>
-          <a:noFill/>
-        </p:spPr>
-        <p:txBody>
-          <a:bodyPr wrap="none" rtlCol="0">
-            <a:spAutoFit/>
-          </a:bodyPr>
-          <a:lstStyle/>
-          <a:p>
-            <a:r>
-              <a:rPr lang="en-US" sz="1372" b="1" i="1" dirty="0">
-                <a:solidFill>
-                  <a:srgbClr val="7030A0"/>
-                </a:solidFill>
-              </a:rPr>
-              <a:t>&lt;router-view&gt;</a:t>
-            </a:r>
-          </a:p>
-        </p:txBody>
-      </p:sp>
-      <p:sp>
-        <p:nvSpPr>
-          <p:cNvPr id="49" name="Rounded Rectangle 48"/>
-          <p:cNvSpPr/>
-          <p:nvPr/>
-        </p:nvSpPr>
-        <p:spPr>
-          <a:xfrm>
-            <a:off x="6217868" y="4170157"/>
-            <a:ext cx="1866945" cy="584334"/>
-          </a:xfrm>
-          <a:prstGeom prst="roundRect">
-            <a:avLst/>
-          </a:prstGeom>
-          <a:noFill/>
-          <a:ln>
-            <a:solidFill>
-              <a:srgbClr val="7030A0"/>
-            </a:solidFill>
-            <a:prstDash val="lgDash"/>
-          </a:ln>
-        </p:spPr>
-        <p:style>
-          <a:lnRef idx="2">
-            <a:schemeClr val="accent1">
-              <a:shade val="50000"/>
-            </a:schemeClr>
-          </a:lnRef>
-          <a:fillRef idx="1">
-            <a:schemeClr val="accent1"/>
-          </a:fillRef>
-          <a:effectRef idx="0">
-            <a:schemeClr val="accent1"/>
-          </a:effectRef>
-          <a:fontRef idx="minor">
-            <a:schemeClr val="lt1"/>
-          </a:fontRef>
-        </p:style>
-        <p:txBody>
-          <a:bodyPr rtlCol="0" anchor="ctr"/>
-          <a:lstStyle/>
-          <a:p>
-            <a:pPr algn="ctr"/>
-            <a:endParaRPr lang="en-US" sz="1372"/>
-          </a:p>
-        </p:txBody>
-      </p:sp>
-      <p:sp>
-        <p:nvSpPr>
-          <p:cNvPr id="50" name="TextBox 49"/>
-          <p:cNvSpPr txBox="1"/>
-          <p:nvPr/>
-        </p:nvSpPr>
-        <p:spPr>
-          <a:xfrm>
-            <a:off x="8256742" y="4317805"/>
-            <a:ext cx="2229136" cy="303481"/>
-          </a:xfrm>
-          <a:prstGeom prst="rect">
-            <a:avLst/>
-          </a:prstGeom>
-          <a:noFill/>
-        </p:spPr>
-        <p:txBody>
-          <a:bodyPr wrap="none" rtlCol="0">
-            <a:spAutoFit/>
-          </a:bodyPr>
-          <a:lstStyle/>
-          <a:p>
-            <a:r>
-              <a:rPr lang="en-US" sz="1372" dirty="0"/>
-              <a:t>// </a:t>
-            </a:r>
-            <a:r>
-              <a:rPr lang="en-US" sz="1372" dirty="0" err="1"/>
-              <a:t>Vue</a:t>
-            </a:r>
-            <a:r>
-              <a:rPr lang="en-US" sz="1372" dirty="0"/>
-              <a:t> JS built-in component</a:t>
-            </a:r>
-            <a:endParaRPr lang="en-US" sz="1372" dirty="0">
-              <a:solidFill>
-                <a:srgbClr val="FF0000"/>
-              </a:solidFill>
-            </a:endParaRPr>
-          </a:p>
-        </p:txBody>
-      </p:sp>
+        </p:spPr>
+      </p:pic>
     </p:spTree>
     <p:extLst>
       <p:ext uri="{BB962C8B-B14F-4D97-AF65-F5344CB8AC3E}">
-        <p14:creationId xmlns:p14="http://schemas.microsoft.com/office/powerpoint/2010/main" val="3109588190"/>
+        <p14:creationId xmlns:p14="http://schemas.microsoft.com/office/powerpoint/2010/main" val="746292408"/>
       </p:ext>
     </p:extLst>
   </p:cSld>

</xml_diff>